<commit_message>
<create>303:beginning code of web file by header
</commit_message>
<xml_diff>
--- a/01_annexes/Station MTO CESI-DI20.pptx
+++ b/01_annexes/Station MTO CESI-DI20.pptx
@@ -7,6 +7,9 @@
   <p:sldIdLst>
     <p:sldId id="257" r:id="rId2"/>
     <p:sldId id="256" r:id="rId3"/>
+    <p:sldId id="258" r:id="rId4"/>
+    <p:sldId id="259" r:id="rId5"/>
+    <p:sldId id="260" r:id="rId6"/>
   </p:sldIdLst>
   <p:sldSz cx="12192000" cy="6858000"/>
   <p:notesSz cx="6858000" cy="9144000"/>
@@ -105,6 +108,11 @@
       </a:defRPr>
     </a:lvl9pPr>
   </p:defaultTextStyle>
+  <p:extLst>
+    <p:ext uri="{EFAFB233-063F-42B5-8137-9DF3F51BA10A}">
+      <p15:sldGuideLst xmlns:p15="http://schemas.microsoft.com/office/powerpoint/2012/main"/>
+    </p:ext>
+  </p:extLst>
 </p:presentation>
 </file>
 
@@ -255,7 +263,7 @@
           <a:p>
             <a:fld id="{A84FBE1F-28F7-4FD3-94D2-8148694171D7}" type="datetimeFigureOut">
               <a:rPr lang="fr-FR" smtClean="0"/>
-              <a:t>18/01/2021</a:t>
+              <a:t>29/01/2021</a:t>
             </a:fld>
             <a:endParaRPr lang="fr-FR"/>
           </a:p>
@@ -453,7 +461,7 @@
           <a:p>
             <a:fld id="{A84FBE1F-28F7-4FD3-94D2-8148694171D7}" type="datetimeFigureOut">
               <a:rPr lang="fr-FR" smtClean="0"/>
-              <a:t>18/01/2021</a:t>
+              <a:t>29/01/2021</a:t>
             </a:fld>
             <a:endParaRPr lang="fr-FR"/>
           </a:p>
@@ -661,7 +669,7 @@
           <a:p>
             <a:fld id="{A84FBE1F-28F7-4FD3-94D2-8148694171D7}" type="datetimeFigureOut">
               <a:rPr lang="fr-FR" smtClean="0"/>
-              <a:t>18/01/2021</a:t>
+              <a:t>29/01/2021</a:t>
             </a:fld>
             <a:endParaRPr lang="fr-FR"/>
           </a:p>
@@ -859,7 +867,7 @@
           <a:p>
             <a:fld id="{A84FBE1F-28F7-4FD3-94D2-8148694171D7}" type="datetimeFigureOut">
               <a:rPr lang="fr-FR" smtClean="0"/>
-              <a:t>18/01/2021</a:t>
+              <a:t>29/01/2021</a:t>
             </a:fld>
             <a:endParaRPr lang="fr-FR"/>
           </a:p>
@@ -1134,7 +1142,7 @@
           <a:p>
             <a:fld id="{A84FBE1F-28F7-4FD3-94D2-8148694171D7}" type="datetimeFigureOut">
               <a:rPr lang="fr-FR" smtClean="0"/>
-              <a:t>18/01/2021</a:t>
+              <a:t>29/01/2021</a:t>
             </a:fld>
             <a:endParaRPr lang="fr-FR"/>
           </a:p>
@@ -1399,7 +1407,7 @@
           <a:p>
             <a:fld id="{A84FBE1F-28F7-4FD3-94D2-8148694171D7}" type="datetimeFigureOut">
               <a:rPr lang="fr-FR" smtClean="0"/>
-              <a:t>18/01/2021</a:t>
+              <a:t>29/01/2021</a:t>
             </a:fld>
             <a:endParaRPr lang="fr-FR"/>
           </a:p>
@@ -1811,7 +1819,7 @@
           <a:p>
             <a:fld id="{A84FBE1F-28F7-4FD3-94D2-8148694171D7}" type="datetimeFigureOut">
               <a:rPr lang="fr-FR" smtClean="0"/>
-              <a:t>18/01/2021</a:t>
+              <a:t>29/01/2021</a:t>
             </a:fld>
             <a:endParaRPr lang="fr-FR"/>
           </a:p>
@@ -1952,7 +1960,7 @@
           <a:p>
             <a:fld id="{A84FBE1F-28F7-4FD3-94D2-8148694171D7}" type="datetimeFigureOut">
               <a:rPr lang="fr-FR" smtClean="0"/>
-              <a:t>18/01/2021</a:t>
+              <a:t>29/01/2021</a:t>
             </a:fld>
             <a:endParaRPr lang="fr-FR"/>
           </a:p>
@@ -2065,7 +2073,7 @@
           <a:p>
             <a:fld id="{A84FBE1F-28F7-4FD3-94D2-8148694171D7}" type="datetimeFigureOut">
               <a:rPr lang="fr-FR" smtClean="0"/>
-              <a:t>18/01/2021</a:t>
+              <a:t>29/01/2021</a:t>
             </a:fld>
             <a:endParaRPr lang="fr-FR"/>
           </a:p>
@@ -2376,7 +2384,7 @@
           <a:p>
             <a:fld id="{A84FBE1F-28F7-4FD3-94D2-8148694171D7}" type="datetimeFigureOut">
               <a:rPr lang="fr-FR" smtClean="0"/>
-              <a:t>18/01/2021</a:t>
+              <a:t>29/01/2021</a:t>
             </a:fld>
             <a:endParaRPr lang="fr-FR"/>
           </a:p>
@@ -2664,7 +2672,7 @@
           <a:p>
             <a:fld id="{A84FBE1F-28F7-4FD3-94D2-8148694171D7}" type="datetimeFigureOut">
               <a:rPr lang="fr-FR" smtClean="0"/>
-              <a:t>18/01/2021</a:t>
+              <a:t>29/01/2021</a:t>
             </a:fld>
             <a:endParaRPr lang="fr-FR"/>
           </a:p>
@@ -2905,7 +2913,7 @@
           <a:p>
             <a:fld id="{A84FBE1F-28F7-4FD3-94D2-8148694171D7}" type="datetimeFigureOut">
               <a:rPr lang="fr-FR" smtClean="0"/>
-              <a:t>18/01/2021</a:t>
+              <a:t>29/01/2021</a:t>
             </a:fld>
             <a:endParaRPr lang="fr-FR"/>
           </a:p>
@@ -5215,6 +5223,3505 @@
 </p:sld>
 </file>
 
+<file path=ppt/slides/slide3.xml><?xml version="1.0" encoding="utf-8"?>
+<p:sld xmlns:a="http://schemas.openxmlformats.org/drawingml/2006/main" xmlns:r="http://schemas.openxmlformats.org/officeDocument/2006/relationships" xmlns:p="http://schemas.openxmlformats.org/presentationml/2006/main">
+  <p:cSld>
+    <p:bg>
+      <p:bgPr>
+        <a:solidFill>
+          <a:schemeClr val="bg1"/>
+        </a:solidFill>
+        <a:effectLst/>
+      </p:bgPr>
+    </p:bg>
+    <p:spTree>
+      <p:nvGrpSpPr>
+        <p:cNvPr id="1" name=""/>
+        <p:cNvGrpSpPr/>
+        <p:nvPr/>
+      </p:nvGrpSpPr>
+      <p:grpSpPr>
+        <a:xfrm>
+          <a:off x="0" y="0"/>
+          <a:ext cx="0" cy="0"/>
+          <a:chOff x="0" y="0"/>
+          <a:chExt cx="0" cy="0"/>
+        </a:xfrm>
+      </p:grpSpPr>
+      <p:sp>
+        <p:nvSpPr>
+          <p:cNvPr id="9" name="Rectangle 8">
+            <a:extLst>
+              <a:ext uri="{FF2B5EF4-FFF2-40B4-BE49-F238E27FC236}">
+                <a16:creationId xmlns:a16="http://schemas.microsoft.com/office/drawing/2014/main" id="{F3060C83-F051-4F0E-ABAD-AA0DFC48B218}"/>
+              </a:ext>
+              <a:ext uri="{C183D7F6-B498-43B3-948B-1728B52AA6E4}">
+                <adec:decorative xmlns:adec="http://schemas.microsoft.com/office/drawing/2017/decorative" val="1"/>
+              </a:ext>
+            </a:extLst>
+          </p:cNvPr>
+          <p:cNvSpPr>
+            <a:spLocks noGrp="1" noRot="1" noChangeAspect="1" noMove="1" noResize="1" noEditPoints="1" noAdjustHandles="1" noChangeArrowheads="1" noChangeShapeType="1" noTextEdit="1"/>
+          </p:cNvSpPr>
+          <p:nvPr>
+            <p:extLst>
+              <p:ext uri="{386F3935-93C4-4BCD-93E2-E3B085C9AB24}">
+                <p16:designElem xmlns:p16="http://schemas.microsoft.com/office/powerpoint/2015/main" val="1"/>
+              </p:ext>
+            </p:extLst>
+          </p:nvPr>
+        </p:nvSpPr>
+        <p:spPr>
+          <a:xfrm>
+            <a:off x="0" y="0"/>
+            <a:ext cx="12192000" cy="6858000"/>
+          </a:xfrm>
+          <a:prstGeom prst="rect">
+            <a:avLst/>
+          </a:prstGeom>
+          <a:solidFill>
+            <a:schemeClr val="bg1"/>
+          </a:solidFill>
+          <a:ln>
+            <a:noFill/>
+          </a:ln>
+        </p:spPr>
+        <p:style>
+          <a:lnRef idx="2">
+            <a:schemeClr val="accent1">
+              <a:shade val="50000"/>
+            </a:schemeClr>
+          </a:lnRef>
+          <a:fillRef idx="1">
+            <a:schemeClr val="accent1"/>
+          </a:fillRef>
+          <a:effectRef idx="0">
+            <a:schemeClr val="accent1"/>
+          </a:effectRef>
+          <a:fontRef idx="minor">
+            <a:schemeClr val="lt1"/>
+          </a:fontRef>
+        </p:style>
+        <p:txBody>
+          <a:bodyPr rtlCol="0" anchor="ctr"/>
+          <a:lstStyle/>
+          <a:p>
+            <a:pPr algn="ctr"/>
+            <a:endParaRPr lang="en-US" dirty="0"/>
+          </a:p>
+        </p:txBody>
+      </p:sp>
+      <p:sp>
+        <p:nvSpPr>
+          <p:cNvPr id="11" name="Freeform: Shape 10">
+            <a:extLst>
+              <a:ext uri="{FF2B5EF4-FFF2-40B4-BE49-F238E27FC236}">
+                <a16:creationId xmlns:a16="http://schemas.microsoft.com/office/drawing/2014/main" id="{83C98ABE-055B-441F-B07E-44F97F083C39}"/>
+              </a:ext>
+              <a:ext uri="{C183D7F6-B498-43B3-948B-1728B52AA6E4}">
+                <adec:decorative xmlns:adec="http://schemas.microsoft.com/office/drawing/2017/decorative" val="1"/>
+              </a:ext>
+            </a:extLst>
+          </p:cNvPr>
+          <p:cNvSpPr>
+            <a:spLocks noGrp="1" noRot="1" noChangeAspect="1" noMove="1" noResize="1" noEditPoints="1" noAdjustHandles="1" noChangeArrowheads="1" noChangeShapeType="1" noTextEdit="1"/>
+          </p:cNvSpPr>
+          <p:nvPr>
+            <p:extLst>
+              <p:ext uri="{386F3935-93C4-4BCD-93E2-E3B085C9AB24}">
+                <p16:designElem xmlns:p16="http://schemas.microsoft.com/office/powerpoint/2015/main" val="1"/>
+              </p:ext>
+            </p:extLst>
+          </p:nvPr>
+        </p:nvSpPr>
+        <p:spPr>
+          <a:xfrm rot="18900000" flipH="1">
+            <a:off x="-376156" y="-253670"/>
+            <a:ext cx="1827638" cy="1376989"/>
+          </a:xfrm>
+          <a:custGeom>
+            <a:avLst/>
+            <a:gdLst>
+              <a:gd name="connsiteX0" fmla="*/ 0 w 1827638"/>
+              <a:gd name="connsiteY0" fmla="*/ 987379 h 1376989"/>
+              <a:gd name="connsiteX1" fmla="*/ 987379 w 1827638"/>
+              <a:gd name="connsiteY1" fmla="*/ 0 h 1376989"/>
+              <a:gd name="connsiteX2" fmla="*/ 1827638 w 1827638"/>
+              <a:gd name="connsiteY2" fmla="*/ 840260 h 1376989"/>
+              <a:gd name="connsiteX3" fmla="*/ 1827638 w 1827638"/>
+              <a:gd name="connsiteY3" fmla="*/ 1376989 h 1376989"/>
+              <a:gd name="connsiteX4" fmla="*/ 0 w 1827638"/>
+              <a:gd name="connsiteY4" fmla="*/ 1376989 h 1376989"/>
+            </a:gdLst>
+            <a:ahLst/>
+            <a:cxnLst>
+              <a:cxn ang="0">
+                <a:pos x="connsiteX0" y="connsiteY0"/>
+              </a:cxn>
+              <a:cxn ang="0">
+                <a:pos x="connsiteX1" y="connsiteY1"/>
+              </a:cxn>
+              <a:cxn ang="0">
+                <a:pos x="connsiteX2" y="connsiteY2"/>
+              </a:cxn>
+              <a:cxn ang="0">
+                <a:pos x="connsiteX3" y="connsiteY3"/>
+              </a:cxn>
+              <a:cxn ang="0">
+                <a:pos x="connsiteX4" y="connsiteY4"/>
+              </a:cxn>
+            </a:cxnLst>
+            <a:rect l="l" t="t" r="r" b="b"/>
+            <a:pathLst>
+              <a:path w="1827638" h="1376989">
+                <a:moveTo>
+                  <a:pt x="0" y="987379"/>
+                </a:moveTo>
+                <a:lnTo>
+                  <a:pt x="987379" y="0"/>
+                </a:lnTo>
+                <a:lnTo>
+                  <a:pt x="1827638" y="840260"/>
+                </a:lnTo>
+                <a:lnTo>
+                  <a:pt x="1827638" y="1376989"/>
+                </a:lnTo>
+                <a:lnTo>
+                  <a:pt x="0" y="1376989"/>
+                </a:lnTo>
+                <a:close/>
+              </a:path>
+            </a:pathLst>
+          </a:custGeom>
+          <a:solidFill>
+            <a:schemeClr val="accent1">
+              <a:alpha val="30000"/>
+            </a:schemeClr>
+          </a:solidFill>
+          <a:ln>
+            <a:noFill/>
+          </a:ln>
+        </p:spPr>
+        <p:style>
+          <a:lnRef idx="2">
+            <a:schemeClr val="accent1">
+              <a:shade val="50000"/>
+            </a:schemeClr>
+          </a:lnRef>
+          <a:fillRef idx="1">
+            <a:schemeClr val="accent1"/>
+          </a:fillRef>
+          <a:effectRef idx="0">
+            <a:schemeClr val="accent1"/>
+          </a:effectRef>
+          <a:fontRef idx="minor">
+            <a:schemeClr val="lt1"/>
+          </a:fontRef>
+        </p:style>
+        <p:txBody>
+          <a:bodyPr rtlCol="0" anchor="ctr"/>
+          <a:lstStyle/>
+          <a:p>
+            <a:pPr algn="ctr"/>
+            <a:endParaRPr lang="en-US" dirty="0"/>
+          </a:p>
+        </p:txBody>
+      </p:sp>
+      <p:sp>
+        <p:nvSpPr>
+          <p:cNvPr id="13" name="Rectangle 12">
+            <a:extLst>
+              <a:ext uri="{FF2B5EF4-FFF2-40B4-BE49-F238E27FC236}">
+                <a16:creationId xmlns:a16="http://schemas.microsoft.com/office/drawing/2014/main" id="{29FDB030-9B49-4CED-8CCD-4D99382388AC}"/>
+              </a:ext>
+              <a:ext uri="{C183D7F6-B498-43B3-948B-1728B52AA6E4}">
+                <adec:decorative xmlns:adec="http://schemas.microsoft.com/office/drawing/2017/decorative" val="1"/>
+              </a:ext>
+            </a:extLst>
+          </p:cNvPr>
+          <p:cNvSpPr>
+            <a:spLocks noGrp="1" noRot="1" noChangeAspect="1" noMove="1" noResize="1" noEditPoints="1" noAdjustHandles="1" noChangeArrowheads="1" noChangeShapeType="1" noTextEdit="1"/>
+          </p:cNvSpPr>
+          <p:nvPr>
+            <p:extLst>
+              <p:ext uri="{386F3935-93C4-4BCD-93E2-E3B085C9AB24}">
+                <p16:designElem xmlns:p16="http://schemas.microsoft.com/office/powerpoint/2015/main" val="1"/>
+              </p:ext>
+            </p:extLst>
+          </p:nvPr>
+        </p:nvSpPr>
+        <p:spPr>
+          <a:xfrm rot="18900000" flipH="1">
+            <a:off x="891641" y="422146"/>
+            <a:ext cx="645368" cy="645368"/>
+          </a:xfrm>
+          <a:prstGeom prst="rect">
+            <a:avLst/>
+          </a:prstGeom>
+          <a:solidFill>
+            <a:schemeClr val="accent1">
+              <a:alpha val="30000"/>
+            </a:schemeClr>
+          </a:solidFill>
+          <a:ln>
+            <a:noFill/>
+          </a:ln>
+        </p:spPr>
+        <p:style>
+          <a:lnRef idx="2">
+            <a:schemeClr val="accent1">
+              <a:shade val="50000"/>
+            </a:schemeClr>
+          </a:lnRef>
+          <a:fillRef idx="1">
+            <a:schemeClr val="accent1"/>
+          </a:fillRef>
+          <a:effectRef idx="0">
+            <a:schemeClr val="accent1"/>
+          </a:effectRef>
+          <a:fontRef idx="minor">
+            <a:schemeClr val="lt1"/>
+          </a:fontRef>
+        </p:style>
+        <p:txBody>
+          <a:bodyPr rtlCol="0" anchor="ctr"/>
+          <a:lstStyle/>
+          <a:p>
+            <a:pPr algn="ctr"/>
+            <a:endParaRPr lang="en-US"/>
+          </a:p>
+        </p:txBody>
+      </p:sp>
+      <p:sp>
+        <p:nvSpPr>
+          <p:cNvPr id="15" name="Rectangle 14">
+            <a:extLst>
+              <a:ext uri="{FF2B5EF4-FFF2-40B4-BE49-F238E27FC236}">
+                <a16:creationId xmlns:a16="http://schemas.microsoft.com/office/drawing/2014/main" id="{3783CA14-24A1-485C-8B30-D6A5D87987AD}"/>
+              </a:ext>
+              <a:ext uri="{C183D7F6-B498-43B3-948B-1728B52AA6E4}">
+                <adec:decorative xmlns:adec="http://schemas.microsoft.com/office/drawing/2017/decorative" val="1"/>
+              </a:ext>
+            </a:extLst>
+          </p:cNvPr>
+          <p:cNvSpPr>
+            <a:spLocks noGrp="1" noRot="1" noChangeAspect="1" noMove="1" noResize="1" noEditPoints="1" noAdjustHandles="1" noChangeArrowheads="1" noChangeShapeType="1" noTextEdit="1"/>
+          </p:cNvSpPr>
+          <p:nvPr>
+            <p:extLst>
+              <p:ext uri="{386F3935-93C4-4BCD-93E2-E3B085C9AB24}">
+                <p16:designElem xmlns:p16="http://schemas.microsoft.com/office/powerpoint/2015/main" val="1"/>
+              </p:ext>
+            </p:extLst>
+          </p:nvPr>
+        </p:nvSpPr>
+        <p:spPr>
+          <a:xfrm rot="18900000" flipH="1">
+            <a:off x="10043482" y="655140"/>
+            <a:ext cx="687472" cy="687472"/>
+          </a:xfrm>
+          <a:prstGeom prst="rect">
+            <a:avLst/>
+          </a:prstGeom>
+          <a:solidFill>
+            <a:schemeClr val="accent4">
+              <a:alpha val="30000"/>
+            </a:schemeClr>
+          </a:solidFill>
+          <a:ln>
+            <a:noFill/>
+          </a:ln>
+        </p:spPr>
+        <p:style>
+          <a:lnRef idx="2">
+            <a:schemeClr val="accent1">
+              <a:shade val="50000"/>
+            </a:schemeClr>
+          </a:lnRef>
+          <a:fillRef idx="1">
+            <a:schemeClr val="accent1"/>
+          </a:fillRef>
+          <a:effectRef idx="0">
+            <a:schemeClr val="accent1"/>
+          </a:effectRef>
+          <a:fontRef idx="minor">
+            <a:schemeClr val="lt1"/>
+          </a:fontRef>
+        </p:style>
+        <p:txBody>
+          <a:bodyPr rtlCol="0" anchor="ctr"/>
+          <a:lstStyle/>
+          <a:p>
+            <a:pPr algn="ctr"/>
+            <a:endParaRPr lang="en-US"/>
+          </a:p>
+        </p:txBody>
+      </p:sp>
+      <p:sp>
+        <p:nvSpPr>
+          <p:cNvPr id="17" name="Freeform: Shape 16">
+            <a:extLst>
+              <a:ext uri="{FF2B5EF4-FFF2-40B4-BE49-F238E27FC236}">
+                <a16:creationId xmlns:a16="http://schemas.microsoft.com/office/drawing/2014/main" id="{9A97C86A-04D6-40F7-AE84-31AB43E6A846}"/>
+              </a:ext>
+              <a:ext uri="{C183D7F6-B498-43B3-948B-1728B52AA6E4}">
+                <adec:decorative xmlns:adec="http://schemas.microsoft.com/office/drawing/2017/decorative" val="1"/>
+              </a:ext>
+            </a:extLst>
+          </p:cNvPr>
+          <p:cNvSpPr>
+            <a:spLocks noGrp="1" noRot="1" noChangeAspect="1" noMove="1" noResize="1" noEditPoints="1" noAdjustHandles="1" noChangeArrowheads="1" noChangeShapeType="1" noTextEdit="1"/>
+          </p:cNvSpPr>
+          <p:nvPr>
+            <p:extLst>
+              <p:ext uri="{386F3935-93C4-4BCD-93E2-E3B085C9AB24}">
+                <p16:designElem xmlns:p16="http://schemas.microsoft.com/office/powerpoint/2015/main" val="1"/>
+              </p:ext>
+            </p:extLst>
+          </p:nvPr>
+        </p:nvSpPr>
+        <p:spPr>
+          <a:xfrm rot="10800000" flipH="1">
+            <a:off x="9356643" y="0"/>
+            <a:ext cx="2835357" cy="1480837"/>
+          </a:xfrm>
+          <a:custGeom>
+            <a:avLst/>
+            <a:gdLst>
+              <a:gd name="connsiteX0" fmla="*/ 2835357 w 2835357"/>
+              <a:gd name="connsiteY0" fmla="*/ 1480837 h 1480837"/>
+              <a:gd name="connsiteX1" fmla="*/ 0 w 2835357"/>
+              <a:gd name="connsiteY1" fmla="*/ 1480837 h 1480837"/>
+              <a:gd name="connsiteX2" fmla="*/ 1552727 w 2835357"/>
+              <a:gd name="connsiteY2" fmla="*/ 0 h 1480837"/>
+              <a:gd name="connsiteX3" fmla="*/ 2835357 w 2835357"/>
+              <a:gd name="connsiteY3" fmla="*/ 1223245 h 1480837"/>
+            </a:gdLst>
+            <a:ahLst/>
+            <a:cxnLst>
+              <a:cxn ang="0">
+                <a:pos x="connsiteX0" y="connsiteY0"/>
+              </a:cxn>
+              <a:cxn ang="0">
+                <a:pos x="connsiteX1" y="connsiteY1"/>
+              </a:cxn>
+              <a:cxn ang="0">
+                <a:pos x="connsiteX2" y="connsiteY2"/>
+              </a:cxn>
+              <a:cxn ang="0">
+                <a:pos x="connsiteX3" y="connsiteY3"/>
+              </a:cxn>
+            </a:cxnLst>
+            <a:rect l="l" t="t" r="r" b="b"/>
+            <a:pathLst>
+              <a:path w="2835357" h="1480837">
+                <a:moveTo>
+                  <a:pt x="2835357" y="1480837"/>
+                </a:moveTo>
+                <a:lnTo>
+                  <a:pt x="0" y="1480837"/>
+                </a:lnTo>
+                <a:lnTo>
+                  <a:pt x="1552727" y="0"/>
+                </a:lnTo>
+                <a:lnTo>
+                  <a:pt x="2835357" y="1223245"/>
+                </a:lnTo>
+                <a:close/>
+              </a:path>
+            </a:pathLst>
+          </a:custGeom>
+          <a:solidFill>
+            <a:schemeClr val="accent4">
+              <a:alpha val="30000"/>
+            </a:schemeClr>
+          </a:solidFill>
+          <a:ln>
+            <a:noFill/>
+          </a:ln>
+        </p:spPr>
+        <p:style>
+          <a:lnRef idx="2">
+            <a:schemeClr val="accent1">
+              <a:shade val="50000"/>
+            </a:schemeClr>
+          </a:lnRef>
+          <a:fillRef idx="1">
+            <a:schemeClr val="accent1"/>
+          </a:fillRef>
+          <a:effectRef idx="0">
+            <a:schemeClr val="accent1"/>
+          </a:effectRef>
+          <a:fontRef idx="minor">
+            <a:schemeClr val="lt1"/>
+          </a:fontRef>
+        </p:style>
+        <p:txBody>
+          <a:bodyPr wrap="square" rtlCol="0" anchor="ctr">
+            <a:noAutofit/>
+          </a:bodyPr>
+          <a:lstStyle/>
+          <a:p>
+            <a:pPr algn="ctr"/>
+            <a:endParaRPr lang="en-US" dirty="0"/>
+          </a:p>
+        </p:txBody>
+      </p:sp>
+      <p:sp>
+        <p:nvSpPr>
+          <p:cNvPr id="19" name="Isosceles Triangle 18">
+            <a:extLst>
+              <a:ext uri="{FF2B5EF4-FFF2-40B4-BE49-F238E27FC236}">
+                <a16:creationId xmlns:a16="http://schemas.microsoft.com/office/drawing/2014/main" id="{FF9F2414-84E8-453E-B1F3-389FDE8192D9}"/>
+              </a:ext>
+              <a:ext uri="{C183D7F6-B498-43B3-948B-1728B52AA6E4}">
+                <adec:decorative xmlns:adec="http://schemas.microsoft.com/office/drawing/2017/decorative" val="1"/>
+              </a:ext>
+            </a:extLst>
+          </p:cNvPr>
+          <p:cNvSpPr>
+            <a:spLocks noGrp="1" noRot="1" noChangeAspect="1" noMove="1" noResize="1" noEditPoints="1" noAdjustHandles="1" noChangeArrowheads="1" noChangeShapeType="1" noTextEdit="1"/>
+          </p:cNvSpPr>
+          <p:nvPr>
+            <p:extLst>
+              <p:ext uri="{386F3935-93C4-4BCD-93E2-E3B085C9AB24}">
+                <p16:designElem xmlns:p16="http://schemas.microsoft.com/office/powerpoint/2015/main" val="1"/>
+              </p:ext>
+            </p:extLst>
+          </p:nvPr>
+        </p:nvSpPr>
+        <p:spPr>
+          <a:xfrm flipH="1">
+            <a:off x="7976344" y="6115501"/>
+            <a:ext cx="1494513" cy="742499"/>
+          </a:xfrm>
+          <a:prstGeom prst="triangle">
+            <a:avLst/>
+          </a:prstGeom>
+          <a:solidFill>
+            <a:schemeClr val="accent1">
+              <a:alpha val="30000"/>
+            </a:schemeClr>
+          </a:solidFill>
+          <a:ln>
+            <a:noFill/>
+          </a:ln>
+        </p:spPr>
+        <p:style>
+          <a:lnRef idx="2">
+            <a:schemeClr val="accent1">
+              <a:shade val="50000"/>
+            </a:schemeClr>
+          </a:lnRef>
+          <a:fillRef idx="1">
+            <a:schemeClr val="accent1"/>
+          </a:fillRef>
+          <a:effectRef idx="0">
+            <a:schemeClr val="accent1"/>
+          </a:effectRef>
+          <a:fontRef idx="minor">
+            <a:schemeClr val="lt1"/>
+          </a:fontRef>
+        </p:style>
+        <p:txBody>
+          <a:bodyPr rtlCol="0" anchor="ctr"/>
+          <a:lstStyle/>
+          <a:p>
+            <a:pPr algn="ctr"/>
+            <a:endParaRPr lang="en-US"/>
+          </a:p>
+        </p:txBody>
+      </p:sp>
+      <p:sp>
+        <p:nvSpPr>
+          <p:cNvPr id="21" name="Isosceles Triangle 20">
+            <a:extLst>
+              <a:ext uri="{FF2B5EF4-FFF2-40B4-BE49-F238E27FC236}">
+                <a16:creationId xmlns:a16="http://schemas.microsoft.com/office/drawing/2014/main" id="{3ECA69A1-7536-43AC-85EF-C7106179F5ED}"/>
+              </a:ext>
+              <a:ext uri="{C183D7F6-B498-43B3-948B-1728B52AA6E4}">
+                <adec:decorative xmlns:adec="http://schemas.microsoft.com/office/drawing/2017/decorative" val="1"/>
+              </a:ext>
+            </a:extLst>
+          </p:cNvPr>
+          <p:cNvSpPr>
+            <a:spLocks noGrp="1" noRot="1" noChangeAspect="1" noMove="1" noResize="1" noEditPoints="1" noAdjustHandles="1" noChangeArrowheads="1" noChangeShapeType="1" noTextEdit="1"/>
+          </p:cNvSpPr>
+          <p:nvPr>
+            <p:extLst>
+              <p:ext uri="{386F3935-93C4-4BCD-93E2-E3B085C9AB24}">
+                <p16:designElem xmlns:p16="http://schemas.microsoft.com/office/powerpoint/2015/main" val="1"/>
+              </p:ext>
+            </p:extLst>
+          </p:nvPr>
+        </p:nvSpPr>
+        <p:spPr>
+          <a:xfrm flipH="1">
+            <a:off x="7604080" y="6453143"/>
+            <a:ext cx="814903" cy="404857"/>
+          </a:xfrm>
+          <a:prstGeom prst="triangle">
+            <a:avLst/>
+          </a:prstGeom>
+          <a:solidFill>
+            <a:schemeClr val="accent1">
+              <a:alpha val="30000"/>
+            </a:schemeClr>
+          </a:solidFill>
+          <a:ln>
+            <a:noFill/>
+          </a:ln>
+        </p:spPr>
+        <p:style>
+          <a:lnRef idx="2">
+            <a:schemeClr val="accent1">
+              <a:shade val="50000"/>
+            </a:schemeClr>
+          </a:lnRef>
+          <a:fillRef idx="1">
+            <a:schemeClr val="accent1"/>
+          </a:fillRef>
+          <a:effectRef idx="0">
+            <a:schemeClr val="accent1"/>
+          </a:effectRef>
+          <a:fontRef idx="minor">
+            <a:schemeClr val="lt1"/>
+          </a:fontRef>
+        </p:style>
+        <p:txBody>
+          <a:bodyPr rtlCol="0" anchor="ctr"/>
+          <a:lstStyle/>
+          <a:p>
+            <a:pPr algn="ctr"/>
+            <a:endParaRPr lang="en-US"/>
+          </a:p>
+        </p:txBody>
+      </p:sp>
+      <p:grpSp>
+        <p:nvGrpSpPr>
+          <p:cNvPr id="14" name="Groupe 13">
+            <a:extLst>
+              <a:ext uri="{FF2B5EF4-FFF2-40B4-BE49-F238E27FC236}">
+                <a16:creationId xmlns:a16="http://schemas.microsoft.com/office/drawing/2014/main" id="{FBF7806B-25FA-4CEE-8565-4DF5813F69BF}"/>
+              </a:ext>
+            </a:extLst>
+          </p:cNvPr>
+          <p:cNvGrpSpPr/>
+          <p:nvPr/>
+        </p:nvGrpSpPr>
+        <p:grpSpPr>
+          <a:xfrm>
+            <a:off x="2962276" y="643467"/>
+            <a:ext cx="6267447" cy="5571065"/>
+            <a:chOff x="2962276" y="643467"/>
+            <a:chExt cx="6267447" cy="5571065"/>
+          </a:xfrm>
+        </p:grpSpPr>
+        <p:pic>
+          <p:nvPicPr>
+            <p:cNvPr id="4" name="Image 3" descr="Une image contenant texte&#10;&#10;Description générée automatiquement">
+              <a:extLst>
+                <a:ext uri="{FF2B5EF4-FFF2-40B4-BE49-F238E27FC236}">
+                  <a16:creationId xmlns:a16="http://schemas.microsoft.com/office/drawing/2014/main" id="{4C68F23D-B3B9-4114-8801-8C09C4E710C0}"/>
+                </a:ext>
+              </a:extLst>
+            </p:cNvPr>
+            <p:cNvPicPr>
+              <a:picLocks noChangeAspect="1"/>
+            </p:cNvPicPr>
+            <p:nvPr/>
+          </p:nvPicPr>
+          <p:blipFill>
+            <a:blip r:embed="rId2">
+              <a:extLst>
+                <a:ext uri="{28A0092B-C50C-407E-A947-70E740481C1C}">
+                  <a14:useLocalDpi xmlns:a14="http://schemas.microsoft.com/office/drawing/2010/main" val="0"/>
+                </a:ext>
+              </a:extLst>
+            </a:blip>
+            <a:stretch>
+              <a:fillRect/>
+            </a:stretch>
+          </p:blipFill>
+          <p:spPr>
+            <a:xfrm>
+              <a:off x="2962276" y="643467"/>
+              <a:ext cx="6267447" cy="5571065"/>
+            </a:xfrm>
+            <a:prstGeom prst="rect">
+              <a:avLst/>
+            </a:prstGeom>
+            <a:ln>
+              <a:noFill/>
+            </a:ln>
+          </p:spPr>
+        </p:pic>
+        <p:sp>
+          <p:nvSpPr>
+            <p:cNvPr id="5" name="Rectangle 4">
+              <a:extLst>
+                <a:ext uri="{FF2B5EF4-FFF2-40B4-BE49-F238E27FC236}">
+                  <a16:creationId xmlns:a16="http://schemas.microsoft.com/office/drawing/2014/main" id="{88EC63D5-8135-467A-86E9-671233A0FEBB}"/>
+                </a:ext>
+              </a:extLst>
+            </p:cNvPr>
+            <p:cNvSpPr/>
+            <p:nvPr/>
+          </p:nvSpPr>
+          <p:spPr>
+            <a:xfrm>
+              <a:off x="2993458" y="1645920"/>
+              <a:ext cx="6205086" cy="529389"/>
+            </a:xfrm>
+            <a:prstGeom prst="rect">
+              <a:avLst/>
+            </a:prstGeom>
+            <a:solidFill>
+              <a:schemeClr val="bg1"/>
+            </a:solidFill>
+            <a:ln>
+              <a:solidFill>
+                <a:schemeClr val="tx1"/>
+              </a:solidFill>
+            </a:ln>
+          </p:spPr>
+          <p:style>
+            <a:lnRef idx="2">
+              <a:schemeClr val="accent1">
+                <a:shade val="50000"/>
+              </a:schemeClr>
+            </a:lnRef>
+            <a:fillRef idx="1">
+              <a:schemeClr val="accent1"/>
+            </a:fillRef>
+            <a:effectRef idx="0">
+              <a:schemeClr val="accent1"/>
+            </a:effectRef>
+            <a:fontRef idx="minor">
+              <a:schemeClr val="lt1"/>
+            </a:fontRef>
+          </p:style>
+          <p:txBody>
+            <a:bodyPr rtlCol="0" anchor="ctr"/>
+            <a:lstStyle/>
+            <a:p>
+              <a:pPr algn="ctr"/>
+              <a:endParaRPr lang="fr-FR">
+                <a:ln>
+                  <a:solidFill>
+                    <a:sysClr val="windowText" lastClr="000000"/>
+                  </a:solidFill>
+                </a:ln>
+              </a:endParaRPr>
+            </a:p>
+          </p:txBody>
+        </p:sp>
+        <p:pic>
+          <p:nvPicPr>
+            <p:cNvPr id="7" name="Image 6">
+              <a:extLst>
+                <a:ext uri="{FF2B5EF4-FFF2-40B4-BE49-F238E27FC236}">
+                  <a16:creationId xmlns:a16="http://schemas.microsoft.com/office/drawing/2014/main" id="{5ED5D7FE-F85A-4780-83B7-0EC280D9105D}"/>
+                </a:ext>
+              </a:extLst>
+            </p:cNvPr>
+            <p:cNvPicPr>
+              <a:picLocks noChangeAspect="1"/>
+            </p:cNvPicPr>
+            <p:nvPr/>
+          </p:nvPicPr>
+          <p:blipFill>
+            <a:blip r:embed="rId3">
+              <a:extLst>
+                <a:ext uri="{28A0092B-C50C-407E-A947-70E740481C1C}">
+                  <a14:useLocalDpi xmlns:a14="http://schemas.microsoft.com/office/drawing/2010/main" val="0"/>
+                </a:ext>
+              </a:extLst>
+            </a:blip>
+            <a:stretch>
+              <a:fillRect/>
+            </a:stretch>
+          </p:blipFill>
+          <p:spPr>
+            <a:xfrm>
+              <a:off x="3218887" y="1770674"/>
+              <a:ext cx="349294" cy="349294"/>
+            </a:xfrm>
+            <a:prstGeom prst="rect">
+              <a:avLst/>
+            </a:prstGeom>
+          </p:spPr>
+        </p:pic>
+        <p:sp>
+          <p:nvSpPr>
+            <p:cNvPr id="8" name="ZoneTexte 7">
+              <a:extLst>
+                <a:ext uri="{FF2B5EF4-FFF2-40B4-BE49-F238E27FC236}">
+                  <a16:creationId xmlns:a16="http://schemas.microsoft.com/office/drawing/2014/main" id="{D90F4D0F-1A4E-41C6-9900-BA9AB87F607D}"/>
+                </a:ext>
+              </a:extLst>
+            </p:cNvPr>
+            <p:cNvSpPr txBox="1"/>
+            <p:nvPr/>
+          </p:nvSpPr>
+          <p:spPr>
+            <a:xfrm>
+              <a:off x="3940573" y="1725948"/>
+              <a:ext cx="2301201" cy="369332"/>
+            </a:xfrm>
+            <a:prstGeom prst="rect">
+              <a:avLst/>
+            </a:prstGeom>
+            <a:noFill/>
+          </p:spPr>
+          <p:txBody>
+            <a:bodyPr wrap="square" rtlCol="0">
+              <a:spAutoFit/>
+            </a:bodyPr>
+            <a:lstStyle/>
+            <a:p>
+              <a:r>
+                <a:rPr lang="fr-FR" b="1" dirty="0"/>
+                <a:t>Bonjour </a:t>
+              </a:r>
+              <a:r>
+                <a:rPr lang="fr-FR" b="1" i="1" dirty="0"/>
+                <a:t>Nom Prénom</a:t>
+              </a:r>
+              <a:endParaRPr lang="fr-FR" b="1" dirty="0"/>
+            </a:p>
+          </p:txBody>
+        </p:sp>
+        <p:pic>
+          <p:nvPicPr>
+            <p:cNvPr id="12" name="Image 11">
+              <a:extLst>
+                <a:ext uri="{FF2B5EF4-FFF2-40B4-BE49-F238E27FC236}">
+                  <a16:creationId xmlns:a16="http://schemas.microsoft.com/office/drawing/2014/main" id="{940CEE92-FE0A-435B-BBDC-4B123D6B6ADF}"/>
+                </a:ext>
+              </a:extLst>
+            </p:cNvPr>
+            <p:cNvPicPr>
+              <a:picLocks noChangeAspect="1"/>
+            </p:cNvPicPr>
+            <p:nvPr/>
+          </p:nvPicPr>
+          <p:blipFill>
+            <a:blip r:embed="rId4">
+              <a:extLst>
+                <a:ext uri="{28A0092B-C50C-407E-A947-70E740481C1C}">
+                  <a14:useLocalDpi xmlns:a14="http://schemas.microsoft.com/office/drawing/2010/main" val="0"/>
+                </a:ext>
+              </a:extLst>
+            </a:blip>
+            <a:stretch>
+              <a:fillRect/>
+            </a:stretch>
+          </p:blipFill>
+          <p:spPr>
+            <a:xfrm>
+              <a:off x="8418983" y="1714309"/>
+              <a:ext cx="392609" cy="392609"/>
+            </a:xfrm>
+            <a:prstGeom prst="rect">
+              <a:avLst/>
+            </a:prstGeom>
+          </p:spPr>
+        </p:pic>
+        <p:sp>
+          <p:nvSpPr>
+            <p:cNvPr id="18" name="Rectangle : coins arrondis 17">
+              <a:extLst>
+                <a:ext uri="{FF2B5EF4-FFF2-40B4-BE49-F238E27FC236}">
+                  <a16:creationId xmlns:a16="http://schemas.microsoft.com/office/drawing/2014/main" id="{4E30632D-1A5F-44B6-9A2A-68B59AD37FF9}"/>
+                </a:ext>
+              </a:extLst>
+            </p:cNvPr>
+            <p:cNvSpPr/>
+            <p:nvPr/>
+          </p:nvSpPr>
+          <p:spPr>
+            <a:xfrm>
+              <a:off x="3940573" y="2410361"/>
+              <a:ext cx="3499805" cy="2562790"/>
+            </a:xfrm>
+            <a:prstGeom prst="roundRect">
+              <a:avLst/>
+            </a:prstGeom>
+            <a:solidFill>
+              <a:schemeClr val="bg1"/>
+            </a:solidFill>
+            <a:ln>
+              <a:solidFill>
+                <a:schemeClr val="tx1"/>
+              </a:solidFill>
+            </a:ln>
+          </p:spPr>
+          <p:style>
+            <a:lnRef idx="2">
+              <a:schemeClr val="accent1">
+                <a:shade val="50000"/>
+              </a:schemeClr>
+            </a:lnRef>
+            <a:fillRef idx="1">
+              <a:schemeClr val="accent1"/>
+            </a:fillRef>
+            <a:effectRef idx="0">
+              <a:schemeClr val="accent1"/>
+            </a:effectRef>
+            <a:fontRef idx="minor">
+              <a:schemeClr val="lt1"/>
+            </a:fontRef>
+          </p:style>
+          <p:txBody>
+            <a:bodyPr rtlCol="0" anchor="ctr"/>
+            <a:lstStyle/>
+            <a:p>
+              <a:pPr algn="ctr"/>
+              <a:endParaRPr lang="fr-FR"/>
+            </a:p>
+          </p:txBody>
+        </p:sp>
+        <p:pic>
+          <p:nvPicPr>
+            <p:cNvPr id="20" name="Image 19">
+              <a:extLst>
+                <a:ext uri="{FF2B5EF4-FFF2-40B4-BE49-F238E27FC236}">
+                  <a16:creationId xmlns:a16="http://schemas.microsoft.com/office/drawing/2014/main" id="{8E8E0EB1-86F2-41E4-B995-BDE79EF92E5F}"/>
+                </a:ext>
+              </a:extLst>
+            </p:cNvPr>
+            <p:cNvPicPr>
+              <a:picLocks noChangeAspect="1"/>
+            </p:cNvPicPr>
+            <p:nvPr/>
+          </p:nvPicPr>
+          <p:blipFill>
+            <a:blip r:embed="rId5">
+              <a:extLst>
+                <a:ext uri="{28A0092B-C50C-407E-A947-70E740481C1C}">
+                  <a14:useLocalDpi xmlns:a14="http://schemas.microsoft.com/office/drawing/2010/main" val="0"/>
+                </a:ext>
+              </a:extLst>
+            </a:blip>
+            <a:stretch>
+              <a:fillRect/>
+            </a:stretch>
+          </p:blipFill>
+          <p:spPr>
+            <a:xfrm>
+              <a:off x="7656053" y="4397844"/>
+              <a:ext cx="1306104" cy="1150615"/>
+            </a:xfrm>
+            <a:prstGeom prst="rect">
+              <a:avLst/>
+            </a:prstGeom>
+            <a:ln>
+              <a:solidFill>
+                <a:schemeClr val="tx1"/>
+              </a:solidFill>
+            </a:ln>
+          </p:spPr>
+        </p:pic>
+        <p:pic>
+          <p:nvPicPr>
+            <p:cNvPr id="22" name="Image 21">
+              <a:extLst>
+                <a:ext uri="{FF2B5EF4-FFF2-40B4-BE49-F238E27FC236}">
+                  <a16:creationId xmlns:a16="http://schemas.microsoft.com/office/drawing/2014/main" id="{38D850FA-7072-4603-B86F-8F5DC87391F3}"/>
+                </a:ext>
+              </a:extLst>
+            </p:cNvPr>
+            <p:cNvPicPr>
+              <a:picLocks noChangeAspect="1"/>
+            </p:cNvPicPr>
+            <p:nvPr/>
+          </p:nvPicPr>
+          <p:blipFill>
+            <a:blip r:embed="rId6">
+              <a:extLst>
+                <a:ext uri="{28A0092B-C50C-407E-A947-70E740481C1C}">
+                  <a14:useLocalDpi xmlns:a14="http://schemas.microsoft.com/office/drawing/2010/main" val="0"/>
+                </a:ext>
+              </a:extLst>
+            </a:blip>
+            <a:stretch>
+              <a:fillRect/>
+            </a:stretch>
+          </p:blipFill>
+          <p:spPr>
+            <a:xfrm>
+              <a:off x="5255322" y="2410361"/>
+              <a:ext cx="1213395" cy="1213395"/>
+            </a:xfrm>
+            <a:prstGeom prst="rect">
+              <a:avLst/>
+            </a:prstGeom>
+          </p:spPr>
+        </p:pic>
+        <p:sp>
+          <p:nvSpPr>
+            <p:cNvPr id="23" name="ZoneTexte 22">
+              <a:extLst>
+                <a:ext uri="{FF2B5EF4-FFF2-40B4-BE49-F238E27FC236}">
+                  <a16:creationId xmlns:a16="http://schemas.microsoft.com/office/drawing/2014/main" id="{3566923C-4646-4BC6-9B2F-26C3E88B696A}"/>
+                </a:ext>
+              </a:extLst>
+            </p:cNvPr>
+            <p:cNvSpPr txBox="1"/>
+            <p:nvPr/>
+          </p:nvSpPr>
+          <p:spPr>
+            <a:xfrm>
+              <a:off x="4193989" y="4117931"/>
+              <a:ext cx="1417739" cy="400110"/>
+            </a:xfrm>
+            <a:prstGeom prst="rect">
+              <a:avLst/>
+            </a:prstGeom>
+            <a:noFill/>
+          </p:spPr>
+          <p:txBody>
+            <a:bodyPr wrap="square" rtlCol="0">
+              <a:spAutoFit/>
+            </a:bodyPr>
+            <a:lstStyle/>
+            <a:p>
+              <a:r>
+                <a:rPr lang="fr-FR" sz="2000" b="1" dirty="0"/>
+                <a:t>T= 20°C</a:t>
+              </a:r>
+            </a:p>
+          </p:txBody>
+        </p:sp>
+        <p:sp>
+          <p:nvSpPr>
+            <p:cNvPr id="24" name="ZoneTexte 23">
+              <a:extLst>
+                <a:ext uri="{FF2B5EF4-FFF2-40B4-BE49-F238E27FC236}">
+                  <a16:creationId xmlns:a16="http://schemas.microsoft.com/office/drawing/2014/main" id="{7798461C-E0CA-4A14-BF91-8A2593DE61DB}"/>
+                </a:ext>
+              </a:extLst>
+            </p:cNvPr>
+            <p:cNvSpPr txBox="1"/>
+            <p:nvPr/>
+          </p:nvSpPr>
+          <p:spPr>
+            <a:xfrm>
+              <a:off x="5287531" y="4117931"/>
+              <a:ext cx="1899181" cy="400110"/>
+            </a:xfrm>
+            <a:prstGeom prst="rect">
+              <a:avLst/>
+            </a:prstGeom>
+            <a:noFill/>
+          </p:spPr>
+          <p:txBody>
+            <a:bodyPr wrap="square" rtlCol="0">
+              <a:spAutoFit/>
+            </a:bodyPr>
+            <a:lstStyle/>
+            <a:p>
+              <a:r>
+                <a:rPr lang="fr-FR" sz="2000" b="1" dirty="0"/>
+                <a:t>Humidité = 40%</a:t>
+              </a:r>
+            </a:p>
+          </p:txBody>
+        </p:sp>
+        <p:sp>
+          <p:nvSpPr>
+            <p:cNvPr id="25" name="ZoneTexte 24">
+              <a:extLst>
+                <a:ext uri="{FF2B5EF4-FFF2-40B4-BE49-F238E27FC236}">
+                  <a16:creationId xmlns:a16="http://schemas.microsoft.com/office/drawing/2014/main" id="{A6107352-3010-42DE-83EA-CB52ED75AF45}"/>
+                </a:ext>
+              </a:extLst>
+            </p:cNvPr>
+            <p:cNvSpPr txBox="1"/>
+            <p:nvPr/>
+          </p:nvSpPr>
+          <p:spPr>
+            <a:xfrm>
+              <a:off x="5043378" y="3649158"/>
+              <a:ext cx="1577130" cy="369332"/>
+            </a:xfrm>
+            <a:prstGeom prst="rect">
+              <a:avLst/>
+            </a:prstGeom>
+            <a:noFill/>
+          </p:spPr>
+          <p:txBody>
+            <a:bodyPr wrap="square" rtlCol="0">
+              <a:spAutoFit/>
+            </a:bodyPr>
+            <a:lstStyle/>
+            <a:p>
+              <a:pPr algn="ctr"/>
+              <a:r>
+                <a:rPr lang="fr-FR" b="1" dirty="0"/>
+                <a:t>Ensoleillé</a:t>
+              </a:r>
+            </a:p>
+          </p:txBody>
+        </p:sp>
+        <p:sp>
+          <p:nvSpPr>
+            <p:cNvPr id="26" name="ZoneTexte 25">
+              <a:extLst>
+                <a:ext uri="{FF2B5EF4-FFF2-40B4-BE49-F238E27FC236}">
+                  <a16:creationId xmlns:a16="http://schemas.microsoft.com/office/drawing/2014/main" id="{C26C0985-58EC-40B2-A220-27FBE9F787C9}"/>
+                </a:ext>
+              </a:extLst>
+            </p:cNvPr>
+            <p:cNvSpPr txBox="1"/>
+            <p:nvPr/>
+          </p:nvSpPr>
+          <p:spPr>
+            <a:xfrm>
+              <a:off x="4193989" y="4516618"/>
+              <a:ext cx="1671155" cy="400110"/>
+            </a:xfrm>
+            <a:prstGeom prst="rect">
+              <a:avLst/>
+            </a:prstGeom>
+            <a:noFill/>
+          </p:spPr>
+          <p:txBody>
+            <a:bodyPr wrap="square" rtlCol="0">
+              <a:spAutoFit/>
+            </a:bodyPr>
+            <a:lstStyle/>
+            <a:p>
+              <a:r>
+                <a:rPr lang="fr-FR" sz="2000" b="1" dirty="0"/>
+                <a:t>12/02/2021</a:t>
+              </a:r>
+            </a:p>
+          </p:txBody>
+        </p:sp>
+        <p:sp>
+          <p:nvSpPr>
+            <p:cNvPr id="27" name="ZoneTexte 26">
+              <a:extLst>
+                <a:ext uri="{FF2B5EF4-FFF2-40B4-BE49-F238E27FC236}">
+                  <a16:creationId xmlns:a16="http://schemas.microsoft.com/office/drawing/2014/main" id="{20859A85-3141-48E8-906A-821529216FB4}"/>
+                </a:ext>
+              </a:extLst>
+            </p:cNvPr>
+            <p:cNvSpPr txBox="1"/>
+            <p:nvPr/>
+          </p:nvSpPr>
+          <p:spPr>
+            <a:xfrm>
+              <a:off x="5690351" y="4516618"/>
+              <a:ext cx="1671155" cy="400110"/>
+            </a:xfrm>
+            <a:prstGeom prst="rect">
+              <a:avLst/>
+            </a:prstGeom>
+            <a:noFill/>
+          </p:spPr>
+          <p:txBody>
+            <a:bodyPr wrap="square" rtlCol="0">
+              <a:spAutoFit/>
+            </a:bodyPr>
+            <a:lstStyle/>
+            <a:p>
+              <a:r>
+                <a:rPr lang="fr-FR" sz="2000" b="1" dirty="0"/>
+                <a:t>15h00</a:t>
+              </a:r>
+            </a:p>
+          </p:txBody>
+        </p:sp>
+      </p:grpSp>
+    </p:spTree>
+    <p:extLst>
+      <p:ext uri="{BB962C8B-B14F-4D97-AF65-F5344CB8AC3E}">
+        <p14:creationId xmlns:p14="http://schemas.microsoft.com/office/powerpoint/2010/main" val="290798235"/>
+      </p:ext>
+    </p:extLst>
+  </p:cSld>
+  <p:clrMapOvr>
+    <a:masterClrMapping/>
+  </p:clrMapOvr>
+</p:sld>
+</file>
+
+<file path=ppt/slides/slide4.xml><?xml version="1.0" encoding="utf-8"?>
+<p:sld xmlns:a="http://schemas.openxmlformats.org/drawingml/2006/main" xmlns:r="http://schemas.openxmlformats.org/officeDocument/2006/relationships" xmlns:p="http://schemas.openxmlformats.org/presentationml/2006/main">
+  <p:cSld>
+    <p:spTree>
+      <p:nvGrpSpPr>
+        <p:cNvPr id="1" name=""/>
+        <p:cNvGrpSpPr/>
+        <p:nvPr/>
+      </p:nvGrpSpPr>
+      <p:grpSpPr>
+        <a:xfrm>
+          <a:off x="0" y="0"/>
+          <a:ext cx="0" cy="0"/>
+          <a:chOff x="0" y="0"/>
+          <a:chExt cx="0" cy="0"/>
+        </a:xfrm>
+      </p:grpSpPr>
+      <p:pic>
+        <p:nvPicPr>
+          <p:cNvPr id="6" name="Image 5" descr="Une image contenant texte&#10;&#10;Description générée automatiquement">
+            <a:extLst>
+              <a:ext uri="{FF2B5EF4-FFF2-40B4-BE49-F238E27FC236}">
+                <a16:creationId xmlns:a16="http://schemas.microsoft.com/office/drawing/2014/main" id="{9A0211BA-1415-4D7F-82BF-349D2BBBA25B}"/>
+              </a:ext>
+            </a:extLst>
+          </p:cNvPr>
+          <p:cNvPicPr>
+            <a:picLocks noChangeAspect="1"/>
+          </p:cNvPicPr>
+          <p:nvPr/>
+        </p:nvPicPr>
+        <p:blipFill>
+          <a:blip r:embed="rId2">
+            <a:extLst>
+              <a:ext uri="{28A0092B-C50C-407E-A947-70E740481C1C}">
+                <a14:useLocalDpi xmlns:a14="http://schemas.microsoft.com/office/drawing/2010/main" val="0"/>
+              </a:ext>
+            </a:extLst>
+          </a:blip>
+          <a:stretch>
+            <a:fillRect/>
+          </a:stretch>
+        </p:blipFill>
+        <p:spPr>
+          <a:xfrm>
+            <a:off x="2962276" y="643467"/>
+            <a:ext cx="6267447" cy="5571065"/>
+          </a:xfrm>
+          <a:prstGeom prst="rect">
+            <a:avLst/>
+          </a:prstGeom>
+          <a:ln>
+            <a:noFill/>
+          </a:ln>
+        </p:spPr>
+      </p:pic>
+      <p:sp>
+        <p:nvSpPr>
+          <p:cNvPr id="7" name="Rectangle 6">
+            <a:extLst>
+              <a:ext uri="{FF2B5EF4-FFF2-40B4-BE49-F238E27FC236}">
+                <a16:creationId xmlns:a16="http://schemas.microsoft.com/office/drawing/2014/main" id="{437EF97B-9E19-42E3-A2DA-27CCD2C9EF24}"/>
+              </a:ext>
+            </a:extLst>
+          </p:cNvPr>
+          <p:cNvSpPr/>
+          <p:nvPr/>
+        </p:nvSpPr>
+        <p:spPr>
+          <a:xfrm>
+            <a:off x="2993458" y="1645920"/>
+            <a:ext cx="6205086" cy="529389"/>
+          </a:xfrm>
+          <a:prstGeom prst="rect">
+            <a:avLst/>
+          </a:prstGeom>
+          <a:solidFill>
+            <a:schemeClr val="bg1"/>
+          </a:solidFill>
+          <a:ln>
+            <a:solidFill>
+              <a:schemeClr val="tx1"/>
+            </a:solidFill>
+          </a:ln>
+        </p:spPr>
+        <p:style>
+          <a:lnRef idx="2">
+            <a:schemeClr val="accent1">
+              <a:shade val="50000"/>
+            </a:schemeClr>
+          </a:lnRef>
+          <a:fillRef idx="1">
+            <a:schemeClr val="accent1"/>
+          </a:fillRef>
+          <a:effectRef idx="0">
+            <a:schemeClr val="accent1"/>
+          </a:effectRef>
+          <a:fontRef idx="minor">
+            <a:schemeClr val="lt1"/>
+          </a:fontRef>
+        </p:style>
+        <p:txBody>
+          <a:bodyPr rtlCol="0" anchor="ctr"/>
+          <a:lstStyle/>
+          <a:p>
+            <a:pPr algn="ctr"/>
+            <a:endParaRPr lang="fr-FR">
+              <a:ln>
+                <a:solidFill>
+                  <a:sysClr val="windowText" lastClr="000000"/>
+                </a:solidFill>
+              </a:ln>
+            </a:endParaRPr>
+          </a:p>
+        </p:txBody>
+      </p:sp>
+      <p:pic>
+        <p:nvPicPr>
+          <p:cNvPr id="8" name="Image 7">
+            <a:extLst>
+              <a:ext uri="{FF2B5EF4-FFF2-40B4-BE49-F238E27FC236}">
+                <a16:creationId xmlns:a16="http://schemas.microsoft.com/office/drawing/2014/main" id="{809EFD1F-CCCF-4356-991F-078B80135F2A}"/>
+              </a:ext>
+            </a:extLst>
+          </p:cNvPr>
+          <p:cNvPicPr>
+            <a:picLocks noChangeAspect="1"/>
+          </p:cNvPicPr>
+          <p:nvPr/>
+        </p:nvPicPr>
+        <p:blipFill>
+          <a:blip r:embed="rId3">
+            <a:extLst>
+              <a:ext uri="{28A0092B-C50C-407E-A947-70E740481C1C}">
+                <a14:useLocalDpi xmlns:a14="http://schemas.microsoft.com/office/drawing/2010/main" val="0"/>
+              </a:ext>
+            </a:extLst>
+          </a:blip>
+          <a:stretch>
+            <a:fillRect/>
+          </a:stretch>
+        </p:blipFill>
+        <p:spPr>
+          <a:xfrm>
+            <a:off x="3218887" y="1770674"/>
+            <a:ext cx="349294" cy="349294"/>
+          </a:xfrm>
+          <a:prstGeom prst="rect">
+            <a:avLst/>
+          </a:prstGeom>
+        </p:spPr>
+      </p:pic>
+      <p:sp>
+        <p:nvSpPr>
+          <p:cNvPr id="9" name="ZoneTexte 8">
+            <a:extLst>
+              <a:ext uri="{FF2B5EF4-FFF2-40B4-BE49-F238E27FC236}">
+                <a16:creationId xmlns:a16="http://schemas.microsoft.com/office/drawing/2014/main" id="{5E2A857F-36CC-4EE6-BC3A-447686BE26DF}"/>
+              </a:ext>
+            </a:extLst>
+          </p:cNvPr>
+          <p:cNvSpPr txBox="1"/>
+          <p:nvPr/>
+        </p:nvSpPr>
+        <p:spPr>
+          <a:xfrm>
+            <a:off x="3940573" y="1725948"/>
+            <a:ext cx="2301201" cy="369332"/>
+          </a:xfrm>
+          <a:prstGeom prst="rect">
+            <a:avLst/>
+          </a:prstGeom>
+          <a:noFill/>
+        </p:spPr>
+        <p:txBody>
+          <a:bodyPr wrap="square" rtlCol="0">
+            <a:spAutoFit/>
+          </a:bodyPr>
+          <a:lstStyle/>
+          <a:p>
+            <a:r>
+              <a:rPr lang="fr-FR" b="1" dirty="0"/>
+              <a:t>Bonjour </a:t>
+            </a:r>
+            <a:r>
+              <a:rPr lang="fr-FR" b="1" i="1" dirty="0"/>
+              <a:t>Nom Prénom</a:t>
+            </a:r>
+            <a:endParaRPr lang="fr-FR" b="1" dirty="0"/>
+          </a:p>
+        </p:txBody>
+      </p:sp>
+      <p:pic>
+        <p:nvPicPr>
+          <p:cNvPr id="10" name="Image 9">
+            <a:extLst>
+              <a:ext uri="{FF2B5EF4-FFF2-40B4-BE49-F238E27FC236}">
+                <a16:creationId xmlns:a16="http://schemas.microsoft.com/office/drawing/2014/main" id="{67D90AF8-4440-4A55-BD86-722C14199E99}"/>
+              </a:ext>
+            </a:extLst>
+          </p:cNvPr>
+          <p:cNvPicPr>
+            <a:picLocks noChangeAspect="1"/>
+          </p:cNvPicPr>
+          <p:nvPr/>
+        </p:nvPicPr>
+        <p:blipFill>
+          <a:blip r:embed="rId4">
+            <a:extLst>
+              <a:ext uri="{28A0092B-C50C-407E-A947-70E740481C1C}">
+                <a14:useLocalDpi xmlns:a14="http://schemas.microsoft.com/office/drawing/2010/main" val="0"/>
+              </a:ext>
+            </a:extLst>
+          </a:blip>
+          <a:stretch>
+            <a:fillRect/>
+          </a:stretch>
+        </p:blipFill>
+        <p:spPr>
+          <a:xfrm>
+            <a:off x="8418983" y="1714309"/>
+            <a:ext cx="392609" cy="392609"/>
+          </a:xfrm>
+          <a:prstGeom prst="rect">
+            <a:avLst/>
+          </a:prstGeom>
+        </p:spPr>
+      </p:pic>
+      <p:pic>
+        <p:nvPicPr>
+          <p:cNvPr id="12" name="Image 11">
+            <a:extLst>
+              <a:ext uri="{FF2B5EF4-FFF2-40B4-BE49-F238E27FC236}">
+                <a16:creationId xmlns:a16="http://schemas.microsoft.com/office/drawing/2014/main" id="{C48DF025-89C0-40E9-8674-EE93E357C7C1}"/>
+              </a:ext>
+            </a:extLst>
+          </p:cNvPr>
+          <p:cNvPicPr>
+            <a:picLocks noChangeAspect="1"/>
+          </p:cNvPicPr>
+          <p:nvPr/>
+        </p:nvPicPr>
+        <p:blipFill>
+          <a:blip r:embed="rId5">
+            <a:extLst>
+              <a:ext uri="{28A0092B-C50C-407E-A947-70E740481C1C}">
+                <a14:useLocalDpi xmlns:a14="http://schemas.microsoft.com/office/drawing/2010/main" val="0"/>
+              </a:ext>
+            </a:extLst>
+          </a:blip>
+          <a:stretch>
+            <a:fillRect/>
+          </a:stretch>
+        </p:blipFill>
+        <p:spPr>
+          <a:xfrm>
+            <a:off x="7704056" y="4365076"/>
+            <a:ext cx="1306104" cy="1150615"/>
+          </a:xfrm>
+          <a:prstGeom prst="rect">
+            <a:avLst/>
+          </a:prstGeom>
+          <a:ln>
+            <a:solidFill>
+              <a:schemeClr val="tx1"/>
+            </a:solidFill>
+          </a:ln>
+        </p:spPr>
+      </p:pic>
+      <p:grpSp>
+        <p:nvGrpSpPr>
+          <p:cNvPr id="19" name="Groupe 18">
+            <a:extLst>
+              <a:ext uri="{FF2B5EF4-FFF2-40B4-BE49-F238E27FC236}">
+                <a16:creationId xmlns:a16="http://schemas.microsoft.com/office/drawing/2014/main" id="{A6737C6F-B9AE-4891-AC2D-96D42E6E805F}"/>
+              </a:ext>
+            </a:extLst>
+          </p:cNvPr>
+          <p:cNvGrpSpPr/>
+          <p:nvPr/>
+        </p:nvGrpSpPr>
+        <p:grpSpPr>
+          <a:xfrm>
+            <a:off x="4827856" y="2422935"/>
+            <a:ext cx="2827835" cy="2194583"/>
+            <a:chOff x="3940573" y="2410361"/>
+            <a:chExt cx="3499805" cy="2562790"/>
+          </a:xfrm>
+        </p:grpSpPr>
+        <p:sp>
+          <p:nvSpPr>
+            <p:cNvPr id="11" name="Rectangle : coins arrondis 10">
+              <a:extLst>
+                <a:ext uri="{FF2B5EF4-FFF2-40B4-BE49-F238E27FC236}">
+                  <a16:creationId xmlns:a16="http://schemas.microsoft.com/office/drawing/2014/main" id="{0903D145-BC64-4A46-9C2D-5E87F2E9ACD0}"/>
+                </a:ext>
+              </a:extLst>
+            </p:cNvPr>
+            <p:cNvSpPr/>
+            <p:nvPr/>
+          </p:nvSpPr>
+          <p:spPr>
+            <a:xfrm>
+              <a:off x="3940573" y="2410361"/>
+              <a:ext cx="3499805" cy="2562790"/>
+            </a:xfrm>
+            <a:prstGeom prst="roundRect">
+              <a:avLst/>
+            </a:prstGeom>
+            <a:solidFill>
+              <a:schemeClr val="bg1"/>
+            </a:solidFill>
+            <a:ln>
+              <a:solidFill>
+                <a:schemeClr val="tx1"/>
+              </a:solidFill>
+            </a:ln>
+          </p:spPr>
+          <p:style>
+            <a:lnRef idx="2">
+              <a:schemeClr val="accent1">
+                <a:shade val="50000"/>
+              </a:schemeClr>
+            </a:lnRef>
+            <a:fillRef idx="1">
+              <a:schemeClr val="accent1"/>
+            </a:fillRef>
+            <a:effectRef idx="0">
+              <a:schemeClr val="accent1"/>
+            </a:effectRef>
+            <a:fontRef idx="minor">
+              <a:schemeClr val="lt1"/>
+            </a:fontRef>
+          </p:style>
+          <p:txBody>
+            <a:bodyPr rtlCol="0" anchor="ctr"/>
+            <a:lstStyle/>
+            <a:p>
+              <a:pPr algn="ctr"/>
+              <a:endParaRPr lang="fr-FR"/>
+            </a:p>
+          </p:txBody>
+        </p:sp>
+        <p:pic>
+          <p:nvPicPr>
+            <p:cNvPr id="13" name="Image 12">
+              <a:extLst>
+                <a:ext uri="{FF2B5EF4-FFF2-40B4-BE49-F238E27FC236}">
+                  <a16:creationId xmlns:a16="http://schemas.microsoft.com/office/drawing/2014/main" id="{096F4E84-AC5E-418C-BCE6-F34F5D8E9B79}"/>
+                </a:ext>
+              </a:extLst>
+            </p:cNvPr>
+            <p:cNvPicPr>
+              <a:picLocks noChangeAspect="1"/>
+            </p:cNvPicPr>
+            <p:nvPr/>
+          </p:nvPicPr>
+          <p:blipFill>
+            <a:blip r:embed="rId6">
+              <a:extLst>
+                <a:ext uri="{28A0092B-C50C-407E-A947-70E740481C1C}">
+                  <a14:useLocalDpi xmlns:a14="http://schemas.microsoft.com/office/drawing/2010/main" val="0"/>
+                </a:ext>
+              </a:extLst>
+            </a:blip>
+            <a:stretch>
+              <a:fillRect/>
+            </a:stretch>
+          </p:blipFill>
+          <p:spPr>
+            <a:xfrm>
+              <a:off x="5255322" y="2410361"/>
+              <a:ext cx="1213395" cy="1213395"/>
+            </a:xfrm>
+            <a:prstGeom prst="rect">
+              <a:avLst/>
+            </a:prstGeom>
+          </p:spPr>
+        </p:pic>
+        <p:sp>
+          <p:nvSpPr>
+            <p:cNvPr id="14" name="ZoneTexte 13">
+              <a:extLst>
+                <a:ext uri="{FF2B5EF4-FFF2-40B4-BE49-F238E27FC236}">
+                  <a16:creationId xmlns:a16="http://schemas.microsoft.com/office/drawing/2014/main" id="{FDBADB00-8ED7-4A70-A6D7-4D90D1E91E7B}"/>
+                </a:ext>
+              </a:extLst>
+            </p:cNvPr>
+            <p:cNvSpPr txBox="1"/>
+            <p:nvPr/>
+          </p:nvSpPr>
+          <p:spPr>
+            <a:xfrm>
+              <a:off x="4193990" y="4117931"/>
+              <a:ext cx="1417739" cy="359416"/>
+            </a:xfrm>
+            <a:prstGeom prst="rect">
+              <a:avLst/>
+            </a:prstGeom>
+            <a:noFill/>
+          </p:spPr>
+          <p:txBody>
+            <a:bodyPr wrap="square" rtlCol="0">
+              <a:spAutoFit/>
+            </a:bodyPr>
+            <a:lstStyle/>
+            <a:p>
+              <a:r>
+                <a:rPr lang="fr-FR" sz="1400" b="1" dirty="0"/>
+                <a:t>T= 20°C</a:t>
+              </a:r>
+            </a:p>
+          </p:txBody>
+        </p:sp>
+        <p:sp>
+          <p:nvSpPr>
+            <p:cNvPr id="15" name="ZoneTexte 14">
+              <a:extLst>
+                <a:ext uri="{FF2B5EF4-FFF2-40B4-BE49-F238E27FC236}">
+                  <a16:creationId xmlns:a16="http://schemas.microsoft.com/office/drawing/2014/main" id="{9C6B0E82-5847-4177-8D84-F411E9A94BA9}"/>
+                </a:ext>
+              </a:extLst>
+            </p:cNvPr>
+            <p:cNvSpPr txBox="1"/>
+            <p:nvPr/>
+          </p:nvSpPr>
+          <p:spPr>
+            <a:xfrm>
+              <a:off x="5287531" y="4117931"/>
+              <a:ext cx="1899181" cy="359416"/>
+            </a:xfrm>
+            <a:prstGeom prst="rect">
+              <a:avLst/>
+            </a:prstGeom>
+            <a:noFill/>
+          </p:spPr>
+          <p:txBody>
+            <a:bodyPr wrap="square" rtlCol="0">
+              <a:spAutoFit/>
+            </a:bodyPr>
+            <a:lstStyle/>
+            <a:p>
+              <a:r>
+                <a:rPr lang="fr-FR" sz="1400" b="1" dirty="0"/>
+                <a:t>Humidité = 40%</a:t>
+              </a:r>
+            </a:p>
+          </p:txBody>
+        </p:sp>
+        <p:sp>
+          <p:nvSpPr>
+            <p:cNvPr id="16" name="ZoneTexte 15">
+              <a:extLst>
+                <a:ext uri="{FF2B5EF4-FFF2-40B4-BE49-F238E27FC236}">
+                  <a16:creationId xmlns:a16="http://schemas.microsoft.com/office/drawing/2014/main" id="{8C974238-613A-4A22-A57F-578BBB6C0608}"/>
+                </a:ext>
+              </a:extLst>
+            </p:cNvPr>
+            <p:cNvSpPr txBox="1"/>
+            <p:nvPr/>
+          </p:nvSpPr>
+          <p:spPr>
+            <a:xfrm>
+              <a:off x="5043378" y="3649158"/>
+              <a:ext cx="1577130" cy="369332"/>
+            </a:xfrm>
+            <a:prstGeom prst="rect">
+              <a:avLst/>
+            </a:prstGeom>
+            <a:noFill/>
+          </p:spPr>
+          <p:txBody>
+            <a:bodyPr wrap="square" rtlCol="0">
+              <a:spAutoFit/>
+            </a:bodyPr>
+            <a:lstStyle/>
+            <a:p>
+              <a:pPr algn="ctr"/>
+              <a:r>
+                <a:rPr lang="fr-FR" b="1" dirty="0"/>
+                <a:t>Ensoleillé</a:t>
+              </a:r>
+            </a:p>
+          </p:txBody>
+        </p:sp>
+        <p:sp>
+          <p:nvSpPr>
+            <p:cNvPr id="17" name="ZoneTexte 16">
+              <a:extLst>
+                <a:ext uri="{FF2B5EF4-FFF2-40B4-BE49-F238E27FC236}">
+                  <a16:creationId xmlns:a16="http://schemas.microsoft.com/office/drawing/2014/main" id="{4ECC2BF0-C308-4F07-B233-A4769436A947}"/>
+                </a:ext>
+              </a:extLst>
+            </p:cNvPr>
+            <p:cNvSpPr txBox="1"/>
+            <p:nvPr/>
+          </p:nvSpPr>
+          <p:spPr>
+            <a:xfrm>
+              <a:off x="4193990" y="4516618"/>
+              <a:ext cx="1671155" cy="323474"/>
+            </a:xfrm>
+            <a:prstGeom prst="rect">
+              <a:avLst/>
+            </a:prstGeom>
+            <a:noFill/>
+          </p:spPr>
+          <p:txBody>
+            <a:bodyPr wrap="square" rtlCol="0">
+              <a:spAutoFit/>
+            </a:bodyPr>
+            <a:lstStyle/>
+            <a:p>
+              <a:r>
+                <a:rPr lang="fr-FR" sz="1200" b="1" dirty="0"/>
+                <a:t>12/02/2021</a:t>
+              </a:r>
+            </a:p>
+          </p:txBody>
+        </p:sp>
+        <p:sp>
+          <p:nvSpPr>
+            <p:cNvPr id="18" name="ZoneTexte 17">
+              <a:extLst>
+                <a:ext uri="{FF2B5EF4-FFF2-40B4-BE49-F238E27FC236}">
+                  <a16:creationId xmlns:a16="http://schemas.microsoft.com/office/drawing/2014/main" id="{4A6555F5-3FA9-49B8-8C61-ADA55886C6C0}"/>
+                </a:ext>
+              </a:extLst>
+            </p:cNvPr>
+            <p:cNvSpPr txBox="1"/>
+            <p:nvPr/>
+          </p:nvSpPr>
+          <p:spPr>
+            <a:xfrm>
+              <a:off x="5690351" y="4516618"/>
+              <a:ext cx="1671155" cy="323474"/>
+            </a:xfrm>
+            <a:prstGeom prst="rect">
+              <a:avLst/>
+            </a:prstGeom>
+            <a:noFill/>
+          </p:spPr>
+          <p:txBody>
+            <a:bodyPr wrap="square" rtlCol="0">
+              <a:spAutoFit/>
+            </a:bodyPr>
+            <a:lstStyle/>
+            <a:p>
+              <a:r>
+                <a:rPr lang="fr-FR" sz="1200" b="1" dirty="0"/>
+                <a:t>15h00</a:t>
+              </a:r>
+            </a:p>
+          </p:txBody>
+        </p:sp>
+      </p:grpSp>
+      <p:sp>
+        <p:nvSpPr>
+          <p:cNvPr id="20" name="Rectangle 19">
+            <a:extLst>
+              <a:ext uri="{FF2B5EF4-FFF2-40B4-BE49-F238E27FC236}">
+                <a16:creationId xmlns:a16="http://schemas.microsoft.com/office/drawing/2014/main" id="{559724CF-3336-4D37-8754-08EF435203D5}"/>
+              </a:ext>
+            </a:extLst>
+          </p:cNvPr>
+          <p:cNvSpPr/>
+          <p:nvPr/>
+        </p:nvSpPr>
+        <p:spPr>
+          <a:xfrm>
+            <a:off x="2993458" y="2186946"/>
+            <a:ext cx="1247238" cy="3630758"/>
+          </a:xfrm>
+          <a:prstGeom prst="rect">
+            <a:avLst/>
+          </a:prstGeom>
+          <a:solidFill>
+            <a:schemeClr val="bg1"/>
+          </a:solidFill>
+          <a:ln>
+            <a:solidFill>
+              <a:schemeClr val="tx1"/>
+            </a:solidFill>
+          </a:ln>
+        </p:spPr>
+        <p:style>
+          <a:lnRef idx="2">
+            <a:schemeClr val="accent1">
+              <a:shade val="50000"/>
+            </a:schemeClr>
+          </a:lnRef>
+          <a:fillRef idx="1">
+            <a:schemeClr val="accent1"/>
+          </a:fillRef>
+          <a:effectRef idx="0">
+            <a:schemeClr val="accent1"/>
+          </a:effectRef>
+          <a:fontRef idx="minor">
+            <a:schemeClr val="lt1"/>
+          </a:fontRef>
+        </p:style>
+        <p:txBody>
+          <a:bodyPr rtlCol="0" anchor="ctr"/>
+          <a:lstStyle/>
+          <a:p>
+            <a:pPr algn="ctr"/>
+            <a:endParaRPr lang="fr-FR"/>
+          </a:p>
+        </p:txBody>
+      </p:sp>
+      <p:pic>
+        <p:nvPicPr>
+          <p:cNvPr id="22" name="Image 21">
+            <a:extLst>
+              <a:ext uri="{FF2B5EF4-FFF2-40B4-BE49-F238E27FC236}">
+                <a16:creationId xmlns:a16="http://schemas.microsoft.com/office/drawing/2014/main" id="{96751875-8ACB-432C-A176-46FF2499AF28}"/>
+              </a:ext>
+            </a:extLst>
+          </p:cNvPr>
+          <p:cNvPicPr>
+            <a:picLocks noChangeAspect="1"/>
+          </p:cNvPicPr>
+          <p:nvPr/>
+        </p:nvPicPr>
+        <p:blipFill>
+          <a:blip r:embed="rId7">
+            <a:extLst>
+              <a:ext uri="{28A0092B-C50C-407E-A947-70E740481C1C}">
+                <a14:useLocalDpi xmlns:a14="http://schemas.microsoft.com/office/drawing/2010/main" val="0"/>
+              </a:ext>
+            </a:extLst>
+          </a:blip>
+          <a:stretch>
+            <a:fillRect/>
+          </a:stretch>
+        </p:blipFill>
+        <p:spPr>
+          <a:xfrm>
+            <a:off x="3064055" y="2438328"/>
+            <a:ext cx="309663" cy="309663"/>
+          </a:xfrm>
+          <a:prstGeom prst="rect">
+            <a:avLst/>
+          </a:prstGeom>
+        </p:spPr>
+      </p:pic>
+      <p:pic>
+        <p:nvPicPr>
+          <p:cNvPr id="24" name="Image 23">
+            <a:extLst>
+              <a:ext uri="{FF2B5EF4-FFF2-40B4-BE49-F238E27FC236}">
+                <a16:creationId xmlns:a16="http://schemas.microsoft.com/office/drawing/2014/main" id="{D61A3F48-27F7-4DBD-A88A-0ACEC3F5A2FD}"/>
+              </a:ext>
+            </a:extLst>
+          </p:cNvPr>
+          <p:cNvPicPr>
+            <a:picLocks noChangeAspect="1"/>
+          </p:cNvPicPr>
+          <p:nvPr/>
+        </p:nvPicPr>
+        <p:blipFill>
+          <a:blip r:embed="rId8">
+            <a:extLst>
+              <a:ext uri="{28A0092B-C50C-407E-A947-70E740481C1C}">
+                <a14:useLocalDpi xmlns:a14="http://schemas.microsoft.com/office/drawing/2010/main" val="0"/>
+              </a:ext>
+            </a:extLst>
+          </a:blip>
+          <a:stretch>
+            <a:fillRect/>
+          </a:stretch>
+        </p:blipFill>
+        <p:spPr>
+          <a:xfrm>
+            <a:off x="3064055" y="2970109"/>
+            <a:ext cx="309663" cy="309663"/>
+          </a:xfrm>
+          <a:prstGeom prst="rect">
+            <a:avLst/>
+          </a:prstGeom>
+        </p:spPr>
+      </p:pic>
+      <p:pic>
+        <p:nvPicPr>
+          <p:cNvPr id="26" name="Image 25">
+            <a:extLst>
+              <a:ext uri="{FF2B5EF4-FFF2-40B4-BE49-F238E27FC236}">
+                <a16:creationId xmlns:a16="http://schemas.microsoft.com/office/drawing/2014/main" id="{79601F0B-7B56-4004-A15C-07BBEC521A46}"/>
+              </a:ext>
+            </a:extLst>
+          </p:cNvPr>
+          <p:cNvPicPr>
+            <a:picLocks noChangeAspect="1"/>
+          </p:cNvPicPr>
+          <p:nvPr/>
+        </p:nvPicPr>
+        <p:blipFill>
+          <a:blip r:embed="rId9">
+            <a:extLst>
+              <a:ext uri="{28A0092B-C50C-407E-A947-70E740481C1C}">
+                <a14:useLocalDpi xmlns:a14="http://schemas.microsoft.com/office/drawing/2010/main" val="0"/>
+              </a:ext>
+            </a:extLst>
+          </a:blip>
+          <a:stretch>
+            <a:fillRect/>
+          </a:stretch>
+        </p:blipFill>
+        <p:spPr>
+          <a:xfrm>
+            <a:off x="3064055" y="3496892"/>
+            <a:ext cx="309663" cy="309663"/>
+          </a:xfrm>
+          <a:prstGeom prst="rect">
+            <a:avLst/>
+          </a:prstGeom>
+        </p:spPr>
+      </p:pic>
+      <p:pic>
+        <p:nvPicPr>
+          <p:cNvPr id="28" name="Image 27">
+            <a:extLst>
+              <a:ext uri="{FF2B5EF4-FFF2-40B4-BE49-F238E27FC236}">
+                <a16:creationId xmlns:a16="http://schemas.microsoft.com/office/drawing/2014/main" id="{34E4651E-8C8F-4ACD-A55A-E513658F6B71}"/>
+              </a:ext>
+            </a:extLst>
+          </p:cNvPr>
+          <p:cNvPicPr>
+            <a:picLocks noChangeAspect="1"/>
+          </p:cNvPicPr>
+          <p:nvPr/>
+        </p:nvPicPr>
+        <p:blipFill>
+          <a:blip r:embed="rId10">
+            <a:extLst>
+              <a:ext uri="{28A0092B-C50C-407E-A947-70E740481C1C}">
+                <a14:useLocalDpi xmlns:a14="http://schemas.microsoft.com/office/drawing/2010/main" val="0"/>
+              </a:ext>
+            </a:extLst>
+          </a:blip>
+          <a:stretch>
+            <a:fillRect/>
+          </a:stretch>
+        </p:blipFill>
+        <p:spPr>
+          <a:xfrm>
+            <a:off x="3064054" y="4057205"/>
+            <a:ext cx="309663" cy="309663"/>
+          </a:xfrm>
+          <a:prstGeom prst="rect">
+            <a:avLst/>
+          </a:prstGeom>
+        </p:spPr>
+      </p:pic>
+      <p:pic>
+        <p:nvPicPr>
+          <p:cNvPr id="32" name="Image 31">
+            <a:extLst>
+              <a:ext uri="{FF2B5EF4-FFF2-40B4-BE49-F238E27FC236}">
+                <a16:creationId xmlns:a16="http://schemas.microsoft.com/office/drawing/2014/main" id="{931395E8-598B-4574-B611-0E7EBC856179}"/>
+              </a:ext>
+            </a:extLst>
+          </p:cNvPr>
+          <p:cNvPicPr>
+            <a:picLocks noChangeAspect="1"/>
+          </p:cNvPicPr>
+          <p:nvPr/>
+        </p:nvPicPr>
+        <p:blipFill>
+          <a:blip r:embed="rId11">
+            <a:extLst>
+              <a:ext uri="{28A0092B-C50C-407E-A947-70E740481C1C}">
+                <a14:useLocalDpi xmlns:a14="http://schemas.microsoft.com/office/drawing/2010/main" val="0"/>
+              </a:ext>
+            </a:extLst>
+          </a:blip>
+          <a:stretch>
+            <a:fillRect/>
+          </a:stretch>
+        </p:blipFill>
+        <p:spPr>
+          <a:xfrm>
+            <a:off x="3064055" y="4617518"/>
+            <a:ext cx="309663" cy="309663"/>
+          </a:xfrm>
+          <a:prstGeom prst="rect">
+            <a:avLst/>
+          </a:prstGeom>
+        </p:spPr>
+      </p:pic>
+      <p:pic>
+        <p:nvPicPr>
+          <p:cNvPr id="34" name="Image 33">
+            <a:extLst>
+              <a:ext uri="{FF2B5EF4-FFF2-40B4-BE49-F238E27FC236}">
+                <a16:creationId xmlns:a16="http://schemas.microsoft.com/office/drawing/2014/main" id="{2527A867-1AAA-457E-A547-D6537D5E934F}"/>
+              </a:ext>
+            </a:extLst>
+          </p:cNvPr>
+          <p:cNvPicPr>
+            <a:picLocks noChangeAspect="1"/>
+          </p:cNvPicPr>
+          <p:nvPr/>
+        </p:nvPicPr>
+        <p:blipFill>
+          <a:blip r:embed="rId12">
+            <a:extLst>
+              <a:ext uri="{28A0092B-C50C-407E-A947-70E740481C1C}">
+                <a14:useLocalDpi xmlns:a14="http://schemas.microsoft.com/office/drawing/2010/main" val="0"/>
+              </a:ext>
+            </a:extLst>
+          </a:blip>
+          <a:stretch>
+            <a:fillRect/>
+          </a:stretch>
+        </p:blipFill>
+        <p:spPr>
+          <a:xfrm>
+            <a:off x="3083871" y="5175597"/>
+            <a:ext cx="309663" cy="309663"/>
+          </a:xfrm>
+          <a:prstGeom prst="rect">
+            <a:avLst/>
+          </a:prstGeom>
+        </p:spPr>
+      </p:pic>
+      <p:sp>
+        <p:nvSpPr>
+          <p:cNvPr id="35" name="ZoneTexte 34">
+            <a:extLst>
+              <a:ext uri="{FF2B5EF4-FFF2-40B4-BE49-F238E27FC236}">
+                <a16:creationId xmlns:a16="http://schemas.microsoft.com/office/drawing/2014/main" id="{146CD7DE-3EEC-4C6D-AAB4-4828ACED75BF}"/>
+              </a:ext>
+            </a:extLst>
+          </p:cNvPr>
+          <p:cNvSpPr txBox="1"/>
+          <p:nvPr/>
+        </p:nvSpPr>
+        <p:spPr>
+          <a:xfrm>
+            <a:off x="3393534" y="2438328"/>
+            <a:ext cx="847161" cy="307777"/>
+          </a:xfrm>
+          <a:prstGeom prst="rect">
+            <a:avLst/>
+          </a:prstGeom>
+          <a:noFill/>
+        </p:spPr>
+        <p:txBody>
+          <a:bodyPr wrap="square" rtlCol="0">
+            <a:spAutoFit/>
+          </a:bodyPr>
+          <a:lstStyle/>
+          <a:p>
+            <a:r>
+              <a:rPr lang="fr-FR" sz="1400" b="1" dirty="0"/>
+              <a:t>Accueil</a:t>
+            </a:r>
+          </a:p>
+        </p:txBody>
+      </p:sp>
+      <p:sp>
+        <p:nvSpPr>
+          <p:cNvPr id="36" name="ZoneTexte 35">
+            <a:extLst>
+              <a:ext uri="{FF2B5EF4-FFF2-40B4-BE49-F238E27FC236}">
+                <a16:creationId xmlns:a16="http://schemas.microsoft.com/office/drawing/2014/main" id="{052F095B-859A-43B8-A18C-C0F06A2597AA}"/>
+              </a:ext>
+            </a:extLst>
+          </p:cNvPr>
+          <p:cNvSpPr txBox="1"/>
+          <p:nvPr/>
+        </p:nvSpPr>
+        <p:spPr>
+          <a:xfrm>
+            <a:off x="3373717" y="2961367"/>
+            <a:ext cx="866978" cy="307777"/>
+          </a:xfrm>
+          <a:prstGeom prst="rect">
+            <a:avLst/>
+          </a:prstGeom>
+          <a:noFill/>
+        </p:spPr>
+        <p:txBody>
+          <a:bodyPr wrap="square" rtlCol="0">
+            <a:spAutoFit/>
+          </a:bodyPr>
+          <a:lstStyle/>
+          <a:p>
+            <a:r>
+              <a:rPr lang="fr-FR" sz="1400" b="1" dirty="0"/>
+              <a:t>S’inscrire</a:t>
+            </a:r>
+          </a:p>
+        </p:txBody>
+      </p:sp>
+      <p:sp>
+        <p:nvSpPr>
+          <p:cNvPr id="37" name="ZoneTexte 36">
+            <a:extLst>
+              <a:ext uri="{FF2B5EF4-FFF2-40B4-BE49-F238E27FC236}">
+                <a16:creationId xmlns:a16="http://schemas.microsoft.com/office/drawing/2014/main" id="{2D8EC3DE-F131-47DD-AE87-FE8A9C237631}"/>
+              </a:ext>
+            </a:extLst>
+          </p:cNvPr>
+          <p:cNvSpPr txBox="1"/>
+          <p:nvPr/>
+        </p:nvSpPr>
+        <p:spPr>
+          <a:xfrm>
+            <a:off x="3359017" y="3482520"/>
+            <a:ext cx="970095" cy="307777"/>
+          </a:xfrm>
+          <a:prstGeom prst="rect">
+            <a:avLst/>
+          </a:prstGeom>
+          <a:noFill/>
+        </p:spPr>
+        <p:txBody>
+          <a:bodyPr wrap="square" rtlCol="0">
+            <a:spAutoFit/>
+          </a:bodyPr>
+          <a:lstStyle/>
+          <a:p>
+            <a:r>
+              <a:rPr lang="fr-FR" sz="1400" b="1" dirty="0"/>
+              <a:t>Historique</a:t>
+            </a:r>
+          </a:p>
+        </p:txBody>
+      </p:sp>
+      <p:sp>
+        <p:nvSpPr>
+          <p:cNvPr id="38" name="ZoneTexte 37">
+            <a:extLst>
+              <a:ext uri="{FF2B5EF4-FFF2-40B4-BE49-F238E27FC236}">
+                <a16:creationId xmlns:a16="http://schemas.microsoft.com/office/drawing/2014/main" id="{EE134B9D-DDD2-4C73-AB14-DAB578B988F5}"/>
+              </a:ext>
+            </a:extLst>
+          </p:cNvPr>
+          <p:cNvSpPr txBox="1"/>
+          <p:nvPr/>
+        </p:nvSpPr>
+        <p:spPr>
+          <a:xfrm>
+            <a:off x="3360566" y="4045568"/>
+            <a:ext cx="970095" cy="307777"/>
+          </a:xfrm>
+          <a:prstGeom prst="rect">
+            <a:avLst/>
+          </a:prstGeom>
+          <a:noFill/>
+        </p:spPr>
+        <p:txBody>
+          <a:bodyPr wrap="square" rtlCol="0">
+            <a:spAutoFit/>
+          </a:bodyPr>
+          <a:lstStyle/>
+          <a:p>
+            <a:r>
+              <a:rPr lang="fr-FR" sz="1400" b="1" dirty="0"/>
+              <a:t>Carte</a:t>
+            </a:r>
+          </a:p>
+        </p:txBody>
+      </p:sp>
+      <p:sp>
+        <p:nvSpPr>
+          <p:cNvPr id="39" name="ZoneTexte 38">
+            <a:extLst>
+              <a:ext uri="{FF2B5EF4-FFF2-40B4-BE49-F238E27FC236}">
+                <a16:creationId xmlns:a16="http://schemas.microsoft.com/office/drawing/2014/main" id="{58AA60DE-39B7-43E7-AC95-67B18E816A35}"/>
+              </a:ext>
+            </a:extLst>
+          </p:cNvPr>
+          <p:cNvSpPr txBox="1"/>
+          <p:nvPr/>
+        </p:nvSpPr>
+        <p:spPr>
+          <a:xfrm>
+            <a:off x="3333903" y="4635891"/>
+            <a:ext cx="1049694" cy="276999"/>
+          </a:xfrm>
+          <a:prstGeom prst="rect">
+            <a:avLst/>
+          </a:prstGeom>
+          <a:noFill/>
+        </p:spPr>
+        <p:txBody>
+          <a:bodyPr wrap="square" rtlCol="0">
+            <a:spAutoFit/>
+          </a:bodyPr>
+          <a:lstStyle/>
+          <a:p>
+            <a:r>
+              <a:rPr lang="fr-FR" sz="1200" b="1" dirty="0"/>
+              <a:t>Paramètres</a:t>
+            </a:r>
+          </a:p>
+        </p:txBody>
+      </p:sp>
+      <p:sp>
+        <p:nvSpPr>
+          <p:cNvPr id="40" name="ZoneTexte 39">
+            <a:extLst>
+              <a:ext uri="{FF2B5EF4-FFF2-40B4-BE49-F238E27FC236}">
+                <a16:creationId xmlns:a16="http://schemas.microsoft.com/office/drawing/2014/main" id="{CECA3D3F-8DD9-492B-8087-8BCF61A7AC5F}"/>
+              </a:ext>
+            </a:extLst>
+          </p:cNvPr>
+          <p:cNvSpPr txBox="1"/>
+          <p:nvPr/>
+        </p:nvSpPr>
+        <p:spPr>
+          <a:xfrm>
+            <a:off x="3319217" y="5162503"/>
+            <a:ext cx="1049694" cy="276999"/>
+          </a:xfrm>
+          <a:prstGeom prst="rect">
+            <a:avLst/>
+          </a:prstGeom>
+          <a:noFill/>
+        </p:spPr>
+        <p:txBody>
+          <a:bodyPr wrap="square" rtlCol="0">
+            <a:spAutoFit/>
+          </a:bodyPr>
+          <a:lstStyle/>
+          <a:p>
+            <a:r>
+              <a:rPr lang="fr-FR" sz="1200" b="1" dirty="0"/>
+              <a:t>Partager</a:t>
+            </a:r>
+          </a:p>
+        </p:txBody>
+      </p:sp>
+    </p:spTree>
+    <p:extLst>
+      <p:ext uri="{BB962C8B-B14F-4D97-AF65-F5344CB8AC3E}">
+        <p14:creationId xmlns:p14="http://schemas.microsoft.com/office/powerpoint/2010/main" val="1961165398"/>
+      </p:ext>
+    </p:extLst>
+  </p:cSld>
+  <p:clrMapOvr>
+    <a:masterClrMapping/>
+  </p:clrMapOvr>
+</p:sld>
+</file>
+
+<file path=ppt/slides/slide5.xml><?xml version="1.0" encoding="utf-8"?>
+<p:sld xmlns:a="http://schemas.openxmlformats.org/drawingml/2006/main" xmlns:r="http://schemas.openxmlformats.org/officeDocument/2006/relationships" xmlns:p="http://schemas.openxmlformats.org/presentationml/2006/main">
+  <p:cSld>
+    <p:spTree>
+      <p:nvGrpSpPr>
+        <p:cNvPr id="1" name=""/>
+        <p:cNvGrpSpPr/>
+        <p:nvPr/>
+      </p:nvGrpSpPr>
+      <p:grpSpPr>
+        <a:xfrm>
+          <a:off x="0" y="0"/>
+          <a:ext cx="0" cy="0"/>
+          <a:chOff x="0" y="0"/>
+          <a:chExt cx="0" cy="0"/>
+        </a:xfrm>
+      </p:grpSpPr>
+      <p:pic>
+        <p:nvPicPr>
+          <p:cNvPr id="4" name="Image 3" descr="Une image contenant texte&#10;&#10;Description générée automatiquement">
+            <a:extLst>
+              <a:ext uri="{FF2B5EF4-FFF2-40B4-BE49-F238E27FC236}">
+                <a16:creationId xmlns:a16="http://schemas.microsoft.com/office/drawing/2014/main" id="{4ADEF9A3-986E-4B19-96E6-C4657A37C070}"/>
+              </a:ext>
+            </a:extLst>
+          </p:cNvPr>
+          <p:cNvPicPr>
+            <a:picLocks noChangeAspect="1"/>
+          </p:cNvPicPr>
+          <p:nvPr/>
+        </p:nvPicPr>
+        <p:blipFill>
+          <a:blip r:embed="rId2">
+            <a:extLst>
+              <a:ext uri="{28A0092B-C50C-407E-A947-70E740481C1C}">
+                <a14:useLocalDpi xmlns:a14="http://schemas.microsoft.com/office/drawing/2010/main" val="0"/>
+              </a:ext>
+            </a:extLst>
+          </a:blip>
+          <a:stretch>
+            <a:fillRect/>
+          </a:stretch>
+        </p:blipFill>
+        <p:spPr>
+          <a:xfrm>
+            <a:off x="2962276" y="643467"/>
+            <a:ext cx="6267447" cy="5571065"/>
+          </a:xfrm>
+          <a:prstGeom prst="rect">
+            <a:avLst/>
+          </a:prstGeom>
+          <a:ln>
+            <a:noFill/>
+          </a:ln>
+        </p:spPr>
+      </p:pic>
+      <p:sp>
+        <p:nvSpPr>
+          <p:cNvPr id="5" name="Rectangle 4">
+            <a:extLst>
+              <a:ext uri="{FF2B5EF4-FFF2-40B4-BE49-F238E27FC236}">
+                <a16:creationId xmlns:a16="http://schemas.microsoft.com/office/drawing/2014/main" id="{B0AC15B6-6E48-47FC-9CB3-EA05015D71BF}"/>
+              </a:ext>
+            </a:extLst>
+          </p:cNvPr>
+          <p:cNvSpPr/>
+          <p:nvPr/>
+        </p:nvSpPr>
+        <p:spPr>
+          <a:xfrm>
+            <a:off x="2993458" y="1645920"/>
+            <a:ext cx="6205086" cy="529389"/>
+          </a:xfrm>
+          <a:prstGeom prst="rect">
+            <a:avLst/>
+          </a:prstGeom>
+          <a:solidFill>
+            <a:schemeClr val="bg1"/>
+          </a:solidFill>
+          <a:ln>
+            <a:solidFill>
+              <a:schemeClr val="tx1"/>
+            </a:solidFill>
+          </a:ln>
+        </p:spPr>
+        <p:style>
+          <a:lnRef idx="2">
+            <a:schemeClr val="accent1">
+              <a:shade val="50000"/>
+            </a:schemeClr>
+          </a:lnRef>
+          <a:fillRef idx="1">
+            <a:schemeClr val="accent1"/>
+          </a:fillRef>
+          <a:effectRef idx="0">
+            <a:schemeClr val="accent1"/>
+          </a:effectRef>
+          <a:fontRef idx="minor">
+            <a:schemeClr val="lt1"/>
+          </a:fontRef>
+        </p:style>
+        <p:txBody>
+          <a:bodyPr rtlCol="0" anchor="ctr"/>
+          <a:lstStyle/>
+          <a:p>
+            <a:pPr algn="ctr"/>
+            <a:endParaRPr lang="fr-FR">
+              <a:ln>
+                <a:solidFill>
+                  <a:sysClr val="windowText" lastClr="000000"/>
+                </a:solidFill>
+              </a:ln>
+            </a:endParaRPr>
+          </a:p>
+        </p:txBody>
+      </p:sp>
+      <p:pic>
+        <p:nvPicPr>
+          <p:cNvPr id="6" name="Image 5">
+            <a:extLst>
+              <a:ext uri="{FF2B5EF4-FFF2-40B4-BE49-F238E27FC236}">
+                <a16:creationId xmlns:a16="http://schemas.microsoft.com/office/drawing/2014/main" id="{4B590731-7371-4AA6-900D-274B8926171D}"/>
+              </a:ext>
+            </a:extLst>
+          </p:cNvPr>
+          <p:cNvPicPr>
+            <a:picLocks noChangeAspect="1"/>
+          </p:cNvPicPr>
+          <p:nvPr/>
+        </p:nvPicPr>
+        <p:blipFill>
+          <a:blip r:embed="rId3">
+            <a:extLst>
+              <a:ext uri="{28A0092B-C50C-407E-A947-70E740481C1C}">
+                <a14:useLocalDpi xmlns:a14="http://schemas.microsoft.com/office/drawing/2010/main" val="0"/>
+              </a:ext>
+            </a:extLst>
+          </a:blip>
+          <a:stretch>
+            <a:fillRect/>
+          </a:stretch>
+        </p:blipFill>
+        <p:spPr>
+          <a:xfrm>
+            <a:off x="3218887" y="1770674"/>
+            <a:ext cx="349294" cy="349294"/>
+          </a:xfrm>
+          <a:prstGeom prst="rect">
+            <a:avLst/>
+          </a:prstGeom>
+        </p:spPr>
+      </p:pic>
+      <p:sp>
+        <p:nvSpPr>
+          <p:cNvPr id="7" name="ZoneTexte 6">
+            <a:extLst>
+              <a:ext uri="{FF2B5EF4-FFF2-40B4-BE49-F238E27FC236}">
+                <a16:creationId xmlns:a16="http://schemas.microsoft.com/office/drawing/2014/main" id="{72C0A644-15DD-4B5A-96FE-06BB0073DDAC}"/>
+              </a:ext>
+            </a:extLst>
+          </p:cNvPr>
+          <p:cNvSpPr txBox="1"/>
+          <p:nvPr/>
+        </p:nvSpPr>
+        <p:spPr>
+          <a:xfrm>
+            <a:off x="3940573" y="1725948"/>
+            <a:ext cx="2301201" cy="369332"/>
+          </a:xfrm>
+          <a:prstGeom prst="rect">
+            <a:avLst/>
+          </a:prstGeom>
+          <a:noFill/>
+        </p:spPr>
+        <p:txBody>
+          <a:bodyPr wrap="square" rtlCol="0">
+            <a:spAutoFit/>
+          </a:bodyPr>
+          <a:lstStyle/>
+          <a:p>
+            <a:r>
+              <a:rPr lang="fr-FR" b="1" dirty="0"/>
+              <a:t>Bonjour </a:t>
+            </a:r>
+            <a:r>
+              <a:rPr lang="fr-FR" b="1" i="1" dirty="0"/>
+              <a:t>Nom Prénom</a:t>
+            </a:r>
+            <a:endParaRPr lang="fr-FR" b="1" dirty="0"/>
+          </a:p>
+        </p:txBody>
+      </p:sp>
+      <p:pic>
+        <p:nvPicPr>
+          <p:cNvPr id="8" name="Image 7">
+            <a:extLst>
+              <a:ext uri="{FF2B5EF4-FFF2-40B4-BE49-F238E27FC236}">
+                <a16:creationId xmlns:a16="http://schemas.microsoft.com/office/drawing/2014/main" id="{A63B9788-AC6E-4F95-9E2A-2AB91E89BB55}"/>
+              </a:ext>
+            </a:extLst>
+          </p:cNvPr>
+          <p:cNvPicPr>
+            <a:picLocks noChangeAspect="1"/>
+          </p:cNvPicPr>
+          <p:nvPr/>
+        </p:nvPicPr>
+        <p:blipFill>
+          <a:blip r:embed="rId4">
+            <a:extLst>
+              <a:ext uri="{28A0092B-C50C-407E-A947-70E740481C1C}">
+                <a14:useLocalDpi xmlns:a14="http://schemas.microsoft.com/office/drawing/2010/main" val="0"/>
+              </a:ext>
+            </a:extLst>
+          </a:blip>
+          <a:stretch>
+            <a:fillRect/>
+          </a:stretch>
+        </p:blipFill>
+        <p:spPr>
+          <a:xfrm>
+            <a:off x="8418983" y="1714309"/>
+            <a:ext cx="392609" cy="392609"/>
+          </a:xfrm>
+          <a:prstGeom prst="rect">
+            <a:avLst/>
+          </a:prstGeom>
+        </p:spPr>
+      </p:pic>
+      <p:sp>
+        <p:nvSpPr>
+          <p:cNvPr id="17" name="Rectangle 16">
+            <a:extLst>
+              <a:ext uri="{FF2B5EF4-FFF2-40B4-BE49-F238E27FC236}">
+                <a16:creationId xmlns:a16="http://schemas.microsoft.com/office/drawing/2014/main" id="{DBB83D62-26BC-4D5E-A3A9-BA6F6B9FCCA9}"/>
+              </a:ext>
+            </a:extLst>
+          </p:cNvPr>
+          <p:cNvSpPr/>
+          <p:nvPr/>
+        </p:nvSpPr>
+        <p:spPr>
+          <a:xfrm>
+            <a:off x="2993458" y="2186946"/>
+            <a:ext cx="1247238" cy="3630758"/>
+          </a:xfrm>
+          <a:prstGeom prst="rect">
+            <a:avLst/>
+          </a:prstGeom>
+          <a:solidFill>
+            <a:schemeClr val="bg1"/>
+          </a:solidFill>
+          <a:ln>
+            <a:solidFill>
+              <a:schemeClr val="tx1"/>
+            </a:solidFill>
+          </a:ln>
+        </p:spPr>
+        <p:style>
+          <a:lnRef idx="2">
+            <a:schemeClr val="accent1">
+              <a:shade val="50000"/>
+            </a:schemeClr>
+          </a:lnRef>
+          <a:fillRef idx="1">
+            <a:schemeClr val="accent1"/>
+          </a:fillRef>
+          <a:effectRef idx="0">
+            <a:schemeClr val="accent1"/>
+          </a:effectRef>
+          <a:fontRef idx="minor">
+            <a:schemeClr val="lt1"/>
+          </a:fontRef>
+        </p:style>
+        <p:txBody>
+          <a:bodyPr rtlCol="0" anchor="ctr"/>
+          <a:lstStyle/>
+          <a:p>
+            <a:pPr algn="ctr"/>
+            <a:endParaRPr lang="fr-FR"/>
+          </a:p>
+        </p:txBody>
+      </p:sp>
+      <p:pic>
+        <p:nvPicPr>
+          <p:cNvPr id="18" name="Image 17">
+            <a:extLst>
+              <a:ext uri="{FF2B5EF4-FFF2-40B4-BE49-F238E27FC236}">
+                <a16:creationId xmlns:a16="http://schemas.microsoft.com/office/drawing/2014/main" id="{2E636F0D-AC99-4B44-AB14-646F3CCC8F8F}"/>
+              </a:ext>
+            </a:extLst>
+          </p:cNvPr>
+          <p:cNvPicPr>
+            <a:picLocks noChangeAspect="1"/>
+          </p:cNvPicPr>
+          <p:nvPr/>
+        </p:nvPicPr>
+        <p:blipFill>
+          <a:blip r:embed="rId5">
+            <a:extLst>
+              <a:ext uri="{28A0092B-C50C-407E-A947-70E740481C1C}">
+                <a14:useLocalDpi xmlns:a14="http://schemas.microsoft.com/office/drawing/2010/main" val="0"/>
+              </a:ext>
+            </a:extLst>
+          </a:blip>
+          <a:stretch>
+            <a:fillRect/>
+          </a:stretch>
+        </p:blipFill>
+        <p:spPr>
+          <a:xfrm>
+            <a:off x="3064055" y="2438328"/>
+            <a:ext cx="309663" cy="309663"/>
+          </a:xfrm>
+          <a:prstGeom prst="rect">
+            <a:avLst/>
+          </a:prstGeom>
+        </p:spPr>
+      </p:pic>
+      <p:pic>
+        <p:nvPicPr>
+          <p:cNvPr id="19" name="Image 18">
+            <a:extLst>
+              <a:ext uri="{FF2B5EF4-FFF2-40B4-BE49-F238E27FC236}">
+                <a16:creationId xmlns:a16="http://schemas.microsoft.com/office/drawing/2014/main" id="{E32CA071-5C53-4A94-87BB-F46692DDC4C9}"/>
+              </a:ext>
+            </a:extLst>
+          </p:cNvPr>
+          <p:cNvPicPr>
+            <a:picLocks noChangeAspect="1"/>
+          </p:cNvPicPr>
+          <p:nvPr/>
+        </p:nvPicPr>
+        <p:blipFill>
+          <a:blip r:embed="rId6">
+            <a:extLst>
+              <a:ext uri="{28A0092B-C50C-407E-A947-70E740481C1C}">
+                <a14:useLocalDpi xmlns:a14="http://schemas.microsoft.com/office/drawing/2010/main" val="0"/>
+              </a:ext>
+            </a:extLst>
+          </a:blip>
+          <a:stretch>
+            <a:fillRect/>
+          </a:stretch>
+        </p:blipFill>
+        <p:spPr>
+          <a:xfrm>
+            <a:off x="3064055" y="2970109"/>
+            <a:ext cx="309663" cy="309663"/>
+          </a:xfrm>
+          <a:prstGeom prst="rect">
+            <a:avLst/>
+          </a:prstGeom>
+        </p:spPr>
+      </p:pic>
+      <p:pic>
+        <p:nvPicPr>
+          <p:cNvPr id="20" name="Image 19">
+            <a:extLst>
+              <a:ext uri="{FF2B5EF4-FFF2-40B4-BE49-F238E27FC236}">
+                <a16:creationId xmlns:a16="http://schemas.microsoft.com/office/drawing/2014/main" id="{F4F8C8F0-8690-4732-A613-E82ED3585739}"/>
+              </a:ext>
+            </a:extLst>
+          </p:cNvPr>
+          <p:cNvPicPr>
+            <a:picLocks noChangeAspect="1"/>
+          </p:cNvPicPr>
+          <p:nvPr/>
+        </p:nvPicPr>
+        <p:blipFill>
+          <a:blip r:embed="rId7">
+            <a:extLst>
+              <a:ext uri="{28A0092B-C50C-407E-A947-70E740481C1C}">
+                <a14:useLocalDpi xmlns:a14="http://schemas.microsoft.com/office/drawing/2010/main" val="0"/>
+              </a:ext>
+            </a:extLst>
+          </a:blip>
+          <a:stretch>
+            <a:fillRect/>
+          </a:stretch>
+        </p:blipFill>
+        <p:spPr>
+          <a:xfrm>
+            <a:off x="3064055" y="3496892"/>
+            <a:ext cx="309663" cy="309663"/>
+          </a:xfrm>
+          <a:prstGeom prst="rect">
+            <a:avLst/>
+          </a:prstGeom>
+        </p:spPr>
+      </p:pic>
+      <p:pic>
+        <p:nvPicPr>
+          <p:cNvPr id="21" name="Image 20">
+            <a:extLst>
+              <a:ext uri="{FF2B5EF4-FFF2-40B4-BE49-F238E27FC236}">
+                <a16:creationId xmlns:a16="http://schemas.microsoft.com/office/drawing/2014/main" id="{B338BA68-85B8-4AE9-861F-732B1ECB0017}"/>
+              </a:ext>
+            </a:extLst>
+          </p:cNvPr>
+          <p:cNvPicPr>
+            <a:picLocks noChangeAspect="1"/>
+          </p:cNvPicPr>
+          <p:nvPr/>
+        </p:nvPicPr>
+        <p:blipFill>
+          <a:blip r:embed="rId8">
+            <a:extLst>
+              <a:ext uri="{28A0092B-C50C-407E-A947-70E740481C1C}">
+                <a14:useLocalDpi xmlns:a14="http://schemas.microsoft.com/office/drawing/2010/main" val="0"/>
+              </a:ext>
+            </a:extLst>
+          </a:blip>
+          <a:stretch>
+            <a:fillRect/>
+          </a:stretch>
+        </p:blipFill>
+        <p:spPr>
+          <a:xfrm>
+            <a:off x="3064054" y="4057205"/>
+            <a:ext cx="309663" cy="309663"/>
+          </a:xfrm>
+          <a:prstGeom prst="rect">
+            <a:avLst/>
+          </a:prstGeom>
+        </p:spPr>
+      </p:pic>
+      <p:pic>
+        <p:nvPicPr>
+          <p:cNvPr id="22" name="Image 21">
+            <a:extLst>
+              <a:ext uri="{FF2B5EF4-FFF2-40B4-BE49-F238E27FC236}">
+                <a16:creationId xmlns:a16="http://schemas.microsoft.com/office/drawing/2014/main" id="{FB2423BC-197C-4BA5-8875-03FB4817B874}"/>
+              </a:ext>
+            </a:extLst>
+          </p:cNvPr>
+          <p:cNvPicPr>
+            <a:picLocks noChangeAspect="1"/>
+          </p:cNvPicPr>
+          <p:nvPr/>
+        </p:nvPicPr>
+        <p:blipFill>
+          <a:blip r:embed="rId9">
+            <a:extLst>
+              <a:ext uri="{28A0092B-C50C-407E-A947-70E740481C1C}">
+                <a14:useLocalDpi xmlns:a14="http://schemas.microsoft.com/office/drawing/2010/main" val="0"/>
+              </a:ext>
+            </a:extLst>
+          </a:blip>
+          <a:stretch>
+            <a:fillRect/>
+          </a:stretch>
+        </p:blipFill>
+        <p:spPr>
+          <a:xfrm>
+            <a:off x="3064055" y="4617518"/>
+            <a:ext cx="309663" cy="309663"/>
+          </a:xfrm>
+          <a:prstGeom prst="rect">
+            <a:avLst/>
+          </a:prstGeom>
+        </p:spPr>
+      </p:pic>
+      <p:pic>
+        <p:nvPicPr>
+          <p:cNvPr id="23" name="Image 22">
+            <a:extLst>
+              <a:ext uri="{FF2B5EF4-FFF2-40B4-BE49-F238E27FC236}">
+                <a16:creationId xmlns:a16="http://schemas.microsoft.com/office/drawing/2014/main" id="{8C78E5E5-0ABB-4E55-BBDD-6A2A38B0CC39}"/>
+              </a:ext>
+            </a:extLst>
+          </p:cNvPr>
+          <p:cNvPicPr>
+            <a:picLocks noChangeAspect="1"/>
+          </p:cNvPicPr>
+          <p:nvPr/>
+        </p:nvPicPr>
+        <p:blipFill>
+          <a:blip r:embed="rId10">
+            <a:extLst>
+              <a:ext uri="{28A0092B-C50C-407E-A947-70E740481C1C}">
+                <a14:useLocalDpi xmlns:a14="http://schemas.microsoft.com/office/drawing/2010/main" val="0"/>
+              </a:ext>
+            </a:extLst>
+          </a:blip>
+          <a:stretch>
+            <a:fillRect/>
+          </a:stretch>
+        </p:blipFill>
+        <p:spPr>
+          <a:xfrm>
+            <a:off x="3083871" y="5175597"/>
+            <a:ext cx="309663" cy="309663"/>
+          </a:xfrm>
+          <a:prstGeom prst="rect">
+            <a:avLst/>
+          </a:prstGeom>
+        </p:spPr>
+      </p:pic>
+      <p:sp>
+        <p:nvSpPr>
+          <p:cNvPr id="24" name="ZoneTexte 23">
+            <a:extLst>
+              <a:ext uri="{FF2B5EF4-FFF2-40B4-BE49-F238E27FC236}">
+                <a16:creationId xmlns:a16="http://schemas.microsoft.com/office/drawing/2014/main" id="{86C15D8A-3F59-4EF8-9A2F-B5E37270E84F}"/>
+              </a:ext>
+            </a:extLst>
+          </p:cNvPr>
+          <p:cNvSpPr txBox="1"/>
+          <p:nvPr/>
+        </p:nvSpPr>
+        <p:spPr>
+          <a:xfrm>
+            <a:off x="3393534" y="2438328"/>
+            <a:ext cx="847161" cy="307777"/>
+          </a:xfrm>
+          <a:prstGeom prst="rect">
+            <a:avLst/>
+          </a:prstGeom>
+          <a:noFill/>
+        </p:spPr>
+        <p:txBody>
+          <a:bodyPr wrap="square" rtlCol="0">
+            <a:spAutoFit/>
+          </a:bodyPr>
+          <a:lstStyle/>
+          <a:p>
+            <a:r>
+              <a:rPr lang="fr-FR" sz="1400" b="1" dirty="0"/>
+              <a:t>Accueil</a:t>
+            </a:r>
+          </a:p>
+        </p:txBody>
+      </p:sp>
+      <p:sp>
+        <p:nvSpPr>
+          <p:cNvPr id="25" name="ZoneTexte 24">
+            <a:extLst>
+              <a:ext uri="{FF2B5EF4-FFF2-40B4-BE49-F238E27FC236}">
+                <a16:creationId xmlns:a16="http://schemas.microsoft.com/office/drawing/2014/main" id="{F77F4588-2766-44E0-9EEE-00DD7866A093}"/>
+              </a:ext>
+            </a:extLst>
+          </p:cNvPr>
+          <p:cNvSpPr txBox="1"/>
+          <p:nvPr/>
+        </p:nvSpPr>
+        <p:spPr>
+          <a:xfrm>
+            <a:off x="3373717" y="2961367"/>
+            <a:ext cx="866978" cy="307777"/>
+          </a:xfrm>
+          <a:prstGeom prst="rect">
+            <a:avLst/>
+          </a:prstGeom>
+          <a:noFill/>
+        </p:spPr>
+        <p:txBody>
+          <a:bodyPr wrap="square" rtlCol="0">
+            <a:spAutoFit/>
+          </a:bodyPr>
+          <a:lstStyle/>
+          <a:p>
+            <a:r>
+              <a:rPr lang="fr-FR" sz="1400" b="1" dirty="0"/>
+              <a:t>S’inscrire</a:t>
+            </a:r>
+          </a:p>
+        </p:txBody>
+      </p:sp>
+      <p:sp>
+        <p:nvSpPr>
+          <p:cNvPr id="26" name="ZoneTexte 25">
+            <a:extLst>
+              <a:ext uri="{FF2B5EF4-FFF2-40B4-BE49-F238E27FC236}">
+                <a16:creationId xmlns:a16="http://schemas.microsoft.com/office/drawing/2014/main" id="{A268C398-23AE-4499-9ABB-A9473E3723E3}"/>
+              </a:ext>
+            </a:extLst>
+          </p:cNvPr>
+          <p:cNvSpPr txBox="1"/>
+          <p:nvPr/>
+        </p:nvSpPr>
+        <p:spPr>
+          <a:xfrm>
+            <a:off x="3359017" y="3482520"/>
+            <a:ext cx="970095" cy="307777"/>
+          </a:xfrm>
+          <a:prstGeom prst="rect">
+            <a:avLst/>
+          </a:prstGeom>
+          <a:noFill/>
+        </p:spPr>
+        <p:txBody>
+          <a:bodyPr wrap="square" rtlCol="0">
+            <a:spAutoFit/>
+          </a:bodyPr>
+          <a:lstStyle/>
+          <a:p>
+            <a:r>
+              <a:rPr lang="fr-FR" sz="1400" b="1" dirty="0"/>
+              <a:t>Historique</a:t>
+            </a:r>
+          </a:p>
+        </p:txBody>
+      </p:sp>
+      <p:sp>
+        <p:nvSpPr>
+          <p:cNvPr id="27" name="ZoneTexte 26">
+            <a:extLst>
+              <a:ext uri="{FF2B5EF4-FFF2-40B4-BE49-F238E27FC236}">
+                <a16:creationId xmlns:a16="http://schemas.microsoft.com/office/drawing/2014/main" id="{AA0A34A9-2EF1-4EC1-B302-58FA5E13C518}"/>
+              </a:ext>
+            </a:extLst>
+          </p:cNvPr>
+          <p:cNvSpPr txBox="1"/>
+          <p:nvPr/>
+        </p:nvSpPr>
+        <p:spPr>
+          <a:xfrm>
+            <a:off x="3360566" y="4045568"/>
+            <a:ext cx="970095" cy="307777"/>
+          </a:xfrm>
+          <a:prstGeom prst="rect">
+            <a:avLst/>
+          </a:prstGeom>
+          <a:noFill/>
+        </p:spPr>
+        <p:txBody>
+          <a:bodyPr wrap="square" rtlCol="0">
+            <a:spAutoFit/>
+          </a:bodyPr>
+          <a:lstStyle/>
+          <a:p>
+            <a:r>
+              <a:rPr lang="fr-FR" sz="1400" b="1" dirty="0"/>
+              <a:t>Carte</a:t>
+            </a:r>
+          </a:p>
+        </p:txBody>
+      </p:sp>
+      <p:sp>
+        <p:nvSpPr>
+          <p:cNvPr id="28" name="ZoneTexte 27">
+            <a:extLst>
+              <a:ext uri="{FF2B5EF4-FFF2-40B4-BE49-F238E27FC236}">
+                <a16:creationId xmlns:a16="http://schemas.microsoft.com/office/drawing/2014/main" id="{1527BBD2-F2FA-4569-8E43-53CFC648A30D}"/>
+              </a:ext>
+            </a:extLst>
+          </p:cNvPr>
+          <p:cNvSpPr txBox="1"/>
+          <p:nvPr/>
+        </p:nvSpPr>
+        <p:spPr>
+          <a:xfrm>
+            <a:off x="3333903" y="4635891"/>
+            <a:ext cx="1049694" cy="276999"/>
+          </a:xfrm>
+          <a:prstGeom prst="rect">
+            <a:avLst/>
+          </a:prstGeom>
+          <a:noFill/>
+        </p:spPr>
+        <p:txBody>
+          <a:bodyPr wrap="square" rtlCol="0">
+            <a:spAutoFit/>
+          </a:bodyPr>
+          <a:lstStyle/>
+          <a:p>
+            <a:r>
+              <a:rPr lang="fr-FR" sz="1200" b="1" dirty="0"/>
+              <a:t>Paramètres</a:t>
+            </a:r>
+          </a:p>
+        </p:txBody>
+      </p:sp>
+      <p:sp>
+        <p:nvSpPr>
+          <p:cNvPr id="29" name="ZoneTexte 28">
+            <a:extLst>
+              <a:ext uri="{FF2B5EF4-FFF2-40B4-BE49-F238E27FC236}">
+                <a16:creationId xmlns:a16="http://schemas.microsoft.com/office/drawing/2014/main" id="{13A616A7-7C7B-4447-9584-667D29FB93EB}"/>
+              </a:ext>
+            </a:extLst>
+          </p:cNvPr>
+          <p:cNvSpPr txBox="1"/>
+          <p:nvPr/>
+        </p:nvSpPr>
+        <p:spPr>
+          <a:xfrm>
+            <a:off x="3319217" y="5162503"/>
+            <a:ext cx="1049694" cy="276999"/>
+          </a:xfrm>
+          <a:prstGeom prst="rect">
+            <a:avLst/>
+          </a:prstGeom>
+          <a:noFill/>
+        </p:spPr>
+        <p:txBody>
+          <a:bodyPr wrap="square" rtlCol="0">
+            <a:spAutoFit/>
+          </a:bodyPr>
+          <a:lstStyle/>
+          <a:p>
+            <a:r>
+              <a:rPr lang="fr-FR" sz="1200" b="1" dirty="0"/>
+              <a:t>Partager</a:t>
+            </a:r>
+          </a:p>
+        </p:txBody>
+      </p:sp>
+      <p:sp>
+        <p:nvSpPr>
+          <p:cNvPr id="30" name="Rectangle : coins arrondis 29">
+            <a:extLst>
+              <a:ext uri="{FF2B5EF4-FFF2-40B4-BE49-F238E27FC236}">
+                <a16:creationId xmlns:a16="http://schemas.microsoft.com/office/drawing/2014/main" id="{A28BC47E-6DC8-48FC-871C-17B061841793}"/>
+              </a:ext>
+            </a:extLst>
+          </p:cNvPr>
+          <p:cNvSpPr/>
+          <p:nvPr/>
+        </p:nvSpPr>
+        <p:spPr>
+          <a:xfrm>
+            <a:off x="4800600" y="2311400"/>
+            <a:ext cx="3618383" cy="3365500"/>
+          </a:xfrm>
+          <a:prstGeom prst="roundRect">
+            <a:avLst/>
+          </a:prstGeom>
+          <a:solidFill>
+            <a:schemeClr val="bg1"/>
+          </a:solidFill>
+          <a:ln>
+            <a:solidFill>
+              <a:schemeClr val="tx1"/>
+            </a:solidFill>
+          </a:ln>
+        </p:spPr>
+        <p:style>
+          <a:lnRef idx="2">
+            <a:schemeClr val="accent1">
+              <a:shade val="50000"/>
+            </a:schemeClr>
+          </a:lnRef>
+          <a:fillRef idx="1">
+            <a:schemeClr val="accent1"/>
+          </a:fillRef>
+          <a:effectRef idx="0">
+            <a:schemeClr val="accent1"/>
+          </a:effectRef>
+          <a:fontRef idx="minor">
+            <a:schemeClr val="lt1"/>
+          </a:fontRef>
+        </p:style>
+        <p:txBody>
+          <a:bodyPr rtlCol="0" anchor="ctr"/>
+          <a:lstStyle/>
+          <a:p>
+            <a:pPr algn="ctr"/>
+            <a:endParaRPr lang="fr-FR"/>
+          </a:p>
+        </p:txBody>
+      </p:sp>
+      <p:sp>
+        <p:nvSpPr>
+          <p:cNvPr id="31" name="Rectangle : coins arrondis 30">
+            <a:extLst>
+              <a:ext uri="{FF2B5EF4-FFF2-40B4-BE49-F238E27FC236}">
+                <a16:creationId xmlns:a16="http://schemas.microsoft.com/office/drawing/2014/main" id="{A4C76842-CB89-408B-BEE8-9441DE269452}"/>
+              </a:ext>
+            </a:extLst>
+          </p:cNvPr>
+          <p:cNvSpPr/>
+          <p:nvPr/>
+        </p:nvSpPr>
+        <p:spPr>
+          <a:xfrm>
+            <a:off x="4785914" y="2255337"/>
+            <a:ext cx="3633069" cy="922425"/>
+          </a:xfrm>
+          <a:prstGeom prst="roundRect">
+            <a:avLst/>
+          </a:prstGeom>
+          <a:solidFill>
+            <a:schemeClr val="bg1"/>
+          </a:solidFill>
+          <a:ln>
+            <a:solidFill>
+              <a:schemeClr val="tx1"/>
+            </a:solidFill>
+          </a:ln>
+        </p:spPr>
+        <p:style>
+          <a:lnRef idx="2">
+            <a:schemeClr val="accent1">
+              <a:shade val="50000"/>
+            </a:schemeClr>
+          </a:lnRef>
+          <a:fillRef idx="1">
+            <a:schemeClr val="accent1"/>
+          </a:fillRef>
+          <a:effectRef idx="0">
+            <a:schemeClr val="accent1"/>
+          </a:effectRef>
+          <a:fontRef idx="minor">
+            <a:schemeClr val="lt1"/>
+          </a:fontRef>
+        </p:style>
+        <p:txBody>
+          <a:bodyPr rtlCol="0" anchor="ctr"/>
+          <a:lstStyle/>
+          <a:p>
+            <a:pPr algn="ctr"/>
+            <a:endParaRPr lang="fr-FR"/>
+          </a:p>
+        </p:txBody>
+      </p:sp>
+      <p:sp>
+        <p:nvSpPr>
+          <p:cNvPr id="32" name="ZoneTexte 31">
+            <a:extLst>
+              <a:ext uri="{FF2B5EF4-FFF2-40B4-BE49-F238E27FC236}">
+                <a16:creationId xmlns:a16="http://schemas.microsoft.com/office/drawing/2014/main" id="{3CFAED21-E0B3-4D08-9E17-57D55FE4A6C6}"/>
+              </a:ext>
+            </a:extLst>
+          </p:cNvPr>
+          <p:cNvSpPr txBox="1"/>
+          <p:nvPr/>
+        </p:nvSpPr>
+        <p:spPr>
+          <a:xfrm>
+            <a:off x="4927601" y="2255337"/>
+            <a:ext cx="3327400" cy="923330"/>
+          </a:xfrm>
+          <a:prstGeom prst="rect">
+            <a:avLst/>
+          </a:prstGeom>
+          <a:noFill/>
+        </p:spPr>
+        <p:txBody>
+          <a:bodyPr wrap="square" rtlCol="0">
+            <a:spAutoFit/>
+          </a:bodyPr>
+          <a:lstStyle/>
+          <a:p>
+            <a:pPr algn="ctr"/>
+            <a:r>
+              <a:rPr lang="fr-FR" b="1" dirty="0"/>
+              <a:t>Nouveau venu ? </a:t>
+            </a:r>
+            <a:br>
+              <a:rPr lang="fr-FR" dirty="0"/>
+            </a:br>
+            <a:r>
+              <a:rPr lang="fr-FR" dirty="0"/>
+              <a:t>L’inscription se fait par là </a:t>
+            </a:r>
+          </a:p>
+          <a:p>
+            <a:pPr algn="ctr"/>
+            <a:r>
+              <a:rPr lang="fr-FR" dirty="0"/>
+              <a:t>suivez le guide !</a:t>
+            </a:r>
+          </a:p>
+        </p:txBody>
+      </p:sp>
+      <p:sp>
+        <p:nvSpPr>
+          <p:cNvPr id="33" name="Rectangle 32">
+            <a:extLst>
+              <a:ext uri="{FF2B5EF4-FFF2-40B4-BE49-F238E27FC236}">
+                <a16:creationId xmlns:a16="http://schemas.microsoft.com/office/drawing/2014/main" id="{792A04B6-463B-462C-AFE3-2679DF6BEB2A}"/>
+              </a:ext>
+            </a:extLst>
+          </p:cNvPr>
+          <p:cNvSpPr/>
+          <p:nvPr/>
+        </p:nvSpPr>
+        <p:spPr>
+          <a:xfrm>
+            <a:off x="5189220" y="3429000"/>
+            <a:ext cx="1691640" cy="250334"/>
+          </a:xfrm>
+          <a:prstGeom prst="rect">
+            <a:avLst/>
+          </a:prstGeom>
+          <a:solidFill>
+            <a:schemeClr val="bg1"/>
+          </a:solidFill>
+          <a:ln>
+            <a:solidFill>
+              <a:schemeClr val="tx1"/>
+            </a:solidFill>
+          </a:ln>
+        </p:spPr>
+        <p:style>
+          <a:lnRef idx="2">
+            <a:schemeClr val="accent1">
+              <a:shade val="50000"/>
+            </a:schemeClr>
+          </a:lnRef>
+          <a:fillRef idx="1">
+            <a:schemeClr val="accent1"/>
+          </a:fillRef>
+          <a:effectRef idx="0">
+            <a:schemeClr val="accent1"/>
+          </a:effectRef>
+          <a:fontRef idx="minor">
+            <a:schemeClr val="lt1"/>
+          </a:fontRef>
+        </p:style>
+        <p:txBody>
+          <a:bodyPr rtlCol="0" anchor="ctr"/>
+          <a:lstStyle/>
+          <a:p>
+            <a:pPr algn="ctr"/>
+            <a:endParaRPr lang="fr-FR"/>
+          </a:p>
+        </p:txBody>
+      </p:sp>
+      <p:sp>
+        <p:nvSpPr>
+          <p:cNvPr id="34" name="Rectangle 33">
+            <a:extLst>
+              <a:ext uri="{FF2B5EF4-FFF2-40B4-BE49-F238E27FC236}">
+                <a16:creationId xmlns:a16="http://schemas.microsoft.com/office/drawing/2014/main" id="{AD305639-04F6-44D8-AC8F-69E3A57FF58D}"/>
+              </a:ext>
+            </a:extLst>
+          </p:cNvPr>
+          <p:cNvSpPr/>
+          <p:nvPr/>
+        </p:nvSpPr>
+        <p:spPr>
+          <a:xfrm>
+            <a:off x="5189220" y="3877158"/>
+            <a:ext cx="1691640" cy="250334"/>
+          </a:xfrm>
+          <a:prstGeom prst="rect">
+            <a:avLst/>
+          </a:prstGeom>
+          <a:solidFill>
+            <a:schemeClr val="bg1"/>
+          </a:solidFill>
+          <a:ln>
+            <a:solidFill>
+              <a:schemeClr val="tx1"/>
+            </a:solidFill>
+          </a:ln>
+        </p:spPr>
+        <p:style>
+          <a:lnRef idx="2">
+            <a:schemeClr val="accent1">
+              <a:shade val="50000"/>
+            </a:schemeClr>
+          </a:lnRef>
+          <a:fillRef idx="1">
+            <a:schemeClr val="accent1"/>
+          </a:fillRef>
+          <a:effectRef idx="0">
+            <a:schemeClr val="accent1"/>
+          </a:effectRef>
+          <a:fontRef idx="minor">
+            <a:schemeClr val="lt1"/>
+          </a:fontRef>
+        </p:style>
+        <p:txBody>
+          <a:bodyPr rtlCol="0" anchor="ctr"/>
+          <a:lstStyle/>
+          <a:p>
+            <a:pPr algn="ctr"/>
+            <a:endParaRPr lang="fr-FR"/>
+          </a:p>
+        </p:txBody>
+      </p:sp>
+      <p:sp>
+        <p:nvSpPr>
+          <p:cNvPr id="35" name="Rectangle 34">
+            <a:extLst>
+              <a:ext uri="{FF2B5EF4-FFF2-40B4-BE49-F238E27FC236}">
+                <a16:creationId xmlns:a16="http://schemas.microsoft.com/office/drawing/2014/main" id="{EB631A7F-9293-44D6-84EB-87C9FB00F476}"/>
+              </a:ext>
+            </a:extLst>
+          </p:cNvPr>
+          <p:cNvSpPr/>
+          <p:nvPr/>
+        </p:nvSpPr>
+        <p:spPr>
+          <a:xfrm>
+            <a:off x="5189220" y="4301711"/>
+            <a:ext cx="1691640" cy="250334"/>
+          </a:xfrm>
+          <a:prstGeom prst="rect">
+            <a:avLst/>
+          </a:prstGeom>
+          <a:solidFill>
+            <a:schemeClr val="bg1"/>
+          </a:solidFill>
+          <a:ln>
+            <a:solidFill>
+              <a:schemeClr val="tx1"/>
+            </a:solidFill>
+          </a:ln>
+        </p:spPr>
+        <p:style>
+          <a:lnRef idx="2">
+            <a:schemeClr val="accent1">
+              <a:shade val="50000"/>
+            </a:schemeClr>
+          </a:lnRef>
+          <a:fillRef idx="1">
+            <a:schemeClr val="accent1"/>
+          </a:fillRef>
+          <a:effectRef idx="0">
+            <a:schemeClr val="accent1"/>
+          </a:effectRef>
+          <a:fontRef idx="minor">
+            <a:schemeClr val="lt1"/>
+          </a:fontRef>
+        </p:style>
+        <p:txBody>
+          <a:bodyPr rtlCol="0" anchor="ctr"/>
+          <a:lstStyle/>
+          <a:p>
+            <a:pPr algn="ctr"/>
+            <a:endParaRPr lang="fr-FR"/>
+          </a:p>
+        </p:txBody>
+      </p:sp>
+      <p:sp>
+        <p:nvSpPr>
+          <p:cNvPr id="36" name="Rectangle 35">
+            <a:extLst>
+              <a:ext uri="{FF2B5EF4-FFF2-40B4-BE49-F238E27FC236}">
+                <a16:creationId xmlns:a16="http://schemas.microsoft.com/office/drawing/2014/main" id="{40DD9B2A-B7C8-4282-979D-EA74832BD3F7}"/>
+              </a:ext>
+            </a:extLst>
+          </p:cNvPr>
+          <p:cNvSpPr/>
+          <p:nvPr/>
+        </p:nvSpPr>
+        <p:spPr>
+          <a:xfrm>
+            <a:off x="5189220" y="4696066"/>
+            <a:ext cx="906780" cy="250334"/>
+          </a:xfrm>
+          <a:prstGeom prst="rect">
+            <a:avLst/>
+          </a:prstGeom>
+          <a:solidFill>
+            <a:schemeClr val="bg1"/>
+          </a:solidFill>
+          <a:ln>
+            <a:solidFill>
+              <a:schemeClr val="tx1"/>
+            </a:solidFill>
+          </a:ln>
+        </p:spPr>
+        <p:style>
+          <a:lnRef idx="2">
+            <a:schemeClr val="accent1">
+              <a:shade val="50000"/>
+            </a:schemeClr>
+          </a:lnRef>
+          <a:fillRef idx="1">
+            <a:schemeClr val="accent1"/>
+          </a:fillRef>
+          <a:effectRef idx="0">
+            <a:schemeClr val="accent1"/>
+          </a:effectRef>
+          <a:fontRef idx="minor">
+            <a:schemeClr val="lt1"/>
+          </a:fontRef>
+        </p:style>
+        <p:txBody>
+          <a:bodyPr rtlCol="0" anchor="ctr"/>
+          <a:lstStyle/>
+          <a:p>
+            <a:pPr algn="ctr"/>
+            <a:endParaRPr lang="fr-FR"/>
+          </a:p>
+        </p:txBody>
+      </p:sp>
+      <p:sp>
+        <p:nvSpPr>
+          <p:cNvPr id="37" name="Rectangle 36">
+            <a:extLst>
+              <a:ext uri="{FF2B5EF4-FFF2-40B4-BE49-F238E27FC236}">
+                <a16:creationId xmlns:a16="http://schemas.microsoft.com/office/drawing/2014/main" id="{AFEAF407-1875-4B4D-902F-F83C24D2FEA7}"/>
+              </a:ext>
+            </a:extLst>
+          </p:cNvPr>
+          <p:cNvSpPr/>
+          <p:nvPr/>
+        </p:nvSpPr>
+        <p:spPr>
+          <a:xfrm>
+            <a:off x="5189220" y="5050668"/>
+            <a:ext cx="1691640" cy="250334"/>
+          </a:xfrm>
+          <a:prstGeom prst="rect">
+            <a:avLst/>
+          </a:prstGeom>
+          <a:solidFill>
+            <a:schemeClr val="bg1"/>
+          </a:solidFill>
+          <a:ln>
+            <a:solidFill>
+              <a:schemeClr val="tx1"/>
+            </a:solidFill>
+          </a:ln>
+        </p:spPr>
+        <p:style>
+          <a:lnRef idx="2">
+            <a:schemeClr val="accent1">
+              <a:shade val="50000"/>
+            </a:schemeClr>
+          </a:lnRef>
+          <a:fillRef idx="1">
+            <a:schemeClr val="accent1"/>
+          </a:fillRef>
+          <a:effectRef idx="0">
+            <a:schemeClr val="accent1"/>
+          </a:effectRef>
+          <a:fontRef idx="minor">
+            <a:schemeClr val="lt1"/>
+          </a:fontRef>
+        </p:style>
+        <p:txBody>
+          <a:bodyPr rtlCol="0" anchor="ctr"/>
+          <a:lstStyle/>
+          <a:p>
+            <a:pPr algn="ctr"/>
+            <a:endParaRPr lang="fr-FR"/>
+          </a:p>
+        </p:txBody>
+      </p:sp>
+      <p:sp>
+        <p:nvSpPr>
+          <p:cNvPr id="38" name="ZoneTexte 37">
+            <a:extLst>
+              <a:ext uri="{FF2B5EF4-FFF2-40B4-BE49-F238E27FC236}">
+                <a16:creationId xmlns:a16="http://schemas.microsoft.com/office/drawing/2014/main" id="{1A607C93-BBCE-4FF4-A4D7-07586DFD208A}"/>
+              </a:ext>
+            </a:extLst>
+          </p:cNvPr>
+          <p:cNvSpPr txBox="1"/>
+          <p:nvPr/>
+        </p:nvSpPr>
+        <p:spPr>
+          <a:xfrm>
+            <a:off x="6904879" y="3385916"/>
+            <a:ext cx="815340" cy="307777"/>
+          </a:xfrm>
+          <a:prstGeom prst="rect">
+            <a:avLst/>
+          </a:prstGeom>
+          <a:noFill/>
+        </p:spPr>
+        <p:txBody>
+          <a:bodyPr wrap="square" rtlCol="0">
+            <a:spAutoFit/>
+          </a:bodyPr>
+          <a:lstStyle/>
+          <a:p>
+            <a:r>
+              <a:rPr lang="fr-FR" sz="1400" dirty="0"/>
+              <a:t>Nom</a:t>
+            </a:r>
+          </a:p>
+        </p:txBody>
+      </p:sp>
+      <p:sp>
+        <p:nvSpPr>
+          <p:cNvPr id="39" name="ZoneTexte 38">
+            <a:extLst>
+              <a:ext uri="{FF2B5EF4-FFF2-40B4-BE49-F238E27FC236}">
+                <a16:creationId xmlns:a16="http://schemas.microsoft.com/office/drawing/2014/main" id="{B4619FAA-4628-42F5-933E-9A077D66D848}"/>
+              </a:ext>
+            </a:extLst>
+          </p:cNvPr>
+          <p:cNvSpPr txBox="1"/>
+          <p:nvPr/>
+        </p:nvSpPr>
+        <p:spPr>
+          <a:xfrm>
+            <a:off x="6904879" y="3848436"/>
+            <a:ext cx="815340" cy="307777"/>
+          </a:xfrm>
+          <a:prstGeom prst="rect">
+            <a:avLst/>
+          </a:prstGeom>
+          <a:noFill/>
+        </p:spPr>
+        <p:txBody>
+          <a:bodyPr wrap="square" rtlCol="0">
+            <a:spAutoFit/>
+          </a:bodyPr>
+          <a:lstStyle/>
+          <a:p>
+            <a:r>
+              <a:rPr lang="fr-FR" sz="1400" dirty="0"/>
+              <a:t>Prénom</a:t>
+            </a:r>
+          </a:p>
+        </p:txBody>
+      </p:sp>
+      <p:sp>
+        <p:nvSpPr>
+          <p:cNvPr id="40" name="ZoneTexte 39">
+            <a:extLst>
+              <a:ext uri="{FF2B5EF4-FFF2-40B4-BE49-F238E27FC236}">
+                <a16:creationId xmlns:a16="http://schemas.microsoft.com/office/drawing/2014/main" id="{F6AF643E-2930-4114-B9BD-98B844F19AEB}"/>
+              </a:ext>
+            </a:extLst>
+          </p:cNvPr>
+          <p:cNvSpPr txBox="1"/>
+          <p:nvPr/>
+        </p:nvSpPr>
+        <p:spPr>
+          <a:xfrm>
+            <a:off x="6904879" y="4271140"/>
+            <a:ext cx="815340" cy="307777"/>
+          </a:xfrm>
+          <a:prstGeom prst="rect">
+            <a:avLst/>
+          </a:prstGeom>
+          <a:noFill/>
+        </p:spPr>
+        <p:txBody>
+          <a:bodyPr wrap="square" rtlCol="0">
+            <a:spAutoFit/>
+          </a:bodyPr>
+          <a:lstStyle/>
+          <a:p>
+            <a:r>
+              <a:rPr lang="fr-FR" sz="1400" dirty="0"/>
+              <a:t>Adresse</a:t>
+            </a:r>
+          </a:p>
+        </p:txBody>
+      </p:sp>
+      <p:sp>
+        <p:nvSpPr>
+          <p:cNvPr id="41" name="ZoneTexte 40">
+            <a:extLst>
+              <a:ext uri="{FF2B5EF4-FFF2-40B4-BE49-F238E27FC236}">
+                <a16:creationId xmlns:a16="http://schemas.microsoft.com/office/drawing/2014/main" id="{DADD0E07-EFAE-4FE7-B0AC-5545C5E2A9DB}"/>
+              </a:ext>
+            </a:extLst>
+          </p:cNvPr>
+          <p:cNvSpPr txBox="1"/>
+          <p:nvPr/>
+        </p:nvSpPr>
+        <p:spPr>
+          <a:xfrm>
+            <a:off x="6148227" y="4635382"/>
+            <a:ext cx="1164322" cy="307777"/>
+          </a:xfrm>
+          <a:prstGeom prst="rect">
+            <a:avLst/>
+          </a:prstGeom>
+          <a:noFill/>
+        </p:spPr>
+        <p:txBody>
+          <a:bodyPr wrap="square" rtlCol="0">
+            <a:spAutoFit/>
+          </a:bodyPr>
+          <a:lstStyle/>
+          <a:p>
+            <a:r>
+              <a:rPr lang="fr-FR" sz="1400" dirty="0"/>
+              <a:t>Code Postal</a:t>
+            </a:r>
+          </a:p>
+        </p:txBody>
+      </p:sp>
+      <p:sp>
+        <p:nvSpPr>
+          <p:cNvPr id="42" name="ZoneTexte 41">
+            <a:extLst>
+              <a:ext uri="{FF2B5EF4-FFF2-40B4-BE49-F238E27FC236}">
+                <a16:creationId xmlns:a16="http://schemas.microsoft.com/office/drawing/2014/main" id="{86DBD71F-3EE9-4873-A115-894BAFF57A3E}"/>
+              </a:ext>
+            </a:extLst>
+          </p:cNvPr>
+          <p:cNvSpPr txBox="1"/>
+          <p:nvPr/>
+        </p:nvSpPr>
+        <p:spPr>
+          <a:xfrm>
+            <a:off x="6890193" y="5024486"/>
+            <a:ext cx="815340" cy="307777"/>
+          </a:xfrm>
+          <a:prstGeom prst="rect">
+            <a:avLst/>
+          </a:prstGeom>
+          <a:noFill/>
+        </p:spPr>
+        <p:txBody>
+          <a:bodyPr wrap="square" rtlCol="0">
+            <a:spAutoFit/>
+          </a:bodyPr>
+          <a:lstStyle/>
+          <a:p>
+            <a:r>
+              <a:rPr lang="fr-FR" sz="1400" dirty="0"/>
+              <a:t>Ville</a:t>
+            </a:r>
+          </a:p>
+        </p:txBody>
+      </p:sp>
+    </p:spTree>
+    <p:extLst>
+      <p:ext uri="{BB962C8B-B14F-4D97-AF65-F5344CB8AC3E}">
+        <p14:creationId xmlns:p14="http://schemas.microsoft.com/office/powerpoint/2010/main" val="3211264483"/>
+      </p:ext>
+    </p:extLst>
+  </p:cSld>
+  <p:clrMapOvr>
+    <a:masterClrMapping/>
+  </p:clrMapOvr>
+</p:sld>
+</file>
+
 <file path=ppt/theme/theme1.xml><?xml version="1.0" encoding="utf-8"?>
 <a:theme xmlns:a="http://schemas.openxmlformats.org/drawingml/2006/main" name="Thème Office">
   <a:themeElements>

</xml_diff>

<commit_message>
<create>303:preparation of the html and css of the main box at the screen
</commit_message>
<xml_diff>
--- a/01_annexes/Station MTO CESI-DI20.pptx
+++ b/01_annexes/Station MTO CESI-DI20.pptx
@@ -10,6 +10,8 @@
     <p:sldId id="258" r:id="rId4"/>
     <p:sldId id="259" r:id="rId5"/>
     <p:sldId id="260" r:id="rId6"/>
+    <p:sldId id="261" r:id="rId7"/>
+    <p:sldId id="262" r:id="rId8"/>
   </p:sldIdLst>
   <p:sldSz cx="12192000" cy="6858000"/>
   <p:notesSz cx="6858000" cy="9144000"/>
@@ -263,7 +265,7 @@
           <a:p>
             <a:fld id="{A84FBE1F-28F7-4FD3-94D2-8148694171D7}" type="datetimeFigureOut">
               <a:rPr lang="fr-FR" smtClean="0"/>
-              <a:t>29/01/2021</a:t>
+              <a:t>01/02/2021</a:t>
             </a:fld>
             <a:endParaRPr lang="fr-FR"/>
           </a:p>
@@ -461,7 +463,7 @@
           <a:p>
             <a:fld id="{A84FBE1F-28F7-4FD3-94D2-8148694171D7}" type="datetimeFigureOut">
               <a:rPr lang="fr-FR" smtClean="0"/>
-              <a:t>29/01/2021</a:t>
+              <a:t>01/02/2021</a:t>
             </a:fld>
             <a:endParaRPr lang="fr-FR"/>
           </a:p>
@@ -669,7 +671,7 @@
           <a:p>
             <a:fld id="{A84FBE1F-28F7-4FD3-94D2-8148694171D7}" type="datetimeFigureOut">
               <a:rPr lang="fr-FR" smtClean="0"/>
-              <a:t>29/01/2021</a:t>
+              <a:t>01/02/2021</a:t>
             </a:fld>
             <a:endParaRPr lang="fr-FR"/>
           </a:p>
@@ -867,7 +869,7 @@
           <a:p>
             <a:fld id="{A84FBE1F-28F7-4FD3-94D2-8148694171D7}" type="datetimeFigureOut">
               <a:rPr lang="fr-FR" smtClean="0"/>
-              <a:t>29/01/2021</a:t>
+              <a:t>01/02/2021</a:t>
             </a:fld>
             <a:endParaRPr lang="fr-FR"/>
           </a:p>
@@ -1142,7 +1144,7 @@
           <a:p>
             <a:fld id="{A84FBE1F-28F7-4FD3-94D2-8148694171D7}" type="datetimeFigureOut">
               <a:rPr lang="fr-FR" smtClean="0"/>
-              <a:t>29/01/2021</a:t>
+              <a:t>01/02/2021</a:t>
             </a:fld>
             <a:endParaRPr lang="fr-FR"/>
           </a:p>
@@ -1407,7 +1409,7 @@
           <a:p>
             <a:fld id="{A84FBE1F-28F7-4FD3-94D2-8148694171D7}" type="datetimeFigureOut">
               <a:rPr lang="fr-FR" smtClean="0"/>
-              <a:t>29/01/2021</a:t>
+              <a:t>01/02/2021</a:t>
             </a:fld>
             <a:endParaRPr lang="fr-FR"/>
           </a:p>
@@ -1819,7 +1821,7 @@
           <a:p>
             <a:fld id="{A84FBE1F-28F7-4FD3-94D2-8148694171D7}" type="datetimeFigureOut">
               <a:rPr lang="fr-FR" smtClean="0"/>
-              <a:t>29/01/2021</a:t>
+              <a:t>01/02/2021</a:t>
             </a:fld>
             <a:endParaRPr lang="fr-FR"/>
           </a:p>
@@ -1960,7 +1962,7 @@
           <a:p>
             <a:fld id="{A84FBE1F-28F7-4FD3-94D2-8148694171D7}" type="datetimeFigureOut">
               <a:rPr lang="fr-FR" smtClean="0"/>
-              <a:t>29/01/2021</a:t>
+              <a:t>01/02/2021</a:t>
             </a:fld>
             <a:endParaRPr lang="fr-FR"/>
           </a:p>
@@ -2073,7 +2075,7 @@
           <a:p>
             <a:fld id="{A84FBE1F-28F7-4FD3-94D2-8148694171D7}" type="datetimeFigureOut">
               <a:rPr lang="fr-FR" smtClean="0"/>
-              <a:t>29/01/2021</a:t>
+              <a:t>01/02/2021</a:t>
             </a:fld>
             <a:endParaRPr lang="fr-FR"/>
           </a:p>
@@ -2384,7 +2386,7 @@
           <a:p>
             <a:fld id="{A84FBE1F-28F7-4FD3-94D2-8148694171D7}" type="datetimeFigureOut">
               <a:rPr lang="fr-FR" smtClean="0"/>
-              <a:t>29/01/2021</a:t>
+              <a:t>01/02/2021</a:t>
             </a:fld>
             <a:endParaRPr lang="fr-FR"/>
           </a:p>
@@ -2672,7 +2674,7 @@
           <a:p>
             <a:fld id="{A84FBE1F-28F7-4FD3-94D2-8148694171D7}" type="datetimeFigureOut">
               <a:rPr lang="fr-FR" smtClean="0"/>
-              <a:t>29/01/2021</a:t>
+              <a:t>01/02/2021</a:t>
             </a:fld>
             <a:endParaRPr lang="fr-FR"/>
           </a:p>
@@ -2913,7 +2915,7 @@
           <a:p>
             <a:fld id="{A84FBE1F-28F7-4FD3-94D2-8148694171D7}" type="datetimeFigureOut">
               <a:rPr lang="fr-FR" smtClean="0"/>
-              <a:t>29/01/2021</a:t>
+              <a:t>01/02/2021</a:t>
             </a:fld>
             <a:endParaRPr lang="fr-FR"/>
           </a:p>
@@ -8722,6 +8724,102 @@
 </p:sld>
 </file>
 
+<file path=ppt/slides/slide6.xml><?xml version="1.0" encoding="utf-8"?>
+<p:sld xmlns:a="http://schemas.openxmlformats.org/drawingml/2006/main" xmlns:r="http://schemas.openxmlformats.org/officeDocument/2006/relationships" xmlns:p="http://schemas.openxmlformats.org/presentationml/2006/main">
+  <p:cSld>
+    <p:spTree>
+      <p:nvGrpSpPr>
+        <p:cNvPr id="1" name=""/>
+        <p:cNvGrpSpPr/>
+        <p:nvPr/>
+      </p:nvGrpSpPr>
+      <p:grpSpPr>
+        <a:xfrm>
+          <a:off x="0" y="0"/>
+          <a:ext cx="0" cy="0"/>
+          <a:chOff x="0" y="0"/>
+          <a:chExt cx="0" cy="0"/>
+        </a:xfrm>
+      </p:grpSpPr>
+      <p:pic>
+        <p:nvPicPr>
+          <p:cNvPr id="5" name="Image 4">
+            <a:extLst>
+              <a:ext uri="{FF2B5EF4-FFF2-40B4-BE49-F238E27FC236}">
+                <a16:creationId xmlns:a16="http://schemas.microsoft.com/office/drawing/2014/main" id="{CF1017FB-1973-497F-A656-F7BE38F33CDC}"/>
+              </a:ext>
+            </a:extLst>
+          </p:cNvPr>
+          <p:cNvPicPr>
+            <a:picLocks noChangeAspect="1"/>
+          </p:cNvPicPr>
+          <p:nvPr/>
+        </p:nvPicPr>
+        <p:blipFill>
+          <a:blip r:embed="rId2">
+            <a:extLst>
+              <a:ext uri="{28A0092B-C50C-407E-A947-70E740481C1C}">
+                <a14:useLocalDpi xmlns:a14="http://schemas.microsoft.com/office/drawing/2010/main" val="0"/>
+              </a:ext>
+            </a:extLst>
+          </a:blip>
+          <a:stretch>
+            <a:fillRect/>
+          </a:stretch>
+        </p:blipFill>
+        <p:spPr>
+          <a:xfrm>
+            <a:off x="2429176" y="310064"/>
+            <a:ext cx="6509084" cy="6237872"/>
+          </a:xfrm>
+          <a:prstGeom prst="rect">
+            <a:avLst/>
+          </a:prstGeom>
+        </p:spPr>
+      </p:pic>
+    </p:spTree>
+    <p:extLst>
+      <p:ext uri="{BB962C8B-B14F-4D97-AF65-F5344CB8AC3E}">
+        <p14:creationId xmlns:p14="http://schemas.microsoft.com/office/powerpoint/2010/main" val="2600298490"/>
+      </p:ext>
+    </p:extLst>
+  </p:cSld>
+  <p:clrMapOvr>
+    <a:masterClrMapping/>
+  </p:clrMapOvr>
+</p:sld>
+</file>
+
+<file path=ppt/slides/slide7.xml><?xml version="1.0" encoding="utf-8"?>
+<p:sld xmlns:a="http://schemas.openxmlformats.org/drawingml/2006/main" xmlns:r="http://schemas.openxmlformats.org/officeDocument/2006/relationships" xmlns:p="http://schemas.openxmlformats.org/presentationml/2006/main">
+  <p:cSld>
+    <p:spTree>
+      <p:nvGrpSpPr>
+        <p:cNvPr id="1" name=""/>
+        <p:cNvGrpSpPr/>
+        <p:nvPr/>
+      </p:nvGrpSpPr>
+      <p:grpSpPr>
+        <a:xfrm>
+          <a:off x="0" y="0"/>
+          <a:ext cx="0" cy="0"/>
+          <a:chOff x="0" y="0"/>
+          <a:chExt cx="0" cy="0"/>
+        </a:xfrm>
+      </p:grpSpPr>
+    </p:spTree>
+    <p:extLst>
+      <p:ext uri="{BB962C8B-B14F-4D97-AF65-F5344CB8AC3E}">
+        <p14:creationId xmlns:p14="http://schemas.microsoft.com/office/powerpoint/2010/main" val="3861164007"/>
+      </p:ext>
+    </p:extLst>
+  </p:cSld>
+  <p:clrMapOvr>
+    <a:masterClrMapping/>
+  </p:clrMapOvr>
+</p:sld>
+</file>
+
 <file path=ppt/theme/theme1.xml><?xml version="1.0" encoding="utf-8"?>
 <a:theme xmlns:a="http://schemas.openxmlformats.org/drawingml/2006/main" name="Thème Office">
   <a:themeElements>

</xml_diff>

<commit_message>
<feat>3031:css history by creation of wethear boxes
</commit_message>
<xml_diff>
--- a/01_annexes/Station MTO CESI-DI20.pptx
+++ b/01_annexes/Station MTO CESI-DI20.pptx
@@ -10,8 +10,9 @@
     <p:sldId id="258" r:id="rId4"/>
     <p:sldId id="259" r:id="rId5"/>
     <p:sldId id="260" r:id="rId6"/>
-    <p:sldId id="261" r:id="rId7"/>
-    <p:sldId id="262" r:id="rId8"/>
+    <p:sldId id="263" r:id="rId7"/>
+    <p:sldId id="261" r:id="rId8"/>
+    <p:sldId id="262" r:id="rId9"/>
   </p:sldIdLst>
   <p:sldSz cx="12192000" cy="6858000"/>
   <p:notesSz cx="6858000" cy="9144000"/>
@@ -265,7 +266,7 @@
           <a:p>
             <a:fld id="{A84FBE1F-28F7-4FD3-94D2-8148694171D7}" type="datetimeFigureOut">
               <a:rPr lang="fr-FR" smtClean="0"/>
-              <a:t>01/02/2021</a:t>
+              <a:t>09/02/2021</a:t>
             </a:fld>
             <a:endParaRPr lang="fr-FR"/>
           </a:p>
@@ -463,7 +464,7 @@
           <a:p>
             <a:fld id="{A84FBE1F-28F7-4FD3-94D2-8148694171D7}" type="datetimeFigureOut">
               <a:rPr lang="fr-FR" smtClean="0"/>
-              <a:t>01/02/2021</a:t>
+              <a:t>09/02/2021</a:t>
             </a:fld>
             <a:endParaRPr lang="fr-FR"/>
           </a:p>
@@ -671,7 +672,7 @@
           <a:p>
             <a:fld id="{A84FBE1F-28F7-4FD3-94D2-8148694171D7}" type="datetimeFigureOut">
               <a:rPr lang="fr-FR" smtClean="0"/>
-              <a:t>01/02/2021</a:t>
+              <a:t>09/02/2021</a:t>
             </a:fld>
             <a:endParaRPr lang="fr-FR"/>
           </a:p>
@@ -869,7 +870,7 @@
           <a:p>
             <a:fld id="{A84FBE1F-28F7-4FD3-94D2-8148694171D7}" type="datetimeFigureOut">
               <a:rPr lang="fr-FR" smtClean="0"/>
-              <a:t>01/02/2021</a:t>
+              <a:t>09/02/2021</a:t>
             </a:fld>
             <a:endParaRPr lang="fr-FR"/>
           </a:p>
@@ -1144,7 +1145,7 @@
           <a:p>
             <a:fld id="{A84FBE1F-28F7-4FD3-94D2-8148694171D7}" type="datetimeFigureOut">
               <a:rPr lang="fr-FR" smtClean="0"/>
-              <a:t>01/02/2021</a:t>
+              <a:t>09/02/2021</a:t>
             </a:fld>
             <a:endParaRPr lang="fr-FR"/>
           </a:p>
@@ -1409,7 +1410,7 @@
           <a:p>
             <a:fld id="{A84FBE1F-28F7-4FD3-94D2-8148694171D7}" type="datetimeFigureOut">
               <a:rPr lang="fr-FR" smtClean="0"/>
-              <a:t>01/02/2021</a:t>
+              <a:t>09/02/2021</a:t>
             </a:fld>
             <a:endParaRPr lang="fr-FR"/>
           </a:p>
@@ -1821,7 +1822,7 @@
           <a:p>
             <a:fld id="{A84FBE1F-28F7-4FD3-94D2-8148694171D7}" type="datetimeFigureOut">
               <a:rPr lang="fr-FR" smtClean="0"/>
-              <a:t>01/02/2021</a:t>
+              <a:t>09/02/2021</a:t>
             </a:fld>
             <a:endParaRPr lang="fr-FR"/>
           </a:p>
@@ -1962,7 +1963,7 @@
           <a:p>
             <a:fld id="{A84FBE1F-28F7-4FD3-94D2-8148694171D7}" type="datetimeFigureOut">
               <a:rPr lang="fr-FR" smtClean="0"/>
-              <a:t>01/02/2021</a:t>
+              <a:t>09/02/2021</a:t>
             </a:fld>
             <a:endParaRPr lang="fr-FR"/>
           </a:p>
@@ -2075,7 +2076,7 @@
           <a:p>
             <a:fld id="{A84FBE1F-28F7-4FD3-94D2-8148694171D7}" type="datetimeFigureOut">
               <a:rPr lang="fr-FR" smtClean="0"/>
-              <a:t>01/02/2021</a:t>
+              <a:t>09/02/2021</a:t>
             </a:fld>
             <a:endParaRPr lang="fr-FR"/>
           </a:p>
@@ -2386,7 +2387,7 @@
           <a:p>
             <a:fld id="{A84FBE1F-28F7-4FD3-94D2-8148694171D7}" type="datetimeFigureOut">
               <a:rPr lang="fr-FR" smtClean="0"/>
-              <a:t>01/02/2021</a:t>
+              <a:t>09/02/2021</a:t>
             </a:fld>
             <a:endParaRPr lang="fr-FR"/>
           </a:p>
@@ -2674,7 +2675,7 @@
           <a:p>
             <a:fld id="{A84FBE1F-28F7-4FD3-94D2-8148694171D7}" type="datetimeFigureOut">
               <a:rPr lang="fr-FR" smtClean="0"/>
-              <a:t>01/02/2021</a:t>
+              <a:t>09/02/2021</a:t>
             </a:fld>
             <a:endParaRPr lang="fr-FR"/>
           </a:p>
@@ -2915,7 +2916,7 @@
           <a:p>
             <a:fld id="{A84FBE1F-28F7-4FD3-94D2-8148694171D7}" type="datetimeFigureOut">
               <a:rPr lang="fr-FR" smtClean="0"/>
-              <a:t>01/02/2021</a:t>
+              <a:t>09/02/2021</a:t>
             </a:fld>
             <a:endParaRPr lang="fr-FR"/>
           </a:p>
@@ -8743,6 +8744,2503 @@
       </p:grpSpPr>
       <p:pic>
         <p:nvPicPr>
+          <p:cNvPr id="4" name="Image 3" descr="Une image contenant texte&#10;&#10;Description générée automatiquement">
+            <a:extLst>
+              <a:ext uri="{FF2B5EF4-FFF2-40B4-BE49-F238E27FC236}">
+                <a16:creationId xmlns:a16="http://schemas.microsoft.com/office/drawing/2014/main" id="{4ADEF9A3-986E-4B19-96E6-C4657A37C070}"/>
+              </a:ext>
+            </a:extLst>
+          </p:cNvPr>
+          <p:cNvPicPr>
+            <a:picLocks noChangeAspect="1"/>
+          </p:cNvPicPr>
+          <p:nvPr/>
+        </p:nvPicPr>
+        <p:blipFill>
+          <a:blip r:embed="rId2">
+            <a:extLst>
+              <a:ext uri="{28A0092B-C50C-407E-A947-70E740481C1C}">
+                <a14:useLocalDpi xmlns:a14="http://schemas.microsoft.com/office/drawing/2010/main" val="0"/>
+              </a:ext>
+            </a:extLst>
+          </a:blip>
+          <a:stretch>
+            <a:fillRect/>
+          </a:stretch>
+        </p:blipFill>
+        <p:spPr>
+          <a:xfrm>
+            <a:off x="2962276" y="643467"/>
+            <a:ext cx="6267447" cy="5571065"/>
+          </a:xfrm>
+          <a:prstGeom prst="rect">
+            <a:avLst/>
+          </a:prstGeom>
+          <a:ln>
+            <a:noFill/>
+          </a:ln>
+        </p:spPr>
+      </p:pic>
+      <p:sp>
+        <p:nvSpPr>
+          <p:cNvPr id="5" name="Rectangle 4">
+            <a:extLst>
+              <a:ext uri="{FF2B5EF4-FFF2-40B4-BE49-F238E27FC236}">
+                <a16:creationId xmlns:a16="http://schemas.microsoft.com/office/drawing/2014/main" id="{B0AC15B6-6E48-47FC-9CB3-EA05015D71BF}"/>
+              </a:ext>
+            </a:extLst>
+          </p:cNvPr>
+          <p:cNvSpPr/>
+          <p:nvPr/>
+        </p:nvSpPr>
+        <p:spPr>
+          <a:xfrm>
+            <a:off x="2993458" y="1645920"/>
+            <a:ext cx="6205086" cy="529389"/>
+          </a:xfrm>
+          <a:prstGeom prst="rect">
+            <a:avLst/>
+          </a:prstGeom>
+          <a:solidFill>
+            <a:schemeClr val="bg1"/>
+          </a:solidFill>
+          <a:ln>
+            <a:solidFill>
+              <a:schemeClr val="tx1"/>
+            </a:solidFill>
+          </a:ln>
+        </p:spPr>
+        <p:style>
+          <a:lnRef idx="2">
+            <a:schemeClr val="accent1">
+              <a:shade val="50000"/>
+            </a:schemeClr>
+          </a:lnRef>
+          <a:fillRef idx="1">
+            <a:schemeClr val="accent1"/>
+          </a:fillRef>
+          <a:effectRef idx="0">
+            <a:schemeClr val="accent1"/>
+          </a:effectRef>
+          <a:fontRef idx="minor">
+            <a:schemeClr val="lt1"/>
+          </a:fontRef>
+        </p:style>
+        <p:txBody>
+          <a:bodyPr rtlCol="0" anchor="ctr"/>
+          <a:lstStyle/>
+          <a:p>
+            <a:pPr algn="ctr"/>
+            <a:endParaRPr lang="fr-FR">
+              <a:ln>
+                <a:solidFill>
+                  <a:sysClr val="windowText" lastClr="000000"/>
+                </a:solidFill>
+              </a:ln>
+            </a:endParaRPr>
+          </a:p>
+        </p:txBody>
+      </p:sp>
+      <p:pic>
+        <p:nvPicPr>
+          <p:cNvPr id="6" name="Image 5">
+            <a:extLst>
+              <a:ext uri="{FF2B5EF4-FFF2-40B4-BE49-F238E27FC236}">
+                <a16:creationId xmlns:a16="http://schemas.microsoft.com/office/drawing/2014/main" id="{4B590731-7371-4AA6-900D-274B8926171D}"/>
+              </a:ext>
+            </a:extLst>
+          </p:cNvPr>
+          <p:cNvPicPr>
+            <a:picLocks noChangeAspect="1"/>
+          </p:cNvPicPr>
+          <p:nvPr/>
+        </p:nvPicPr>
+        <p:blipFill>
+          <a:blip r:embed="rId3">
+            <a:extLst>
+              <a:ext uri="{28A0092B-C50C-407E-A947-70E740481C1C}">
+                <a14:useLocalDpi xmlns:a14="http://schemas.microsoft.com/office/drawing/2010/main" val="0"/>
+              </a:ext>
+            </a:extLst>
+          </a:blip>
+          <a:stretch>
+            <a:fillRect/>
+          </a:stretch>
+        </p:blipFill>
+        <p:spPr>
+          <a:xfrm>
+            <a:off x="3218887" y="1770674"/>
+            <a:ext cx="349294" cy="349294"/>
+          </a:xfrm>
+          <a:prstGeom prst="rect">
+            <a:avLst/>
+          </a:prstGeom>
+        </p:spPr>
+      </p:pic>
+      <p:sp>
+        <p:nvSpPr>
+          <p:cNvPr id="7" name="ZoneTexte 6">
+            <a:extLst>
+              <a:ext uri="{FF2B5EF4-FFF2-40B4-BE49-F238E27FC236}">
+                <a16:creationId xmlns:a16="http://schemas.microsoft.com/office/drawing/2014/main" id="{72C0A644-15DD-4B5A-96FE-06BB0073DDAC}"/>
+              </a:ext>
+            </a:extLst>
+          </p:cNvPr>
+          <p:cNvSpPr txBox="1"/>
+          <p:nvPr/>
+        </p:nvSpPr>
+        <p:spPr>
+          <a:xfrm>
+            <a:off x="3940573" y="1725948"/>
+            <a:ext cx="2301201" cy="369332"/>
+          </a:xfrm>
+          <a:prstGeom prst="rect">
+            <a:avLst/>
+          </a:prstGeom>
+          <a:noFill/>
+        </p:spPr>
+        <p:txBody>
+          <a:bodyPr wrap="square" rtlCol="0">
+            <a:spAutoFit/>
+          </a:bodyPr>
+          <a:lstStyle/>
+          <a:p>
+            <a:r>
+              <a:rPr lang="fr-FR" b="1" dirty="0"/>
+              <a:t>Bonjour </a:t>
+            </a:r>
+            <a:r>
+              <a:rPr lang="fr-FR" b="1" i="1" dirty="0"/>
+              <a:t>Nom Prénom</a:t>
+            </a:r>
+            <a:endParaRPr lang="fr-FR" b="1" dirty="0"/>
+          </a:p>
+        </p:txBody>
+      </p:sp>
+      <p:pic>
+        <p:nvPicPr>
+          <p:cNvPr id="8" name="Image 7">
+            <a:extLst>
+              <a:ext uri="{FF2B5EF4-FFF2-40B4-BE49-F238E27FC236}">
+                <a16:creationId xmlns:a16="http://schemas.microsoft.com/office/drawing/2014/main" id="{A63B9788-AC6E-4F95-9E2A-2AB91E89BB55}"/>
+              </a:ext>
+            </a:extLst>
+          </p:cNvPr>
+          <p:cNvPicPr>
+            <a:picLocks noChangeAspect="1"/>
+          </p:cNvPicPr>
+          <p:nvPr/>
+        </p:nvPicPr>
+        <p:blipFill>
+          <a:blip r:embed="rId4">
+            <a:extLst>
+              <a:ext uri="{28A0092B-C50C-407E-A947-70E740481C1C}">
+                <a14:useLocalDpi xmlns:a14="http://schemas.microsoft.com/office/drawing/2010/main" val="0"/>
+              </a:ext>
+            </a:extLst>
+          </a:blip>
+          <a:stretch>
+            <a:fillRect/>
+          </a:stretch>
+        </p:blipFill>
+        <p:spPr>
+          <a:xfrm>
+            <a:off x="8418983" y="1714309"/>
+            <a:ext cx="392609" cy="392609"/>
+          </a:xfrm>
+          <a:prstGeom prst="rect">
+            <a:avLst/>
+          </a:prstGeom>
+        </p:spPr>
+      </p:pic>
+      <p:sp>
+        <p:nvSpPr>
+          <p:cNvPr id="17" name="Rectangle 16">
+            <a:extLst>
+              <a:ext uri="{FF2B5EF4-FFF2-40B4-BE49-F238E27FC236}">
+                <a16:creationId xmlns:a16="http://schemas.microsoft.com/office/drawing/2014/main" id="{DBB83D62-26BC-4D5E-A3A9-BA6F6B9FCCA9}"/>
+              </a:ext>
+            </a:extLst>
+          </p:cNvPr>
+          <p:cNvSpPr/>
+          <p:nvPr/>
+        </p:nvSpPr>
+        <p:spPr>
+          <a:xfrm>
+            <a:off x="2993458" y="2186946"/>
+            <a:ext cx="1247238" cy="3630758"/>
+          </a:xfrm>
+          <a:prstGeom prst="rect">
+            <a:avLst/>
+          </a:prstGeom>
+          <a:solidFill>
+            <a:schemeClr val="bg1"/>
+          </a:solidFill>
+          <a:ln>
+            <a:solidFill>
+              <a:schemeClr val="tx1"/>
+            </a:solidFill>
+          </a:ln>
+        </p:spPr>
+        <p:style>
+          <a:lnRef idx="2">
+            <a:schemeClr val="accent1">
+              <a:shade val="50000"/>
+            </a:schemeClr>
+          </a:lnRef>
+          <a:fillRef idx="1">
+            <a:schemeClr val="accent1"/>
+          </a:fillRef>
+          <a:effectRef idx="0">
+            <a:schemeClr val="accent1"/>
+          </a:effectRef>
+          <a:fontRef idx="minor">
+            <a:schemeClr val="lt1"/>
+          </a:fontRef>
+        </p:style>
+        <p:txBody>
+          <a:bodyPr rtlCol="0" anchor="ctr"/>
+          <a:lstStyle/>
+          <a:p>
+            <a:pPr algn="ctr"/>
+            <a:endParaRPr lang="fr-FR"/>
+          </a:p>
+        </p:txBody>
+      </p:sp>
+      <p:pic>
+        <p:nvPicPr>
+          <p:cNvPr id="18" name="Image 17">
+            <a:extLst>
+              <a:ext uri="{FF2B5EF4-FFF2-40B4-BE49-F238E27FC236}">
+                <a16:creationId xmlns:a16="http://schemas.microsoft.com/office/drawing/2014/main" id="{2E636F0D-AC99-4B44-AB14-646F3CCC8F8F}"/>
+              </a:ext>
+            </a:extLst>
+          </p:cNvPr>
+          <p:cNvPicPr>
+            <a:picLocks noChangeAspect="1"/>
+          </p:cNvPicPr>
+          <p:nvPr/>
+        </p:nvPicPr>
+        <p:blipFill>
+          <a:blip r:embed="rId5">
+            <a:extLst>
+              <a:ext uri="{28A0092B-C50C-407E-A947-70E740481C1C}">
+                <a14:useLocalDpi xmlns:a14="http://schemas.microsoft.com/office/drawing/2010/main" val="0"/>
+              </a:ext>
+            </a:extLst>
+          </a:blip>
+          <a:stretch>
+            <a:fillRect/>
+          </a:stretch>
+        </p:blipFill>
+        <p:spPr>
+          <a:xfrm>
+            <a:off x="3064055" y="2438328"/>
+            <a:ext cx="309663" cy="309663"/>
+          </a:xfrm>
+          <a:prstGeom prst="rect">
+            <a:avLst/>
+          </a:prstGeom>
+        </p:spPr>
+      </p:pic>
+      <p:pic>
+        <p:nvPicPr>
+          <p:cNvPr id="19" name="Image 18">
+            <a:extLst>
+              <a:ext uri="{FF2B5EF4-FFF2-40B4-BE49-F238E27FC236}">
+                <a16:creationId xmlns:a16="http://schemas.microsoft.com/office/drawing/2014/main" id="{E32CA071-5C53-4A94-87BB-F46692DDC4C9}"/>
+              </a:ext>
+            </a:extLst>
+          </p:cNvPr>
+          <p:cNvPicPr>
+            <a:picLocks noChangeAspect="1"/>
+          </p:cNvPicPr>
+          <p:nvPr/>
+        </p:nvPicPr>
+        <p:blipFill>
+          <a:blip r:embed="rId6">
+            <a:extLst>
+              <a:ext uri="{28A0092B-C50C-407E-A947-70E740481C1C}">
+                <a14:useLocalDpi xmlns:a14="http://schemas.microsoft.com/office/drawing/2010/main" val="0"/>
+              </a:ext>
+            </a:extLst>
+          </a:blip>
+          <a:stretch>
+            <a:fillRect/>
+          </a:stretch>
+        </p:blipFill>
+        <p:spPr>
+          <a:xfrm>
+            <a:off x="3064055" y="2970109"/>
+            <a:ext cx="309663" cy="309663"/>
+          </a:xfrm>
+          <a:prstGeom prst="rect">
+            <a:avLst/>
+          </a:prstGeom>
+        </p:spPr>
+      </p:pic>
+      <p:pic>
+        <p:nvPicPr>
+          <p:cNvPr id="20" name="Image 19">
+            <a:extLst>
+              <a:ext uri="{FF2B5EF4-FFF2-40B4-BE49-F238E27FC236}">
+                <a16:creationId xmlns:a16="http://schemas.microsoft.com/office/drawing/2014/main" id="{F4F8C8F0-8690-4732-A613-E82ED3585739}"/>
+              </a:ext>
+            </a:extLst>
+          </p:cNvPr>
+          <p:cNvPicPr>
+            <a:picLocks noChangeAspect="1"/>
+          </p:cNvPicPr>
+          <p:nvPr/>
+        </p:nvPicPr>
+        <p:blipFill>
+          <a:blip r:embed="rId7">
+            <a:extLst>
+              <a:ext uri="{28A0092B-C50C-407E-A947-70E740481C1C}">
+                <a14:useLocalDpi xmlns:a14="http://schemas.microsoft.com/office/drawing/2010/main" val="0"/>
+              </a:ext>
+            </a:extLst>
+          </a:blip>
+          <a:stretch>
+            <a:fillRect/>
+          </a:stretch>
+        </p:blipFill>
+        <p:spPr>
+          <a:xfrm>
+            <a:off x="3064055" y="3496892"/>
+            <a:ext cx="309663" cy="309663"/>
+          </a:xfrm>
+          <a:prstGeom prst="rect">
+            <a:avLst/>
+          </a:prstGeom>
+        </p:spPr>
+      </p:pic>
+      <p:pic>
+        <p:nvPicPr>
+          <p:cNvPr id="21" name="Image 20">
+            <a:extLst>
+              <a:ext uri="{FF2B5EF4-FFF2-40B4-BE49-F238E27FC236}">
+                <a16:creationId xmlns:a16="http://schemas.microsoft.com/office/drawing/2014/main" id="{B338BA68-85B8-4AE9-861F-732B1ECB0017}"/>
+              </a:ext>
+            </a:extLst>
+          </p:cNvPr>
+          <p:cNvPicPr>
+            <a:picLocks noChangeAspect="1"/>
+          </p:cNvPicPr>
+          <p:nvPr/>
+        </p:nvPicPr>
+        <p:blipFill>
+          <a:blip r:embed="rId8">
+            <a:extLst>
+              <a:ext uri="{28A0092B-C50C-407E-A947-70E740481C1C}">
+                <a14:useLocalDpi xmlns:a14="http://schemas.microsoft.com/office/drawing/2010/main" val="0"/>
+              </a:ext>
+            </a:extLst>
+          </a:blip>
+          <a:stretch>
+            <a:fillRect/>
+          </a:stretch>
+        </p:blipFill>
+        <p:spPr>
+          <a:xfrm>
+            <a:off x="3064054" y="4057205"/>
+            <a:ext cx="309663" cy="309663"/>
+          </a:xfrm>
+          <a:prstGeom prst="rect">
+            <a:avLst/>
+          </a:prstGeom>
+        </p:spPr>
+      </p:pic>
+      <p:pic>
+        <p:nvPicPr>
+          <p:cNvPr id="22" name="Image 21">
+            <a:extLst>
+              <a:ext uri="{FF2B5EF4-FFF2-40B4-BE49-F238E27FC236}">
+                <a16:creationId xmlns:a16="http://schemas.microsoft.com/office/drawing/2014/main" id="{FB2423BC-197C-4BA5-8875-03FB4817B874}"/>
+              </a:ext>
+            </a:extLst>
+          </p:cNvPr>
+          <p:cNvPicPr>
+            <a:picLocks noChangeAspect="1"/>
+          </p:cNvPicPr>
+          <p:nvPr/>
+        </p:nvPicPr>
+        <p:blipFill>
+          <a:blip r:embed="rId9">
+            <a:extLst>
+              <a:ext uri="{28A0092B-C50C-407E-A947-70E740481C1C}">
+                <a14:useLocalDpi xmlns:a14="http://schemas.microsoft.com/office/drawing/2010/main" val="0"/>
+              </a:ext>
+            </a:extLst>
+          </a:blip>
+          <a:stretch>
+            <a:fillRect/>
+          </a:stretch>
+        </p:blipFill>
+        <p:spPr>
+          <a:xfrm>
+            <a:off x="3064055" y="4617518"/>
+            <a:ext cx="309663" cy="309663"/>
+          </a:xfrm>
+          <a:prstGeom prst="rect">
+            <a:avLst/>
+          </a:prstGeom>
+        </p:spPr>
+      </p:pic>
+      <p:pic>
+        <p:nvPicPr>
+          <p:cNvPr id="23" name="Image 22">
+            <a:extLst>
+              <a:ext uri="{FF2B5EF4-FFF2-40B4-BE49-F238E27FC236}">
+                <a16:creationId xmlns:a16="http://schemas.microsoft.com/office/drawing/2014/main" id="{8C78E5E5-0ABB-4E55-BBDD-6A2A38B0CC39}"/>
+              </a:ext>
+            </a:extLst>
+          </p:cNvPr>
+          <p:cNvPicPr>
+            <a:picLocks noChangeAspect="1"/>
+          </p:cNvPicPr>
+          <p:nvPr/>
+        </p:nvPicPr>
+        <p:blipFill>
+          <a:blip r:embed="rId10">
+            <a:extLst>
+              <a:ext uri="{28A0092B-C50C-407E-A947-70E740481C1C}">
+                <a14:useLocalDpi xmlns:a14="http://schemas.microsoft.com/office/drawing/2010/main" val="0"/>
+              </a:ext>
+            </a:extLst>
+          </a:blip>
+          <a:stretch>
+            <a:fillRect/>
+          </a:stretch>
+        </p:blipFill>
+        <p:spPr>
+          <a:xfrm>
+            <a:off x="3083871" y="5175597"/>
+            <a:ext cx="309663" cy="309663"/>
+          </a:xfrm>
+          <a:prstGeom prst="rect">
+            <a:avLst/>
+          </a:prstGeom>
+        </p:spPr>
+      </p:pic>
+      <p:sp>
+        <p:nvSpPr>
+          <p:cNvPr id="24" name="ZoneTexte 23">
+            <a:extLst>
+              <a:ext uri="{FF2B5EF4-FFF2-40B4-BE49-F238E27FC236}">
+                <a16:creationId xmlns:a16="http://schemas.microsoft.com/office/drawing/2014/main" id="{86C15D8A-3F59-4EF8-9A2F-B5E37270E84F}"/>
+              </a:ext>
+            </a:extLst>
+          </p:cNvPr>
+          <p:cNvSpPr txBox="1"/>
+          <p:nvPr/>
+        </p:nvSpPr>
+        <p:spPr>
+          <a:xfrm>
+            <a:off x="3393534" y="2438328"/>
+            <a:ext cx="847161" cy="307777"/>
+          </a:xfrm>
+          <a:prstGeom prst="rect">
+            <a:avLst/>
+          </a:prstGeom>
+          <a:noFill/>
+        </p:spPr>
+        <p:txBody>
+          <a:bodyPr wrap="square" rtlCol="0">
+            <a:spAutoFit/>
+          </a:bodyPr>
+          <a:lstStyle/>
+          <a:p>
+            <a:r>
+              <a:rPr lang="fr-FR" sz="1400" b="1" dirty="0"/>
+              <a:t>Accueil</a:t>
+            </a:r>
+          </a:p>
+        </p:txBody>
+      </p:sp>
+      <p:sp>
+        <p:nvSpPr>
+          <p:cNvPr id="25" name="ZoneTexte 24">
+            <a:extLst>
+              <a:ext uri="{FF2B5EF4-FFF2-40B4-BE49-F238E27FC236}">
+                <a16:creationId xmlns:a16="http://schemas.microsoft.com/office/drawing/2014/main" id="{F77F4588-2766-44E0-9EEE-00DD7866A093}"/>
+              </a:ext>
+            </a:extLst>
+          </p:cNvPr>
+          <p:cNvSpPr txBox="1"/>
+          <p:nvPr/>
+        </p:nvSpPr>
+        <p:spPr>
+          <a:xfrm>
+            <a:off x="3373717" y="2961367"/>
+            <a:ext cx="866978" cy="307777"/>
+          </a:xfrm>
+          <a:prstGeom prst="rect">
+            <a:avLst/>
+          </a:prstGeom>
+          <a:noFill/>
+        </p:spPr>
+        <p:txBody>
+          <a:bodyPr wrap="square" rtlCol="0">
+            <a:spAutoFit/>
+          </a:bodyPr>
+          <a:lstStyle/>
+          <a:p>
+            <a:r>
+              <a:rPr lang="fr-FR" sz="1400" b="1" dirty="0"/>
+              <a:t>S’inscrire</a:t>
+            </a:r>
+          </a:p>
+        </p:txBody>
+      </p:sp>
+      <p:sp>
+        <p:nvSpPr>
+          <p:cNvPr id="26" name="ZoneTexte 25">
+            <a:extLst>
+              <a:ext uri="{FF2B5EF4-FFF2-40B4-BE49-F238E27FC236}">
+                <a16:creationId xmlns:a16="http://schemas.microsoft.com/office/drawing/2014/main" id="{A268C398-23AE-4499-9ABB-A9473E3723E3}"/>
+              </a:ext>
+            </a:extLst>
+          </p:cNvPr>
+          <p:cNvSpPr txBox="1"/>
+          <p:nvPr/>
+        </p:nvSpPr>
+        <p:spPr>
+          <a:xfrm>
+            <a:off x="3359017" y="3482520"/>
+            <a:ext cx="970095" cy="307777"/>
+          </a:xfrm>
+          <a:prstGeom prst="rect">
+            <a:avLst/>
+          </a:prstGeom>
+          <a:noFill/>
+        </p:spPr>
+        <p:txBody>
+          <a:bodyPr wrap="square" rtlCol="0">
+            <a:spAutoFit/>
+          </a:bodyPr>
+          <a:lstStyle/>
+          <a:p>
+            <a:r>
+              <a:rPr lang="fr-FR" sz="1400" b="1" dirty="0"/>
+              <a:t>Historique</a:t>
+            </a:r>
+          </a:p>
+        </p:txBody>
+      </p:sp>
+      <p:sp>
+        <p:nvSpPr>
+          <p:cNvPr id="27" name="ZoneTexte 26">
+            <a:extLst>
+              <a:ext uri="{FF2B5EF4-FFF2-40B4-BE49-F238E27FC236}">
+                <a16:creationId xmlns:a16="http://schemas.microsoft.com/office/drawing/2014/main" id="{AA0A34A9-2EF1-4EC1-B302-58FA5E13C518}"/>
+              </a:ext>
+            </a:extLst>
+          </p:cNvPr>
+          <p:cNvSpPr txBox="1"/>
+          <p:nvPr/>
+        </p:nvSpPr>
+        <p:spPr>
+          <a:xfrm>
+            <a:off x="3360566" y="4045568"/>
+            <a:ext cx="970095" cy="307777"/>
+          </a:xfrm>
+          <a:prstGeom prst="rect">
+            <a:avLst/>
+          </a:prstGeom>
+          <a:noFill/>
+        </p:spPr>
+        <p:txBody>
+          <a:bodyPr wrap="square" rtlCol="0">
+            <a:spAutoFit/>
+          </a:bodyPr>
+          <a:lstStyle/>
+          <a:p>
+            <a:r>
+              <a:rPr lang="fr-FR" sz="1400" b="1" dirty="0"/>
+              <a:t>Carte</a:t>
+            </a:r>
+          </a:p>
+        </p:txBody>
+      </p:sp>
+      <p:sp>
+        <p:nvSpPr>
+          <p:cNvPr id="28" name="ZoneTexte 27">
+            <a:extLst>
+              <a:ext uri="{FF2B5EF4-FFF2-40B4-BE49-F238E27FC236}">
+                <a16:creationId xmlns:a16="http://schemas.microsoft.com/office/drawing/2014/main" id="{1527BBD2-F2FA-4569-8E43-53CFC648A30D}"/>
+              </a:ext>
+            </a:extLst>
+          </p:cNvPr>
+          <p:cNvSpPr txBox="1"/>
+          <p:nvPr/>
+        </p:nvSpPr>
+        <p:spPr>
+          <a:xfrm>
+            <a:off x="3333903" y="4635891"/>
+            <a:ext cx="1049694" cy="276999"/>
+          </a:xfrm>
+          <a:prstGeom prst="rect">
+            <a:avLst/>
+          </a:prstGeom>
+          <a:noFill/>
+        </p:spPr>
+        <p:txBody>
+          <a:bodyPr wrap="square" rtlCol="0">
+            <a:spAutoFit/>
+          </a:bodyPr>
+          <a:lstStyle/>
+          <a:p>
+            <a:r>
+              <a:rPr lang="fr-FR" sz="1200" b="1" dirty="0"/>
+              <a:t>Paramètres</a:t>
+            </a:r>
+          </a:p>
+        </p:txBody>
+      </p:sp>
+      <p:sp>
+        <p:nvSpPr>
+          <p:cNvPr id="29" name="ZoneTexte 28">
+            <a:extLst>
+              <a:ext uri="{FF2B5EF4-FFF2-40B4-BE49-F238E27FC236}">
+                <a16:creationId xmlns:a16="http://schemas.microsoft.com/office/drawing/2014/main" id="{13A616A7-7C7B-4447-9584-667D29FB93EB}"/>
+              </a:ext>
+            </a:extLst>
+          </p:cNvPr>
+          <p:cNvSpPr txBox="1"/>
+          <p:nvPr/>
+        </p:nvSpPr>
+        <p:spPr>
+          <a:xfrm>
+            <a:off x="3319217" y="5162503"/>
+            <a:ext cx="1049694" cy="276999"/>
+          </a:xfrm>
+          <a:prstGeom prst="rect">
+            <a:avLst/>
+          </a:prstGeom>
+          <a:noFill/>
+        </p:spPr>
+        <p:txBody>
+          <a:bodyPr wrap="square" rtlCol="0">
+            <a:spAutoFit/>
+          </a:bodyPr>
+          <a:lstStyle/>
+          <a:p>
+            <a:r>
+              <a:rPr lang="fr-FR" sz="1200" b="1" dirty="0"/>
+              <a:t>Partager</a:t>
+            </a:r>
+          </a:p>
+        </p:txBody>
+      </p:sp>
+      <p:sp>
+        <p:nvSpPr>
+          <p:cNvPr id="30" name="Rectangle : coins arrondis 29">
+            <a:extLst>
+              <a:ext uri="{FF2B5EF4-FFF2-40B4-BE49-F238E27FC236}">
+                <a16:creationId xmlns:a16="http://schemas.microsoft.com/office/drawing/2014/main" id="{A28BC47E-6DC8-48FC-871C-17B061841793}"/>
+              </a:ext>
+            </a:extLst>
+          </p:cNvPr>
+          <p:cNvSpPr/>
+          <p:nvPr/>
+        </p:nvSpPr>
+        <p:spPr>
+          <a:xfrm>
+            <a:off x="4661897" y="2311400"/>
+            <a:ext cx="3895790" cy="3506304"/>
+          </a:xfrm>
+          <a:prstGeom prst="roundRect">
+            <a:avLst/>
+          </a:prstGeom>
+          <a:solidFill>
+            <a:schemeClr val="bg1"/>
+          </a:solidFill>
+          <a:ln>
+            <a:solidFill>
+              <a:schemeClr val="tx1"/>
+            </a:solidFill>
+          </a:ln>
+        </p:spPr>
+        <p:style>
+          <a:lnRef idx="2">
+            <a:schemeClr val="accent1">
+              <a:shade val="50000"/>
+            </a:schemeClr>
+          </a:lnRef>
+          <a:fillRef idx="1">
+            <a:schemeClr val="accent1"/>
+          </a:fillRef>
+          <a:effectRef idx="0">
+            <a:schemeClr val="accent1"/>
+          </a:effectRef>
+          <a:fontRef idx="minor">
+            <a:schemeClr val="lt1"/>
+          </a:fontRef>
+        </p:style>
+        <p:txBody>
+          <a:bodyPr rtlCol="0" anchor="ctr"/>
+          <a:lstStyle/>
+          <a:p>
+            <a:pPr algn="ctr"/>
+            <a:endParaRPr lang="fr-FR"/>
+          </a:p>
+        </p:txBody>
+      </p:sp>
+      <p:grpSp>
+        <p:nvGrpSpPr>
+          <p:cNvPr id="43" name="Groupe 42">
+            <a:extLst>
+              <a:ext uri="{FF2B5EF4-FFF2-40B4-BE49-F238E27FC236}">
+                <a16:creationId xmlns:a16="http://schemas.microsoft.com/office/drawing/2014/main" id="{CA64D9AE-735E-4333-A037-12E80A9F7656}"/>
+              </a:ext>
+            </a:extLst>
+          </p:cNvPr>
+          <p:cNvGrpSpPr/>
+          <p:nvPr/>
+        </p:nvGrpSpPr>
+        <p:grpSpPr>
+          <a:xfrm>
+            <a:off x="4669543" y="2706321"/>
+            <a:ext cx="1298714" cy="1100234"/>
+            <a:chOff x="3940573" y="2410361"/>
+            <a:chExt cx="3499805" cy="2562790"/>
+          </a:xfrm>
+        </p:grpSpPr>
+        <p:sp>
+          <p:nvSpPr>
+            <p:cNvPr id="44" name="Rectangle : coins arrondis 43">
+              <a:extLst>
+                <a:ext uri="{FF2B5EF4-FFF2-40B4-BE49-F238E27FC236}">
+                  <a16:creationId xmlns:a16="http://schemas.microsoft.com/office/drawing/2014/main" id="{55F815EC-A568-4772-96DE-3D667DD577F7}"/>
+                </a:ext>
+              </a:extLst>
+            </p:cNvPr>
+            <p:cNvSpPr/>
+            <p:nvPr/>
+          </p:nvSpPr>
+          <p:spPr>
+            <a:xfrm>
+              <a:off x="3940573" y="2410361"/>
+              <a:ext cx="3499805" cy="2562790"/>
+            </a:xfrm>
+            <a:prstGeom prst="roundRect">
+              <a:avLst/>
+            </a:prstGeom>
+            <a:solidFill>
+              <a:schemeClr val="bg1"/>
+            </a:solidFill>
+            <a:ln>
+              <a:solidFill>
+                <a:schemeClr val="tx1"/>
+              </a:solidFill>
+            </a:ln>
+          </p:spPr>
+          <p:style>
+            <a:lnRef idx="2">
+              <a:schemeClr val="accent1">
+                <a:shade val="50000"/>
+              </a:schemeClr>
+            </a:lnRef>
+            <a:fillRef idx="1">
+              <a:schemeClr val="accent1"/>
+            </a:fillRef>
+            <a:effectRef idx="0">
+              <a:schemeClr val="accent1"/>
+            </a:effectRef>
+            <a:fontRef idx="minor">
+              <a:schemeClr val="lt1"/>
+            </a:fontRef>
+          </p:style>
+          <p:txBody>
+            <a:bodyPr rtlCol="0" anchor="ctr"/>
+            <a:lstStyle/>
+            <a:p>
+              <a:pPr algn="ctr"/>
+              <a:endParaRPr lang="fr-FR"/>
+            </a:p>
+          </p:txBody>
+        </p:sp>
+        <p:pic>
+          <p:nvPicPr>
+            <p:cNvPr id="45" name="Image 44">
+              <a:extLst>
+                <a:ext uri="{FF2B5EF4-FFF2-40B4-BE49-F238E27FC236}">
+                  <a16:creationId xmlns:a16="http://schemas.microsoft.com/office/drawing/2014/main" id="{2F47869C-DEE5-49BF-BBE6-1F9BBF3AB293}"/>
+                </a:ext>
+              </a:extLst>
+            </p:cNvPr>
+            <p:cNvPicPr>
+              <a:picLocks noChangeAspect="1"/>
+            </p:cNvPicPr>
+            <p:nvPr/>
+          </p:nvPicPr>
+          <p:blipFill>
+            <a:blip r:embed="rId11">
+              <a:extLst>
+                <a:ext uri="{28A0092B-C50C-407E-A947-70E740481C1C}">
+                  <a14:useLocalDpi xmlns:a14="http://schemas.microsoft.com/office/drawing/2010/main" val="0"/>
+                </a:ext>
+              </a:extLst>
+            </a:blip>
+            <a:stretch>
+              <a:fillRect/>
+            </a:stretch>
+          </p:blipFill>
+          <p:spPr>
+            <a:xfrm>
+              <a:off x="5255322" y="2410361"/>
+              <a:ext cx="1213395" cy="1213395"/>
+            </a:xfrm>
+            <a:prstGeom prst="rect">
+              <a:avLst/>
+            </a:prstGeom>
+          </p:spPr>
+        </p:pic>
+        <p:sp>
+          <p:nvSpPr>
+            <p:cNvPr id="46" name="ZoneTexte 45">
+              <a:extLst>
+                <a:ext uri="{FF2B5EF4-FFF2-40B4-BE49-F238E27FC236}">
+                  <a16:creationId xmlns:a16="http://schemas.microsoft.com/office/drawing/2014/main" id="{1AD11B50-DA2C-4C72-B31E-416C48FC59A4}"/>
+                </a:ext>
+              </a:extLst>
+            </p:cNvPr>
+            <p:cNvSpPr txBox="1"/>
+            <p:nvPr/>
+          </p:nvSpPr>
+          <p:spPr>
+            <a:xfrm>
+              <a:off x="4193990" y="4117931"/>
+              <a:ext cx="1417739" cy="233620"/>
+            </a:xfrm>
+            <a:prstGeom prst="rect">
+              <a:avLst/>
+            </a:prstGeom>
+            <a:noFill/>
+          </p:spPr>
+          <p:txBody>
+            <a:bodyPr wrap="square" rtlCol="0">
+              <a:spAutoFit/>
+            </a:bodyPr>
+            <a:lstStyle/>
+            <a:p>
+              <a:r>
+                <a:rPr lang="fr-FR" sz="700" b="1" dirty="0"/>
+                <a:t>T= 20°C</a:t>
+              </a:r>
+            </a:p>
+          </p:txBody>
+        </p:sp>
+        <p:sp>
+          <p:nvSpPr>
+            <p:cNvPr id="47" name="ZoneTexte 46">
+              <a:extLst>
+                <a:ext uri="{FF2B5EF4-FFF2-40B4-BE49-F238E27FC236}">
+                  <a16:creationId xmlns:a16="http://schemas.microsoft.com/office/drawing/2014/main" id="{557030DE-D200-4EBA-9C41-7B4331799885}"/>
+                </a:ext>
+              </a:extLst>
+            </p:cNvPr>
+            <p:cNvSpPr txBox="1"/>
+            <p:nvPr/>
+          </p:nvSpPr>
+          <p:spPr>
+            <a:xfrm>
+              <a:off x="5287531" y="4117931"/>
+              <a:ext cx="1899181" cy="233620"/>
+            </a:xfrm>
+            <a:prstGeom prst="rect">
+              <a:avLst/>
+            </a:prstGeom>
+            <a:noFill/>
+          </p:spPr>
+          <p:txBody>
+            <a:bodyPr wrap="square" rtlCol="0">
+              <a:spAutoFit/>
+            </a:bodyPr>
+            <a:lstStyle/>
+            <a:p>
+              <a:r>
+                <a:rPr lang="fr-FR" sz="700" b="1" dirty="0"/>
+                <a:t>Humidité = 40%</a:t>
+              </a:r>
+            </a:p>
+          </p:txBody>
+        </p:sp>
+        <p:sp>
+          <p:nvSpPr>
+            <p:cNvPr id="48" name="ZoneTexte 47">
+              <a:extLst>
+                <a:ext uri="{FF2B5EF4-FFF2-40B4-BE49-F238E27FC236}">
+                  <a16:creationId xmlns:a16="http://schemas.microsoft.com/office/drawing/2014/main" id="{C3E8DC51-5165-45B7-B0DA-FDC3FB10C169}"/>
+                </a:ext>
+              </a:extLst>
+            </p:cNvPr>
+            <p:cNvSpPr txBox="1"/>
+            <p:nvPr/>
+          </p:nvSpPr>
+          <p:spPr>
+            <a:xfrm>
+              <a:off x="5043378" y="3649158"/>
+              <a:ext cx="1577130" cy="269561"/>
+            </a:xfrm>
+            <a:prstGeom prst="rect">
+              <a:avLst/>
+            </a:prstGeom>
+            <a:noFill/>
+          </p:spPr>
+          <p:txBody>
+            <a:bodyPr wrap="square" rtlCol="0">
+              <a:spAutoFit/>
+            </a:bodyPr>
+            <a:lstStyle/>
+            <a:p>
+              <a:pPr algn="ctr"/>
+              <a:r>
+                <a:rPr lang="fr-FR" sz="900" b="1" dirty="0"/>
+                <a:t>Ensoleillé</a:t>
+              </a:r>
+            </a:p>
+          </p:txBody>
+        </p:sp>
+        <p:sp>
+          <p:nvSpPr>
+            <p:cNvPr id="49" name="ZoneTexte 48">
+              <a:extLst>
+                <a:ext uri="{FF2B5EF4-FFF2-40B4-BE49-F238E27FC236}">
+                  <a16:creationId xmlns:a16="http://schemas.microsoft.com/office/drawing/2014/main" id="{E659F9DE-3EFF-4558-9940-531907820AC8}"/>
+                </a:ext>
+              </a:extLst>
+            </p:cNvPr>
+            <p:cNvSpPr txBox="1"/>
+            <p:nvPr/>
+          </p:nvSpPr>
+          <p:spPr>
+            <a:xfrm>
+              <a:off x="4193990" y="4516618"/>
+              <a:ext cx="1671155" cy="215649"/>
+            </a:xfrm>
+            <a:prstGeom prst="rect">
+              <a:avLst/>
+            </a:prstGeom>
+            <a:noFill/>
+          </p:spPr>
+          <p:txBody>
+            <a:bodyPr wrap="square" rtlCol="0">
+              <a:spAutoFit/>
+            </a:bodyPr>
+            <a:lstStyle/>
+            <a:p>
+              <a:r>
+                <a:rPr lang="fr-FR" sz="600" b="1" dirty="0"/>
+                <a:t>12/02/2021</a:t>
+              </a:r>
+            </a:p>
+          </p:txBody>
+        </p:sp>
+        <p:sp>
+          <p:nvSpPr>
+            <p:cNvPr id="50" name="ZoneTexte 49">
+              <a:extLst>
+                <a:ext uri="{FF2B5EF4-FFF2-40B4-BE49-F238E27FC236}">
+                  <a16:creationId xmlns:a16="http://schemas.microsoft.com/office/drawing/2014/main" id="{6C539CEC-1A89-43CA-9CDE-CF6C9A7C9DDB}"/>
+                </a:ext>
+              </a:extLst>
+            </p:cNvPr>
+            <p:cNvSpPr txBox="1"/>
+            <p:nvPr/>
+          </p:nvSpPr>
+          <p:spPr>
+            <a:xfrm>
+              <a:off x="5690351" y="4516618"/>
+              <a:ext cx="1671155" cy="215649"/>
+            </a:xfrm>
+            <a:prstGeom prst="rect">
+              <a:avLst/>
+            </a:prstGeom>
+            <a:noFill/>
+          </p:spPr>
+          <p:txBody>
+            <a:bodyPr wrap="square" rtlCol="0">
+              <a:spAutoFit/>
+            </a:bodyPr>
+            <a:lstStyle/>
+            <a:p>
+              <a:r>
+                <a:rPr lang="fr-FR" sz="600" b="1" dirty="0"/>
+                <a:t>15h00</a:t>
+              </a:r>
+            </a:p>
+          </p:txBody>
+        </p:sp>
+      </p:grpSp>
+      <p:grpSp>
+        <p:nvGrpSpPr>
+          <p:cNvPr id="51" name="Groupe 50">
+            <a:extLst>
+              <a:ext uri="{FF2B5EF4-FFF2-40B4-BE49-F238E27FC236}">
+                <a16:creationId xmlns:a16="http://schemas.microsoft.com/office/drawing/2014/main" id="{C151A2BE-DBA3-4D61-9374-D4841B06F003}"/>
+              </a:ext>
+            </a:extLst>
+          </p:cNvPr>
+          <p:cNvGrpSpPr/>
+          <p:nvPr/>
+        </p:nvGrpSpPr>
+        <p:grpSpPr>
+          <a:xfrm>
+            <a:off x="5968257" y="2693615"/>
+            <a:ext cx="1298714" cy="1100234"/>
+            <a:chOff x="3940573" y="2410361"/>
+            <a:chExt cx="3499805" cy="2562790"/>
+          </a:xfrm>
+        </p:grpSpPr>
+        <p:sp>
+          <p:nvSpPr>
+            <p:cNvPr id="52" name="Rectangle : coins arrondis 51">
+              <a:extLst>
+                <a:ext uri="{FF2B5EF4-FFF2-40B4-BE49-F238E27FC236}">
+                  <a16:creationId xmlns:a16="http://schemas.microsoft.com/office/drawing/2014/main" id="{588DF085-8896-4F44-8861-B5A8DAC9A7C1}"/>
+                </a:ext>
+              </a:extLst>
+            </p:cNvPr>
+            <p:cNvSpPr/>
+            <p:nvPr/>
+          </p:nvSpPr>
+          <p:spPr>
+            <a:xfrm>
+              <a:off x="3940573" y="2410361"/>
+              <a:ext cx="3499805" cy="2562790"/>
+            </a:xfrm>
+            <a:prstGeom prst="roundRect">
+              <a:avLst/>
+            </a:prstGeom>
+            <a:solidFill>
+              <a:schemeClr val="bg1"/>
+            </a:solidFill>
+            <a:ln>
+              <a:solidFill>
+                <a:schemeClr val="tx1"/>
+              </a:solidFill>
+            </a:ln>
+          </p:spPr>
+          <p:style>
+            <a:lnRef idx="2">
+              <a:schemeClr val="accent1">
+                <a:shade val="50000"/>
+              </a:schemeClr>
+            </a:lnRef>
+            <a:fillRef idx="1">
+              <a:schemeClr val="accent1"/>
+            </a:fillRef>
+            <a:effectRef idx="0">
+              <a:schemeClr val="accent1"/>
+            </a:effectRef>
+            <a:fontRef idx="minor">
+              <a:schemeClr val="lt1"/>
+            </a:fontRef>
+          </p:style>
+          <p:txBody>
+            <a:bodyPr rtlCol="0" anchor="ctr"/>
+            <a:lstStyle/>
+            <a:p>
+              <a:pPr algn="ctr"/>
+              <a:endParaRPr lang="fr-FR"/>
+            </a:p>
+          </p:txBody>
+        </p:sp>
+        <p:pic>
+          <p:nvPicPr>
+            <p:cNvPr id="53" name="Image 52">
+              <a:extLst>
+                <a:ext uri="{FF2B5EF4-FFF2-40B4-BE49-F238E27FC236}">
+                  <a16:creationId xmlns:a16="http://schemas.microsoft.com/office/drawing/2014/main" id="{12E7C5DD-73F8-4026-8C61-15B934D7193F}"/>
+                </a:ext>
+              </a:extLst>
+            </p:cNvPr>
+            <p:cNvPicPr>
+              <a:picLocks noChangeAspect="1"/>
+            </p:cNvPicPr>
+            <p:nvPr/>
+          </p:nvPicPr>
+          <p:blipFill>
+            <a:blip r:embed="rId11">
+              <a:extLst>
+                <a:ext uri="{28A0092B-C50C-407E-A947-70E740481C1C}">
+                  <a14:useLocalDpi xmlns:a14="http://schemas.microsoft.com/office/drawing/2010/main" val="0"/>
+                </a:ext>
+              </a:extLst>
+            </a:blip>
+            <a:stretch>
+              <a:fillRect/>
+            </a:stretch>
+          </p:blipFill>
+          <p:spPr>
+            <a:xfrm>
+              <a:off x="5255322" y="2410361"/>
+              <a:ext cx="1213395" cy="1213395"/>
+            </a:xfrm>
+            <a:prstGeom prst="rect">
+              <a:avLst/>
+            </a:prstGeom>
+          </p:spPr>
+        </p:pic>
+        <p:sp>
+          <p:nvSpPr>
+            <p:cNvPr id="54" name="ZoneTexte 53">
+              <a:extLst>
+                <a:ext uri="{FF2B5EF4-FFF2-40B4-BE49-F238E27FC236}">
+                  <a16:creationId xmlns:a16="http://schemas.microsoft.com/office/drawing/2014/main" id="{D3223159-D02B-4B50-B153-EAD671395F20}"/>
+                </a:ext>
+              </a:extLst>
+            </p:cNvPr>
+            <p:cNvSpPr txBox="1"/>
+            <p:nvPr/>
+          </p:nvSpPr>
+          <p:spPr>
+            <a:xfrm>
+              <a:off x="4193990" y="4117931"/>
+              <a:ext cx="1417739" cy="233620"/>
+            </a:xfrm>
+            <a:prstGeom prst="rect">
+              <a:avLst/>
+            </a:prstGeom>
+            <a:noFill/>
+          </p:spPr>
+          <p:txBody>
+            <a:bodyPr wrap="square" rtlCol="0">
+              <a:spAutoFit/>
+            </a:bodyPr>
+            <a:lstStyle/>
+            <a:p>
+              <a:r>
+                <a:rPr lang="fr-FR" sz="700" b="1" dirty="0"/>
+                <a:t>T= 20°C</a:t>
+              </a:r>
+            </a:p>
+          </p:txBody>
+        </p:sp>
+        <p:sp>
+          <p:nvSpPr>
+            <p:cNvPr id="55" name="ZoneTexte 54">
+              <a:extLst>
+                <a:ext uri="{FF2B5EF4-FFF2-40B4-BE49-F238E27FC236}">
+                  <a16:creationId xmlns:a16="http://schemas.microsoft.com/office/drawing/2014/main" id="{B4FD8F20-FCB0-4AFB-A1A9-01FAA9166382}"/>
+                </a:ext>
+              </a:extLst>
+            </p:cNvPr>
+            <p:cNvSpPr txBox="1"/>
+            <p:nvPr/>
+          </p:nvSpPr>
+          <p:spPr>
+            <a:xfrm>
+              <a:off x="5287531" y="4117931"/>
+              <a:ext cx="1899181" cy="233620"/>
+            </a:xfrm>
+            <a:prstGeom prst="rect">
+              <a:avLst/>
+            </a:prstGeom>
+            <a:noFill/>
+          </p:spPr>
+          <p:txBody>
+            <a:bodyPr wrap="square" rtlCol="0">
+              <a:spAutoFit/>
+            </a:bodyPr>
+            <a:lstStyle/>
+            <a:p>
+              <a:r>
+                <a:rPr lang="fr-FR" sz="700" b="1" dirty="0"/>
+                <a:t>Humidité = 40%</a:t>
+              </a:r>
+            </a:p>
+          </p:txBody>
+        </p:sp>
+        <p:sp>
+          <p:nvSpPr>
+            <p:cNvPr id="56" name="ZoneTexte 55">
+              <a:extLst>
+                <a:ext uri="{FF2B5EF4-FFF2-40B4-BE49-F238E27FC236}">
+                  <a16:creationId xmlns:a16="http://schemas.microsoft.com/office/drawing/2014/main" id="{6CB95C28-BFE7-48D3-AD69-CB3517533866}"/>
+                </a:ext>
+              </a:extLst>
+            </p:cNvPr>
+            <p:cNvSpPr txBox="1"/>
+            <p:nvPr/>
+          </p:nvSpPr>
+          <p:spPr>
+            <a:xfrm>
+              <a:off x="5043378" y="3649158"/>
+              <a:ext cx="1577130" cy="269561"/>
+            </a:xfrm>
+            <a:prstGeom prst="rect">
+              <a:avLst/>
+            </a:prstGeom>
+            <a:noFill/>
+          </p:spPr>
+          <p:txBody>
+            <a:bodyPr wrap="square" rtlCol="0">
+              <a:spAutoFit/>
+            </a:bodyPr>
+            <a:lstStyle/>
+            <a:p>
+              <a:pPr algn="ctr"/>
+              <a:r>
+                <a:rPr lang="fr-FR" sz="900" b="1" dirty="0"/>
+                <a:t>Ensoleillé</a:t>
+              </a:r>
+            </a:p>
+          </p:txBody>
+        </p:sp>
+        <p:sp>
+          <p:nvSpPr>
+            <p:cNvPr id="57" name="ZoneTexte 56">
+              <a:extLst>
+                <a:ext uri="{FF2B5EF4-FFF2-40B4-BE49-F238E27FC236}">
+                  <a16:creationId xmlns:a16="http://schemas.microsoft.com/office/drawing/2014/main" id="{F49602A5-C888-490B-A4F1-1AE76A8DE5DB}"/>
+                </a:ext>
+              </a:extLst>
+            </p:cNvPr>
+            <p:cNvSpPr txBox="1"/>
+            <p:nvPr/>
+          </p:nvSpPr>
+          <p:spPr>
+            <a:xfrm>
+              <a:off x="4193990" y="4516618"/>
+              <a:ext cx="1671155" cy="215649"/>
+            </a:xfrm>
+            <a:prstGeom prst="rect">
+              <a:avLst/>
+            </a:prstGeom>
+            <a:noFill/>
+          </p:spPr>
+          <p:txBody>
+            <a:bodyPr wrap="square" rtlCol="0">
+              <a:spAutoFit/>
+            </a:bodyPr>
+            <a:lstStyle/>
+            <a:p>
+              <a:r>
+                <a:rPr lang="fr-FR" sz="600" b="1" dirty="0"/>
+                <a:t>12/02/2021</a:t>
+              </a:r>
+            </a:p>
+          </p:txBody>
+        </p:sp>
+        <p:sp>
+          <p:nvSpPr>
+            <p:cNvPr id="58" name="ZoneTexte 57">
+              <a:extLst>
+                <a:ext uri="{FF2B5EF4-FFF2-40B4-BE49-F238E27FC236}">
+                  <a16:creationId xmlns:a16="http://schemas.microsoft.com/office/drawing/2014/main" id="{1D22530F-CEDF-4B1C-BF47-596B99C49A52}"/>
+                </a:ext>
+              </a:extLst>
+            </p:cNvPr>
+            <p:cNvSpPr txBox="1"/>
+            <p:nvPr/>
+          </p:nvSpPr>
+          <p:spPr>
+            <a:xfrm>
+              <a:off x="5690351" y="4516618"/>
+              <a:ext cx="1671155" cy="215649"/>
+            </a:xfrm>
+            <a:prstGeom prst="rect">
+              <a:avLst/>
+            </a:prstGeom>
+            <a:noFill/>
+          </p:spPr>
+          <p:txBody>
+            <a:bodyPr wrap="square" rtlCol="0">
+              <a:spAutoFit/>
+            </a:bodyPr>
+            <a:lstStyle/>
+            <a:p>
+              <a:r>
+                <a:rPr lang="fr-FR" sz="600" b="1" dirty="0"/>
+                <a:t>15h00</a:t>
+              </a:r>
+            </a:p>
+          </p:txBody>
+        </p:sp>
+      </p:grpSp>
+      <p:grpSp>
+        <p:nvGrpSpPr>
+          <p:cNvPr id="59" name="Groupe 58">
+            <a:extLst>
+              <a:ext uri="{FF2B5EF4-FFF2-40B4-BE49-F238E27FC236}">
+                <a16:creationId xmlns:a16="http://schemas.microsoft.com/office/drawing/2014/main" id="{EA7B7296-F347-47E2-BC53-3BF8ECBE95E0}"/>
+              </a:ext>
+            </a:extLst>
+          </p:cNvPr>
+          <p:cNvGrpSpPr/>
+          <p:nvPr/>
+        </p:nvGrpSpPr>
+        <p:grpSpPr>
+          <a:xfrm>
+            <a:off x="7260339" y="2719027"/>
+            <a:ext cx="1298714" cy="1100234"/>
+            <a:chOff x="3940573" y="2410361"/>
+            <a:chExt cx="3499805" cy="2562790"/>
+          </a:xfrm>
+        </p:grpSpPr>
+        <p:sp>
+          <p:nvSpPr>
+            <p:cNvPr id="60" name="Rectangle : coins arrondis 59">
+              <a:extLst>
+                <a:ext uri="{FF2B5EF4-FFF2-40B4-BE49-F238E27FC236}">
+                  <a16:creationId xmlns:a16="http://schemas.microsoft.com/office/drawing/2014/main" id="{9FE2D70D-B530-4093-A898-FCDE2C9A732E}"/>
+                </a:ext>
+              </a:extLst>
+            </p:cNvPr>
+            <p:cNvSpPr/>
+            <p:nvPr/>
+          </p:nvSpPr>
+          <p:spPr>
+            <a:xfrm>
+              <a:off x="3940573" y="2410361"/>
+              <a:ext cx="3499805" cy="2562790"/>
+            </a:xfrm>
+            <a:prstGeom prst="roundRect">
+              <a:avLst/>
+            </a:prstGeom>
+            <a:solidFill>
+              <a:schemeClr val="bg1"/>
+            </a:solidFill>
+            <a:ln>
+              <a:solidFill>
+                <a:schemeClr val="tx1"/>
+              </a:solidFill>
+            </a:ln>
+          </p:spPr>
+          <p:style>
+            <a:lnRef idx="2">
+              <a:schemeClr val="accent1">
+                <a:shade val="50000"/>
+              </a:schemeClr>
+            </a:lnRef>
+            <a:fillRef idx="1">
+              <a:schemeClr val="accent1"/>
+            </a:fillRef>
+            <a:effectRef idx="0">
+              <a:schemeClr val="accent1"/>
+            </a:effectRef>
+            <a:fontRef idx="minor">
+              <a:schemeClr val="lt1"/>
+            </a:fontRef>
+          </p:style>
+          <p:txBody>
+            <a:bodyPr rtlCol="0" anchor="ctr"/>
+            <a:lstStyle/>
+            <a:p>
+              <a:pPr algn="ctr"/>
+              <a:endParaRPr lang="fr-FR"/>
+            </a:p>
+          </p:txBody>
+        </p:sp>
+        <p:pic>
+          <p:nvPicPr>
+            <p:cNvPr id="61" name="Image 60">
+              <a:extLst>
+                <a:ext uri="{FF2B5EF4-FFF2-40B4-BE49-F238E27FC236}">
+                  <a16:creationId xmlns:a16="http://schemas.microsoft.com/office/drawing/2014/main" id="{E8D1E90D-70DB-4E8D-9996-C0B810C6EBD5}"/>
+                </a:ext>
+              </a:extLst>
+            </p:cNvPr>
+            <p:cNvPicPr>
+              <a:picLocks noChangeAspect="1"/>
+            </p:cNvPicPr>
+            <p:nvPr/>
+          </p:nvPicPr>
+          <p:blipFill>
+            <a:blip r:embed="rId11">
+              <a:extLst>
+                <a:ext uri="{28A0092B-C50C-407E-A947-70E740481C1C}">
+                  <a14:useLocalDpi xmlns:a14="http://schemas.microsoft.com/office/drawing/2010/main" val="0"/>
+                </a:ext>
+              </a:extLst>
+            </a:blip>
+            <a:stretch>
+              <a:fillRect/>
+            </a:stretch>
+          </p:blipFill>
+          <p:spPr>
+            <a:xfrm>
+              <a:off x="5255322" y="2410361"/>
+              <a:ext cx="1213395" cy="1213395"/>
+            </a:xfrm>
+            <a:prstGeom prst="rect">
+              <a:avLst/>
+            </a:prstGeom>
+          </p:spPr>
+        </p:pic>
+        <p:sp>
+          <p:nvSpPr>
+            <p:cNvPr id="62" name="ZoneTexte 61">
+              <a:extLst>
+                <a:ext uri="{FF2B5EF4-FFF2-40B4-BE49-F238E27FC236}">
+                  <a16:creationId xmlns:a16="http://schemas.microsoft.com/office/drawing/2014/main" id="{BC43D760-6740-4215-BE7B-9660D48853CB}"/>
+                </a:ext>
+              </a:extLst>
+            </p:cNvPr>
+            <p:cNvSpPr txBox="1"/>
+            <p:nvPr/>
+          </p:nvSpPr>
+          <p:spPr>
+            <a:xfrm>
+              <a:off x="4193990" y="4117931"/>
+              <a:ext cx="1417739" cy="233620"/>
+            </a:xfrm>
+            <a:prstGeom prst="rect">
+              <a:avLst/>
+            </a:prstGeom>
+            <a:noFill/>
+          </p:spPr>
+          <p:txBody>
+            <a:bodyPr wrap="square" rtlCol="0">
+              <a:spAutoFit/>
+            </a:bodyPr>
+            <a:lstStyle/>
+            <a:p>
+              <a:r>
+                <a:rPr lang="fr-FR" sz="700" b="1" dirty="0"/>
+                <a:t>T= 20°C</a:t>
+              </a:r>
+            </a:p>
+          </p:txBody>
+        </p:sp>
+        <p:sp>
+          <p:nvSpPr>
+            <p:cNvPr id="63" name="ZoneTexte 62">
+              <a:extLst>
+                <a:ext uri="{FF2B5EF4-FFF2-40B4-BE49-F238E27FC236}">
+                  <a16:creationId xmlns:a16="http://schemas.microsoft.com/office/drawing/2014/main" id="{0B2C52A9-D76E-4C0B-9A67-0275048AC21D}"/>
+                </a:ext>
+              </a:extLst>
+            </p:cNvPr>
+            <p:cNvSpPr txBox="1"/>
+            <p:nvPr/>
+          </p:nvSpPr>
+          <p:spPr>
+            <a:xfrm>
+              <a:off x="5287531" y="4117931"/>
+              <a:ext cx="1899181" cy="233620"/>
+            </a:xfrm>
+            <a:prstGeom prst="rect">
+              <a:avLst/>
+            </a:prstGeom>
+            <a:noFill/>
+          </p:spPr>
+          <p:txBody>
+            <a:bodyPr wrap="square" rtlCol="0">
+              <a:spAutoFit/>
+            </a:bodyPr>
+            <a:lstStyle/>
+            <a:p>
+              <a:r>
+                <a:rPr lang="fr-FR" sz="700" b="1" dirty="0"/>
+                <a:t>Humidité = 40%</a:t>
+              </a:r>
+            </a:p>
+          </p:txBody>
+        </p:sp>
+        <p:sp>
+          <p:nvSpPr>
+            <p:cNvPr id="64" name="ZoneTexte 63">
+              <a:extLst>
+                <a:ext uri="{FF2B5EF4-FFF2-40B4-BE49-F238E27FC236}">
+                  <a16:creationId xmlns:a16="http://schemas.microsoft.com/office/drawing/2014/main" id="{8103DB80-B088-47FA-9230-452CF381F495}"/>
+                </a:ext>
+              </a:extLst>
+            </p:cNvPr>
+            <p:cNvSpPr txBox="1"/>
+            <p:nvPr/>
+          </p:nvSpPr>
+          <p:spPr>
+            <a:xfrm>
+              <a:off x="5043378" y="3649158"/>
+              <a:ext cx="1577130" cy="269561"/>
+            </a:xfrm>
+            <a:prstGeom prst="rect">
+              <a:avLst/>
+            </a:prstGeom>
+            <a:noFill/>
+          </p:spPr>
+          <p:txBody>
+            <a:bodyPr wrap="square" rtlCol="0">
+              <a:spAutoFit/>
+            </a:bodyPr>
+            <a:lstStyle/>
+            <a:p>
+              <a:pPr algn="ctr"/>
+              <a:r>
+                <a:rPr lang="fr-FR" sz="900" b="1" dirty="0"/>
+                <a:t>Ensoleillé</a:t>
+              </a:r>
+            </a:p>
+          </p:txBody>
+        </p:sp>
+        <p:sp>
+          <p:nvSpPr>
+            <p:cNvPr id="65" name="ZoneTexte 64">
+              <a:extLst>
+                <a:ext uri="{FF2B5EF4-FFF2-40B4-BE49-F238E27FC236}">
+                  <a16:creationId xmlns:a16="http://schemas.microsoft.com/office/drawing/2014/main" id="{565D4877-BDA9-4B43-9BDB-A6D97657C328}"/>
+                </a:ext>
+              </a:extLst>
+            </p:cNvPr>
+            <p:cNvSpPr txBox="1"/>
+            <p:nvPr/>
+          </p:nvSpPr>
+          <p:spPr>
+            <a:xfrm>
+              <a:off x="4193990" y="4516618"/>
+              <a:ext cx="1671155" cy="215649"/>
+            </a:xfrm>
+            <a:prstGeom prst="rect">
+              <a:avLst/>
+            </a:prstGeom>
+            <a:noFill/>
+          </p:spPr>
+          <p:txBody>
+            <a:bodyPr wrap="square" rtlCol="0">
+              <a:spAutoFit/>
+            </a:bodyPr>
+            <a:lstStyle/>
+            <a:p>
+              <a:r>
+                <a:rPr lang="fr-FR" sz="600" b="1" dirty="0"/>
+                <a:t>12/02/2021</a:t>
+              </a:r>
+            </a:p>
+          </p:txBody>
+        </p:sp>
+        <p:sp>
+          <p:nvSpPr>
+            <p:cNvPr id="66" name="ZoneTexte 65">
+              <a:extLst>
+                <a:ext uri="{FF2B5EF4-FFF2-40B4-BE49-F238E27FC236}">
+                  <a16:creationId xmlns:a16="http://schemas.microsoft.com/office/drawing/2014/main" id="{3532A3F6-32AA-47E3-AD3A-EB82C28B41F8}"/>
+                </a:ext>
+              </a:extLst>
+            </p:cNvPr>
+            <p:cNvSpPr txBox="1"/>
+            <p:nvPr/>
+          </p:nvSpPr>
+          <p:spPr>
+            <a:xfrm>
+              <a:off x="5690351" y="4516618"/>
+              <a:ext cx="1671155" cy="215649"/>
+            </a:xfrm>
+            <a:prstGeom prst="rect">
+              <a:avLst/>
+            </a:prstGeom>
+            <a:noFill/>
+          </p:spPr>
+          <p:txBody>
+            <a:bodyPr wrap="square" rtlCol="0">
+              <a:spAutoFit/>
+            </a:bodyPr>
+            <a:lstStyle/>
+            <a:p>
+              <a:r>
+                <a:rPr lang="fr-FR" sz="600" b="1" dirty="0"/>
+                <a:t>15h00</a:t>
+              </a:r>
+            </a:p>
+          </p:txBody>
+        </p:sp>
+      </p:grpSp>
+      <p:grpSp>
+        <p:nvGrpSpPr>
+          <p:cNvPr id="67" name="Groupe 66">
+            <a:extLst>
+              <a:ext uri="{FF2B5EF4-FFF2-40B4-BE49-F238E27FC236}">
+                <a16:creationId xmlns:a16="http://schemas.microsoft.com/office/drawing/2014/main" id="{58774F39-1740-4A94-BA88-884302947D2D}"/>
+              </a:ext>
+            </a:extLst>
+          </p:cNvPr>
+          <p:cNvGrpSpPr/>
+          <p:nvPr/>
+        </p:nvGrpSpPr>
+        <p:grpSpPr>
+          <a:xfrm>
+            <a:off x="4662911" y="4118796"/>
+            <a:ext cx="1298714" cy="1100234"/>
+            <a:chOff x="3940573" y="2410361"/>
+            <a:chExt cx="3499805" cy="2562790"/>
+          </a:xfrm>
+        </p:grpSpPr>
+        <p:sp>
+          <p:nvSpPr>
+            <p:cNvPr id="68" name="Rectangle : coins arrondis 67">
+              <a:extLst>
+                <a:ext uri="{FF2B5EF4-FFF2-40B4-BE49-F238E27FC236}">
+                  <a16:creationId xmlns:a16="http://schemas.microsoft.com/office/drawing/2014/main" id="{EA1E76D9-99B0-4653-970D-D7128870D2CC}"/>
+                </a:ext>
+              </a:extLst>
+            </p:cNvPr>
+            <p:cNvSpPr/>
+            <p:nvPr/>
+          </p:nvSpPr>
+          <p:spPr>
+            <a:xfrm>
+              <a:off x="3940573" y="2410361"/>
+              <a:ext cx="3499805" cy="2562790"/>
+            </a:xfrm>
+            <a:prstGeom prst="roundRect">
+              <a:avLst/>
+            </a:prstGeom>
+            <a:solidFill>
+              <a:schemeClr val="bg1"/>
+            </a:solidFill>
+            <a:ln>
+              <a:solidFill>
+                <a:schemeClr val="tx1"/>
+              </a:solidFill>
+            </a:ln>
+          </p:spPr>
+          <p:style>
+            <a:lnRef idx="2">
+              <a:schemeClr val="accent1">
+                <a:shade val="50000"/>
+              </a:schemeClr>
+            </a:lnRef>
+            <a:fillRef idx="1">
+              <a:schemeClr val="accent1"/>
+            </a:fillRef>
+            <a:effectRef idx="0">
+              <a:schemeClr val="accent1"/>
+            </a:effectRef>
+            <a:fontRef idx="minor">
+              <a:schemeClr val="lt1"/>
+            </a:fontRef>
+          </p:style>
+          <p:txBody>
+            <a:bodyPr rtlCol="0" anchor="ctr"/>
+            <a:lstStyle/>
+            <a:p>
+              <a:pPr algn="ctr"/>
+              <a:endParaRPr lang="fr-FR"/>
+            </a:p>
+          </p:txBody>
+        </p:sp>
+        <p:pic>
+          <p:nvPicPr>
+            <p:cNvPr id="69" name="Image 68">
+              <a:extLst>
+                <a:ext uri="{FF2B5EF4-FFF2-40B4-BE49-F238E27FC236}">
+                  <a16:creationId xmlns:a16="http://schemas.microsoft.com/office/drawing/2014/main" id="{26C5A3C6-BF5F-4730-9392-BB872582DA61}"/>
+                </a:ext>
+              </a:extLst>
+            </p:cNvPr>
+            <p:cNvPicPr>
+              <a:picLocks noChangeAspect="1"/>
+            </p:cNvPicPr>
+            <p:nvPr/>
+          </p:nvPicPr>
+          <p:blipFill>
+            <a:blip r:embed="rId11">
+              <a:extLst>
+                <a:ext uri="{28A0092B-C50C-407E-A947-70E740481C1C}">
+                  <a14:useLocalDpi xmlns:a14="http://schemas.microsoft.com/office/drawing/2010/main" val="0"/>
+                </a:ext>
+              </a:extLst>
+            </a:blip>
+            <a:stretch>
+              <a:fillRect/>
+            </a:stretch>
+          </p:blipFill>
+          <p:spPr>
+            <a:xfrm>
+              <a:off x="5255322" y="2410361"/>
+              <a:ext cx="1213395" cy="1213395"/>
+            </a:xfrm>
+            <a:prstGeom prst="rect">
+              <a:avLst/>
+            </a:prstGeom>
+          </p:spPr>
+        </p:pic>
+        <p:sp>
+          <p:nvSpPr>
+            <p:cNvPr id="70" name="ZoneTexte 69">
+              <a:extLst>
+                <a:ext uri="{FF2B5EF4-FFF2-40B4-BE49-F238E27FC236}">
+                  <a16:creationId xmlns:a16="http://schemas.microsoft.com/office/drawing/2014/main" id="{63BEE695-072C-4DD6-805B-025AC3D15077}"/>
+                </a:ext>
+              </a:extLst>
+            </p:cNvPr>
+            <p:cNvSpPr txBox="1"/>
+            <p:nvPr/>
+          </p:nvSpPr>
+          <p:spPr>
+            <a:xfrm>
+              <a:off x="4193990" y="4117931"/>
+              <a:ext cx="1417739" cy="233620"/>
+            </a:xfrm>
+            <a:prstGeom prst="rect">
+              <a:avLst/>
+            </a:prstGeom>
+            <a:noFill/>
+          </p:spPr>
+          <p:txBody>
+            <a:bodyPr wrap="square" rtlCol="0">
+              <a:spAutoFit/>
+            </a:bodyPr>
+            <a:lstStyle/>
+            <a:p>
+              <a:r>
+                <a:rPr lang="fr-FR" sz="700" b="1" dirty="0"/>
+                <a:t>T= 20°C</a:t>
+              </a:r>
+            </a:p>
+          </p:txBody>
+        </p:sp>
+        <p:sp>
+          <p:nvSpPr>
+            <p:cNvPr id="71" name="ZoneTexte 70">
+              <a:extLst>
+                <a:ext uri="{FF2B5EF4-FFF2-40B4-BE49-F238E27FC236}">
+                  <a16:creationId xmlns:a16="http://schemas.microsoft.com/office/drawing/2014/main" id="{3A77459D-B165-45BF-B9AE-E4B7C35FA551}"/>
+                </a:ext>
+              </a:extLst>
+            </p:cNvPr>
+            <p:cNvSpPr txBox="1"/>
+            <p:nvPr/>
+          </p:nvSpPr>
+          <p:spPr>
+            <a:xfrm>
+              <a:off x="5287531" y="4117931"/>
+              <a:ext cx="1899181" cy="233620"/>
+            </a:xfrm>
+            <a:prstGeom prst="rect">
+              <a:avLst/>
+            </a:prstGeom>
+            <a:noFill/>
+          </p:spPr>
+          <p:txBody>
+            <a:bodyPr wrap="square" rtlCol="0">
+              <a:spAutoFit/>
+            </a:bodyPr>
+            <a:lstStyle/>
+            <a:p>
+              <a:r>
+                <a:rPr lang="fr-FR" sz="700" b="1" dirty="0"/>
+                <a:t>Humidité = 40%</a:t>
+              </a:r>
+            </a:p>
+          </p:txBody>
+        </p:sp>
+        <p:sp>
+          <p:nvSpPr>
+            <p:cNvPr id="72" name="ZoneTexte 71">
+              <a:extLst>
+                <a:ext uri="{FF2B5EF4-FFF2-40B4-BE49-F238E27FC236}">
+                  <a16:creationId xmlns:a16="http://schemas.microsoft.com/office/drawing/2014/main" id="{A56E85A4-A70B-4D9D-8117-2830A6850914}"/>
+                </a:ext>
+              </a:extLst>
+            </p:cNvPr>
+            <p:cNvSpPr txBox="1"/>
+            <p:nvPr/>
+          </p:nvSpPr>
+          <p:spPr>
+            <a:xfrm>
+              <a:off x="5043378" y="3649158"/>
+              <a:ext cx="1577130" cy="269561"/>
+            </a:xfrm>
+            <a:prstGeom prst="rect">
+              <a:avLst/>
+            </a:prstGeom>
+            <a:noFill/>
+          </p:spPr>
+          <p:txBody>
+            <a:bodyPr wrap="square" rtlCol="0">
+              <a:spAutoFit/>
+            </a:bodyPr>
+            <a:lstStyle/>
+            <a:p>
+              <a:pPr algn="ctr"/>
+              <a:r>
+                <a:rPr lang="fr-FR" sz="900" b="1" dirty="0"/>
+                <a:t>Ensoleillé</a:t>
+              </a:r>
+            </a:p>
+          </p:txBody>
+        </p:sp>
+        <p:sp>
+          <p:nvSpPr>
+            <p:cNvPr id="73" name="ZoneTexte 72">
+              <a:extLst>
+                <a:ext uri="{FF2B5EF4-FFF2-40B4-BE49-F238E27FC236}">
+                  <a16:creationId xmlns:a16="http://schemas.microsoft.com/office/drawing/2014/main" id="{1ED0B634-3F50-4FAA-89EF-E9DBCC10B19A}"/>
+                </a:ext>
+              </a:extLst>
+            </p:cNvPr>
+            <p:cNvSpPr txBox="1"/>
+            <p:nvPr/>
+          </p:nvSpPr>
+          <p:spPr>
+            <a:xfrm>
+              <a:off x="4193990" y="4516618"/>
+              <a:ext cx="1671155" cy="215649"/>
+            </a:xfrm>
+            <a:prstGeom prst="rect">
+              <a:avLst/>
+            </a:prstGeom>
+            <a:noFill/>
+          </p:spPr>
+          <p:txBody>
+            <a:bodyPr wrap="square" rtlCol="0">
+              <a:spAutoFit/>
+            </a:bodyPr>
+            <a:lstStyle/>
+            <a:p>
+              <a:r>
+                <a:rPr lang="fr-FR" sz="600" b="1" dirty="0"/>
+                <a:t>12/02/2021</a:t>
+              </a:r>
+            </a:p>
+          </p:txBody>
+        </p:sp>
+        <p:sp>
+          <p:nvSpPr>
+            <p:cNvPr id="74" name="ZoneTexte 73">
+              <a:extLst>
+                <a:ext uri="{FF2B5EF4-FFF2-40B4-BE49-F238E27FC236}">
+                  <a16:creationId xmlns:a16="http://schemas.microsoft.com/office/drawing/2014/main" id="{FC1CAEE3-46FB-466D-923D-A1DA4D7B01B8}"/>
+                </a:ext>
+              </a:extLst>
+            </p:cNvPr>
+            <p:cNvSpPr txBox="1"/>
+            <p:nvPr/>
+          </p:nvSpPr>
+          <p:spPr>
+            <a:xfrm>
+              <a:off x="5690351" y="4516618"/>
+              <a:ext cx="1671155" cy="215649"/>
+            </a:xfrm>
+            <a:prstGeom prst="rect">
+              <a:avLst/>
+            </a:prstGeom>
+            <a:noFill/>
+          </p:spPr>
+          <p:txBody>
+            <a:bodyPr wrap="square" rtlCol="0">
+              <a:spAutoFit/>
+            </a:bodyPr>
+            <a:lstStyle/>
+            <a:p>
+              <a:r>
+                <a:rPr lang="fr-FR" sz="600" b="1" dirty="0"/>
+                <a:t>15h00</a:t>
+              </a:r>
+            </a:p>
+          </p:txBody>
+        </p:sp>
+      </p:grpSp>
+      <p:grpSp>
+        <p:nvGrpSpPr>
+          <p:cNvPr id="75" name="Groupe 74">
+            <a:extLst>
+              <a:ext uri="{FF2B5EF4-FFF2-40B4-BE49-F238E27FC236}">
+                <a16:creationId xmlns:a16="http://schemas.microsoft.com/office/drawing/2014/main" id="{F7DFB620-1683-4185-9183-1EF48C7A667C}"/>
+              </a:ext>
+            </a:extLst>
+          </p:cNvPr>
+          <p:cNvGrpSpPr/>
+          <p:nvPr/>
+        </p:nvGrpSpPr>
+        <p:grpSpPr>
+          <a:xfrm>
+            <a:off x="5961625" y="4106090"/>
+            <a:ext cx="1298714" cy="1100234"/>
+            <a:chOff x="3940573" y="2410361"/>
+            <a:chExt cx="3499805" cy="2562790"/>
+          </a:xfrm>
+        </p:grpSpPr>
+        <p:sp>
+          <p:nvSpPr>
+            <p:cNvPr id="76" name="Rectangle : coins arrondis 75">
+              <a:extLst>
+                <a:ext uri="{FF2B5EF4-FFF2-40B4-BE49-F238E27FC236}">
+                  <a16:creationId xmlns:a16="http://schemas.microsoft.com/office/drawing/2014/main" id="{FE6B2107-6A60-4A3C-B7F3-006D2F2F862A}"/>
+                </a:ext>
+              </a:extLst>
+            </p:cNvPr>
+            <p:cNvSpPr/>
+            <p:nvPr/>
+          </p:nvSpPr>
+          <p:spPr>
+            <a:xfrm>
+              <a:off x="3940573" y="2410361"/>
+              <a:ext cx="3499805" cy="2562790"/>
+            </a:xfrm>
+            <a:prstGeom prst="roundRect">
+              <a:avLst/>
+            </a:prstGeom>
+            <a:solidFill>
+              <a:schemeClr val="bg1"/>
+            </a:solidFill>
+            <a:ln>
+              <a:solidFill>
+                <a:schemeClr val="tx1"/>
+              </a:solidFill>
+            </a:ln>
+          </p:spPr>
+          <p:style>
+            <a:lnRef idx="2">
+              <a:schemeClr val="accent1">
+                <a:shade val="50000"/>
+              </a:schemeClr>
+            </a:lnRef>
+            <a:fillRef idx="1">
+              <a:schemeClr val="accent1"/>
+            </a:fillRef>
+            <a:effectRef idx="0">
+              <a:schemeClr val="accent1"/>
+            </a:effectRef>
+            <a:fontRef idx="minor">
+              <a:schemeClr val="lt1"/>
+            </a:fontRef>
+          </p:style>
+          <p:txBody>
+            <a:bodyPr rtlCol="0" anchor="ctr"/>
+            <a:lstStyle/>
+            <a:p>
+              <a:pPr algn="ctr"/>
+              <a:endParaRPr lang="fr-FR"/>
+            </a:p>
+          </p:txBody>
+        </p:sp>
+        <p:pic>
+          <p:nvPicPr>
+            <p:cNvPr id="77" name="Image 76">
+              <a:extLst>
+                <a:ext uri="{FF2B5EF4-FFF2-40B4-BE49-F238E27FC236}">
+                  <a16:creationId xmlns:a16="http://schemas.microsoft.com/office/drawing/2014/main" id="{C4CB3C94-FB2D-45FE-B98C-B9646AFA847B}"/>
+                </a:ext>
+              </a:extLst>
+            </p:cNvPr>
+            <p:cNvPicPr>
+              <a:picLocks noChangeAspect="1"/>
+            </p:cNvPicPr>
+            <p:nvPr/>
+          </p:nvPicPr>
+          <p:blipFill>
+            <a:blip r:embed="rId11">
+              <a:extLst>
+                <a:ext uri="{28A0092B-C50C-407E-A947-70E740481C1C}">
+                  <a14:useLocalDpi xmlns:a14="http://schemas.microsoft.com/office/drawing/2010/main" val="0"/>
+                </a:ext>
+              </a:extLst>
+            </a:blip>
+            <a:stretch>
+              <a:fillRect/>
+            </a:stretch>
+          </p:blipFill>
+          <p:spPr>
+            <a:xfrm>
+              <a:off x="5255322" y="2410361"/>
+              <a:ext cx="1213395" cy="1213395"/>
+            </a:xfrm>
+            <a:prstGeom prst="rect">
+              <a:avLst/>
+            </a:prstGeom>
+          </p:spPr>
+        </p:pic>
+        <p:sp>
+          <p:nvSpPr>
+            <p:cNvPr id="78" name="ZoneTexte 77">
+              <a:extLst>
+                <a:ext uri="{FF2B5EF4-FFF2-40B4-BE49-F238E27FC236}">
+                  <a16:creationId xmlns:a16="http://schemas.microsoft.com/office/drawing/2014/main" id="{1E020478-33C9-4ACF-89BF-7F2C677E24FC}"/>
+                </a:ext>
+              </a:extLst>
+            </p:cNvPr>
+            <p:cNvSpPr txBox="1"/>
+            <p:nvPr/>
+          </p:nvSpPr>
+          <p:spPr>
+            <a:xfrm>
+              <a:off x="4193990" y="4117931"/>
+              <a:ext cx="1417739" cy="233620"/>
+            </a:xfrm>
+            <a:prstGeom prst="rect">
+              <a:avLst/>
+            </a:prstGeom>
+            <a:noFill/>
+          </p:spPr>
+          <p:txBody>
+            <a:bodyPr wrap="square" rtlCol="0">
+              <a:spAutoFit/>
+            </a:bodyPr>
+            <a:lstStyle/>
+            <a:p>
+              <a:r>
+                <a:rPr lang="fr-FR" sz="700" b="1" dirty="0"/>
+                <a:t>T= 20°C</a:t>
+              </a:r>
+            </a:p>
+          </p:txBody>
+        </p:sp>
+        <p:sp>
+          <p:nvSpPr>
+            <p:cNvPr id="79" name="ZoneTexte 78">
+              <a:extLst>
+                <a:ext uri="{FF2B5EF4-FFF2-40B4-BE49-F238E27FC236}">
+                  <a16:creationId xmlns:a16="http://schemas.microsoft.com/office/drawing/2014/main" id="{0E895068-B187-4E81-A386-7F38DE435A65}"/>
+                </a:ext>
+              </a:extLst>
+            </p:cNvPr>
+            <p:cNvSpPr txBox="1"/>
+            <p:nvPr/>
+          </p:nvSpPr>
+          <p:spPr>
+            <a:xfrm>
+              <a:off x="5287531" y="4117931"/>
+              <a:ext cx="1899181" cy="233620"/>
+            </a:xfrm>
+            <a:prstGeom prst="rect">
+              <a:avLst/>
+            </a:prstGeom>
+            <a:noFill/>
+          </p:spPr>
+          <p:txBody>
+            <a:bodyPr wrap="square" rtlCol="0">
+              <a:spAutoFit/>
+            </a:bodyPr>
+            <a:lstStyle/>
+            <a:p>
+              <a:r>
+                <a:rPr lang="fr-FR" sz="700" b="1" dirty="0"/>
+                <a:t>Humidité = 40%</a:t>
+              </a:r>
+            </a:p>
+          </p:txBody>
+        </p:sp>
+        <p:sp>
+          <p:nvSpPr>
+            <p:cNvPr id="80" name="ZoneTexte 79">
+              <a:extLst>
+                <a:ext uri="{FF2B5EF4-FFF2-40B4-BE49-F238E27FC236}">
+                  <a16:creationId xmlns:a16="http://schemas.microsoft.com/office/drawing/2014/main" id="{881389C7-613C-45C4-9819-6D6DA7068C91}"/>
+                </a:ext>
+              </a:extLst>
+            </p:cNvPr>
+            <p:cNvSpPr txBox="1"/>
+            <p:nvPr/>
+          </p:nvSpPr>
+          <p:spPr>
+            <a:xfrm>
+              <a:off x="5043378" y="3649158"/>
+              <a:ext cx="1577130" cy="269561"/>
+            </a:xfrm>
+            <a:prstGeom prst="rect">
+              <a:avLst/>
+            </a:prstGeom>
+            <a:noFill/>
+          </p:spPr>
+          <p:txBody>
+            <a:bodyPr wrap="square" rtlCol="0">
+              <a:spAutoFit/>
+            </a:bodyPr>
+            <a:lstStyle/>
+            <a:p>
+              <a:pPr algn="ctr"/>
+              <a:r>
+                <a:rPr lang="fr-FR" sz="900" b="1" dirty="0"/>
+                <a:t>Ensoleillé</a:t>
+              </a:r>
+            </a:p>
+          </p:txBody>
+        </p:sp>
+        <p:sp>
+          <p:nvSpPr>
+            <p:cNvPr id="81" name="ZoneTexte 80">
+              <a:extLst>
+                <a:ext uri="{FF2B5EF4-FFF2-40B4-BE49-F238E27FC236}">
+                  <a16:creationId xmlns:a16="http://schemas.microsoft.com/office/drawing/2014/main" id="{8F8B3DB7-F98B-4AA6-B97F-20D9666C06A8}"/>
+                </a:ext>
+              </a:extLst>
+            </p:cNvPr>
+            <p:cNvSpPr txBox="1"/>
+            <p:nvPr/>
+          </p:nvSpPr>
+          <p:spPr>
+            <a:xfrm>
+              <a:off x="4193990" y="4516618"/>
+              <a:ext cx="1671155" cy="215649"/>
+            </a:xfrm>
+            <a:prstGeom prst="rect">
+              <a:avLst/>
+            </a:prstGeom>
+            <a:noFill/>
+          </p:spPr>
+          <p:txBody>
+            <a:bodyPr wrap="square" rtlCol="0">
+              <a:spAutoFit/>
+            </a:bodyPr>
+            <a:lstStyle/>
+            <a:p>
+              <a:r>
+                <a:rPr lang="fr-FR" sz="600" b="1" dirty="0"/>
+                <a:t>12/02/2021</a:t>
+              </a:r>
+            </a:p>
+          </p:txBody>
+        </p:sp>
+        <p:sp>
+          <p:nvSpPr>
+            <p:cNvPr id="82" name="ZoneTexte 81">
+              <a:extLst>
+                <a:ext uri="{FF2B5EF4-FFF2-40B4-BE49-F238E27FC236}">
+                  <a16:creationId xmlns:a16="http://schemas.microsoft.com/office/drawing/2014/main" id="{B3715ADA-3516-468A-B053-C3D48C5E9A31}"/>
+                </a:ext>
+              </a:extLst>
+            </p:cNvPr>
+            <p:cNvSpPr txBox="1"/>
+            <p:nvPr/>
+          </p:nvSpPr>
+          <p:spPr>
+            <a:xfrm>
+              <a:off x="5690351" y="4516618"/>
+              <a:ext cx="1671155" cy="215649"/>
+            </a:xfrm>
+            <a:prstGeom prst="rect">
+              <a:avLst/>
+            </a:prstGeom>
+            <a:noFill/>
+          </p:spPr>
+          <p:txBody>
+            <a:bodyPr wrap="square" rtlCol="0">
+              <a:spAutoFit/>
+            </a:bodyPr>
+            <a:lstStyle/>
+            <a:p>
+              <a:r>
+                <a:rPr lang="fr-FR" sz="600" b="1" dirty="0"/>
+                <a:t>15h00</a:t>
+              </a:r>
+            </a:p>
+          </p:txBody>
+        </p:sp>
+      </p:grpSp>
+      <p:grpSp>
+        <p:nvGrpSpPr>
+          <p:cNvPr id="83" name="Groupe 82">
+            <a:extLst>
+              <a:ext uri="{FF2B5EF4-FFF2-40B4-BE49-F238E27FC236}">
+                <a16:creationId xmlns:a16="http://schemas.microsoft.com/office/drawing/2014/main" id="{D4DDE4A5-16E0-495B-9B0E-1F27E87D0C45}"/>
+              </a:ext>
+            </a:extLst>
+          </p:cNvPr>
+          <p:cNvGrpSpPr/>
+          <p:nvPr/>
+        </p:nvGrpSpPr>
+        <p:grpSpPr>
+          <a:xfrm>
+            <a:off x="7253707" y="4131502"/>
+            <a:ext cx="1298714" cy="1100234"/>
+            <a:chOff x="3940573" y="2410361"/>
+            <a:chExt cx="3499805" cy="2562790"/>
+          </a:xfrm>
+        </p:grpSpPr>
+        <p:sp>
+          <p:nvSpPr>
+            <p:cNvPr id="84" name="Rectangle : coins arrondis 83">
+              <a:extLst>
+                <a:ext uri="{FF2B5EF4-FFF2-40B4-BE49-F238E27FC236}">
+                  <a16:creationId xmlns:a16="http://schemas.microsoft.com/office/drawing/2014/main" id="{02341378-6750-42B5-A556-1BCB65612903}"/>
+                </a:ext>
+              </a:extLst>
+            </p:cNvPr>
+            <p:cNvSpPr/>
+            <p:nvPr/>
+          </p:nvSpPr>
+          <p:spPr>
+            <a:xfrm>
+              <a:off x="3940573" y="2410361"/>
+              <a:ext cx="3499805" cy="2562790"/>
+            </a:xfrm>
+            <a:prstGeom prst="roundRect">
+              <a:avLst/>
+            </a:prstGeom>
+            <a:solidFill>
+              <a:schemeClr val="bg1"/>
+            </a:solidFill>
+            <a:ln>
+              <a:solidFill>
+                <a:schemeClr val="tx1"/>
+              </a:solidFill>
+            </a:ln>
+          </p:spPr>
+          <p:style>
+            <a:lnRef idx="2">
+              <a:schemeClr val="accent1">
+                <a:shade val="50000"/>
+              </a:schemeClr>
+            </a:lnRef>
+            <a:fillRef idx="1">
+              <a:schemeClr val="accent1"/>
+            </a:fillRef>
+            <a:effectRef idx="0">
+              <a:schemeClr val="accent1"/>
+            </a:effectRef>
+            <a:fontRef idx="minor">
+              <a:schemeClr val="lt1"/>
+            </a:fontRef>
+          </p:style>
+          <p:txBody>
+            <a:bodyPr rtlCol="0" anchor="ctr"/>
+            <a:lstStyle/>
+            <a:p>
+              <a:pPr algn="ctr"/>
+              <a:endParaRPr lang="fr-FR"/>
+            </a:p>
+          </p:txBody>
+        </p:sp>
+        <p:pic>
+          <p:nvPicPr>
+            <p:cNvPr id="85" name="Image 84">
+              <a:extLst>
+                <a:ext uri="{FF2B5EF4-FFF2-40B4-BE49-F238E27FC236}">
+                  <a16:creationId xmlns:a16="http://schemas.microsoft.com/office/drawing/2014/main" id="{CBF3B642-0E3C-4E54-B774-9F4AE1BA07E3}"/>
+                </a:ext>
+              </a:extLst>
+            </p:cNvPr>
+            <p:cNvPicPr>
+              <a:picLocks noChangeAspect="1"/>
+            </p:cNvPicPr>
+            <p:nvPr/>
+          </p:nvPicPr>
+          <p:blipFill>
+            <a:blip r:embed="rId11">
+              <a:extLst>
+                <a:ext uri="{28A0092B-C50C-407E-A947-70E740481C1C}">
+                  <a14:useLocalDpi xmlns:a14="http://schemas.microsoft.com/office/drawing/2010/main" val="0"/>
+                </a:ext>
+              </a:extLst>
+            </a:blip>
+            <a:stretch>
+              <a:fillRect/>
+            </a:stretch>
+          </p:blipFill>
+          <p:spPr>
+            <a:xfrm>
+              <a:off x="5255322" y="2410361"/>
+              <a:ext cx="1213395" cy="1213395"/>
+            </a:xfrm>
+            <a:prstGeom prst="rect">
+              <a:avLst/>
+            </a:prstGeom>
+          </p:spPr>
+        </p:pic>
+        <p:sp>
+          <p:nvSpPr>
+            <p:cNvPr id="86" name="ZoneTexte 85">
+              <a:extLst>
+                <a:ext uri="{FF2B5EF4-FFF2-40B4-BE49-F238E27FC236}">
+                  <a16:creationId xmlns:a16="http://schemas.microsoft.com/office/drawing/2014/main" id="{D7964E4E-09EC-4129-8445-47B722071B31}"/>
+                </a:ext>
+              </a:extLst>
+            </p:cNvPr>
+            <p:cNvSpPr txBox="1"/>
+            <p:nvPr/>
+          </p:nvSpPr>
+          <p:spPr>
+            <a:xfrm>
+              <a:off x="4193990" y="4117931"/>
+              <a:ext cx="1417739" cy="233620"/>
+            </a:xfrm>
+            <a:prstGeom prst="rect">
+              <a:avLst/>
+            </a:prstGeom>
+            <a:noFill/>
+          </p:spPr>
+          <p:txBody>
+            <a:bodyPr wrap="square" rtlCol="0">
+              <a:spAutoFit/>
+            </a:bodyPr>
+            <a:lstStyle/>
+            <a:p>
+              <a:r>
+                <a:rPr lang="fr-FR" sz="700" b="1" dirty="0"/>
+                <a:t>T= 20°C</a:t>
+              </a:r>
+            </a:p>
+          </p:txBody>
+        </p:sp>
+        <p:sp>
+          <p:nvSpPr>
+            <p:cNvPr id="87" name="ZoneTexte 86">
+              <a:extLst>
+                <a:ext uri="{FF2B5EF4-FFF2-40B4-BE49-F238E27FC236}">
+                  <a16:creationId xmlns:a16="http://schemas.microsoft.com/office/drawing/2014/main" id="{5768F6F6-9F22-4A4E-A5B9-398BE510429B}"/>
+                </a:ext>
+              </a:extLst>
+            </p:cNvPr>
+            <p:cNvSpPr txBox="1"/>
+            <p:nvPr/>
+          </p:nvSpPr>
+          <p:spPr>
+            <a:xfrm>
+              <a:off x="5287531" y="4117931"/>
+              <a:ext cx="1899181" cy="233620"/>
+            </a:xfrm>
+            <a:prstGeom prst="rect">
+              <a:avLst/>
+            </a:prstGeom>
+            <a:noFill/>
+          </p:spPr>
+          <p:txBody>
+            <a:bodyPr wrap="square" rtlCol="0">
+              <a:spAutoFit/>
+            </a:bodyPr>
+            <a:lstStyle/>
+            <a:p>
+              <a:r>
+                <a:rPr lang="fr-FR" sz="700" b="1" dirty="0"/>
+                <a:t>Humidité = 40%</a:t>
+              </a:r>
+            </a:p>
+          </p:txBody>
+        </p:sp>
+        <p:sp>
+          <p:nvSpPr>
+            <p:cNvPr id="88" name="ZoneTexte 87">
+              <a:extLst>
+                <a:ext uri="{FF2B5EF4-FFF2-40B4-BE49-F238E27FC236}">
+                  <a16:creationId xmlns:a16="http://schemas.microsoft.com/office/drawing/2014/main" id="{8CF44BCE-68C0-40C0-BC03-13899F9F7C18}"/>
+                </a:ext>
+              </a:extLst>
+            </p:cNvPr>
+            <p:cNvSpPr txBox="1"/>
+            <p:nvPr/>
+          </p:nvSpPr>
+          <p:spPr>
+            <a:xfrm>
+              <a:off x="5043378" y="3649158"/>
+              <a:ext cx="1577130" cy="269561"/>
+            </a:xfrm>
+            <a:prstGeom prst="rect">
+              <a:avLst/>
+            </a:prstGeom>
+            <a:noFill/>
+          </p:spPr>
+          <p:txBody>
+            <a:bodyPr wrap="square" rtlCol="0">
+              <a:spAutoFit/>
+            </a:bodyPr>
+            <a:lstStyle/>
+            <a:p>
+              <a:pPr algn="ctr"/>
+              <a:r>
+                <a:rPr lang="fr-FR" sz="900" b="1" dirty="0"/>
+                <a:t>Ensoleillé</a:t>
+              </a:r>
+            </a:p>
+          </p:txBody>
+        </p:sp>
+        <p:sp>
+          <p:nvSpPr>
+            <p:cNvPr id="89" name="ZoneTexte 88">
+              <a:extLst>
+                <a:ext uri="{FF2B5EF4-FFF2-40B4-BE49-F238E27FC236}">
+                  <a16:creationId xmlns:a16="http://schemas.microsoft.com/office/drawing/2014/main" id="{44C3AE5E-8684-4E61-B6CA-42438C76E9EF}"/>
+                </a:ext>
+              </a:extLst>
+            </p:cNvPr>
+            <p:cNvSpPr txBox="1"/>
+            <p:nvPr/>
+          </p:nvSpPr>
+          <p:spPr>
+            <a:xfrm>
+              <a:off x="4193990" y="4516618"/>
+              <a:ext cx="1671155" cy="215649"/>
+            </a:xfrm>
+            <a:prstGeom prst="rect">
+              <a:avLst/>
+            </a:prstGeom>
+            <a:noFill/>
+          </p:spPr>
+          <p:txBody>
+            <a:bodyPr wrap="square" rtlCol="0">
+              <a:spAutoFit/>
+            </a:bodyPr>
+            <a:lstStyle/>
+            <a:p>
+              <a:r>
+                <a:rPr lang="fr-FR" sz="600" b="1" dirty="0"/>
+                <a:t>12/02/2021</a:t>
+              </a:r>
+            </a:p>
+          </p:txBody>
+        </p:sp>
+        <p:sp>
+          <p:nvSpPr>
+            <p:cNvPr id="90" name="ZoneTexte 89">
+              <a:extLst>
+                <a:ext uri="{FF2B5EF4-FFF2-40B4-BE49-F238E27FC236}">
+                  <a16:creationId xmlns:a16="http://schemas.microsoft.com/office/drawing/2014/main" id="{06C350AD-6D25-46CA-9949-1E5EBF4F49C9}"/>
+                </a:ext>
+              </a:extLst>
+            </p:cNvPr>
+            <p:cNvSpPr txBox="1"/>
+            <p:nvPr/>
+          </p:nvSpPr>
+          <p:spPr>
+            <a:xfrm>
+              <a:off x="5690351" y="4516618"/>
+              <a:ext cx="1671155" cy="215649"/>
+            </a:xfrm>
+            <a:prstGeom prst="rect">
+              <a:avLst/>
+            </a:prstGeom>
+            <a:noFill/>
+          </p:spPr>
+          <p:txBody>
+            <a:bodyPr wrap="square" rtlCol="0">
+              <a:spAutoFit/>
+            </a:bodyPr>
+            <a:lstStyle/>
+            <a:p>
+              <a:r>
+                <a:rPr lang="fr-FR" sz="600" b="1" dirty="0"/>
+                <a:t>15h00</a:t>
+              </a:r>
+            </a:p>
+          </p:txBody>
+        </p:sp>
+      </p:grpSp>
+    </p:spTree>
+    <p:extLst>
+      <p:ext uri="{BB962C8B-B14F-4D97-AF65-F5344CB8AC3E}">
+        <p14:creationId xmlns:p14="http://schemas.microsoft.com/office/powerpoint/2010/main" val="3567329043"/>
+      </p:ext>
+    </p:extLst>
+  </p:cSld>
+  <p:clrMapOvr>
+    <a:masterClrMapping/>
+  </p:clrMapOvr>
+</p:sld>
+</file>
+
+<file path=ppt/slides/slide7.xml><?xml version="1.0" encoding="utf-8"?>
+<p:sld xmlns:a="http://schemas.openxmlformats.org/drawingml/2006/main" xmlns:r="http://schemas.openxmlformats.org/officeDocument/2006/relationships" xmlns:p="http://schemas.openxmlformats.org/presentationml/2006/main">
+  <p:cSld>
+    <p:spTree>
+      <p:nvGrpSpPr>
+        <p:cNvPr id="1" name=""/>
+        <p:cNvGrpSpPr/>
+        <p:nvPr/>
+      </p:nvGrpSpPr>
+      <p:grpSpPr>
+        <a:xfrm>
+          <a:off x="0" y="0"/>
+          <a:ext cx="0" cy="0"/>
+          <a:chOff x="0" y="0"/>
+          <a:chExt cx="0" cy="0"/>
+        </a:xfrm>
+      </p:grpSpPr>
+      <p:pic>
+        <p:nvPicPr>
           <p:cNvPr id="5" name="Image 4">
             <a:extLst>
               <a:ext uri="{FF2B5EF4-FFF2-40B4-BE49-F238E27FC236}">
@@ -8790,7 +11288,7 @@
 </p:sld>
 </file>
 
-<file path=ppt/slides/slide7.xml><?xml version="1.0" encoding="utf-8"?>
+<file path=ppt/slides/slide8.xml><?xml version="1.0" encoding="utf-8"?>
 <p:sld xmlns:a="http://schemas.openxmlformats.org/drawingml/2006/main" xmlns:r="http://schemas.openxmlformats.org/officeDocument/2006/relationships" xmlns:p="http://schemas.openxmlformats.org/presentationml/2006/main">
   <p:cSld>
     <p:spTree>

</xml_diff>